<commit_message>
Bug fixes for Surv_Plots()
</commit_message>
<xml_diff>
--- a/vignettes/ONDA_XX-Survival-Curve.pptx
+++ b/vignettes/ONDA_XX-Survival-Curve.pptx
@@ -2334,7 +2334,7 @@
           <p:spPr>
             <a:xfrm>
               <a:off x="1496652" y="983989"/>
-              <a:ext cx="3841835" cy="3188077"/>
+              <a:ext cx="4186447" cy="3188077"/>
             </a:xfrm>
             <a:prstGeom prst="rect">
               <a:avLst/>
@@ -2360,20 +2360,20 @@
           <p:spPr>
             <a:xfrm>
               <a:off x="1496652" y="4172066"/>
-              <a:ext cx="3841835" cy="0"/>
+              <a:ext cx="4186447" cy="0"/>
             </a:xfrm>
             <a:custGeom>
               <a:avLst/>
               <a:pathLst>
-                <a:path w="3841835" h="0">
+                <a:path w="4186447" h="0">
                   <a:moveTo>
                     <a:pt x="0" y="0"/>
                   </a:moveTo>
                   <a:lnTo>
-                    <a:pt x="3841835" y="0"/>
-                  </a:lnTo>
-                  <a:lnTo>
-                    <a:pt x="3841835" y="0"/>
+                    <a:pt x="4186447" y="0"/>
+                  </a:lnTo>
+                  <a:lnTo>
+                    <a:pt x="4186447" y="0"/>
                   </a:lnTo>
                 </a:path>
               </a:pathLst>
@@ -2403,20 +2403,20 @@
           <p:spPr>
             <a:xfrm>
               <a:off x="1496652" y="3882241"/>
-              <a:ext cx="3841835" cy="0"/>
+              <a:ext cx="4186447" cy="0"/>
             </a:xfrm>
             <a:custGeom>
               <a:avLst/>
               <a:pathLst>
-                <a:path w="3841835" h="0">
+                <a:path w="4186447" h="0">
                   <a:moveTo>
                     <a:pt x="0" y="0"/>
                   </a:moveTo>
                   <a:lnTo>
-                    <a:pt x="3841835" y="0"/>
-                  </a:lnTo>
-                  <a:lnTo>
-                    <a:pt x="3841835" y="0"/>
+                    <a:pt x="4186447" y="0"/>
+                  </a:lnTo>
+                  <a:lnTo>
+                    <a:pt x="4186447" y="0"/>
                   </a:lnTo>
                 </a:path>
               </a:pathLst>
@@ -2446,20 +2446,20 @@
           <p:spPr>
             <a:xfrm>
               <a:off x="1496652" y="3592416"/>
-              <a:ext cx="3841835" cy="0"/>
+              <a:ext cx="4186447" cy="0"/>
             </a:xfrm>
             <a:custGeom>
               <a:avLst/>
               <a:pathLst>
-                <a:path w="3841835" h="0">
+                <a:path w="4186447" h="0">
                   <a:moveTo>
                     <a:pt x="0" y="0"/>
                   </a:moveTo>
                   <a:lnTo>
-                    <a:pt x="3841835" y="0"/>
-                  </a:lnTo>
-                  <a:lnTo>
-                    <a:pt x="3841835" y="0"/>
+                    <a:pt x="4186447" y="0"/>
+                  </a:lnTo>
+                  <a:lnTo>
+                    <a:pt x="4186447" y="0"/>
                   </a:lnTo>
                 </a:path>
               </a:pathLst>
@@ -2489,20 +2489,20 @@
           <p:spPr>
             <a:xfrm>
               <a:off x="1496652" y="3302590"/>
-              <a:ext cx="3841835" cy="0"/>
+              <a:ext cx="4186447" cy="0"/>
             </a:xfrm>
             <a:custGeom>
               <a:avLst/>
               <a:pathLst>
-                <a:path w="3841835" h="0">
+                <a:path w="4186447" h="0">
                   <a:moveTo>
                     <a:pt x="0" y="0"/>
                   </a:moveTo>
                   <a:lnTo>
-                    <a:pt x="3841835" y="0"/>
-                  </a:lnTo>
-                  <a:lnTo>
-                    <a:pt x="3841835" y="0"/>
+                    <a:pt x="4186447" y="0"/>
+                  </a:lnTo>
+                  <a:lnTo>
+                    <a:pt x="4186447" y="0"/>
                   </a:lnTo>
                 </a:path>
               </a:pathLst>
@@ -2532,20 +2532,20 @@
           <p:spPr>
             <a:xfrm>
               <a:off x="1496652" y="3012765"/>
-              <a:ext cx="3841835" cy="0"/>
+              <a:ext cx="4186447" cy="0"/>
             </a:xfrm>
             <a:custGeom>
               <a:avLst/>
               <a:pathLst>
-                <a:path w="3841835" h="0">
+                <a:path w="4186447" h="0">
                   <a:moveTo>
                     <a:pt x="0" y="0"/>
                   </a:moveTo>
                   <a:lnTo>
-                    <a:pt x="3841835" y="0"/>
-                  </a:lnTo>
-                  <a:lnTo>
-                    <a:pt x="3841835" y="0"/>
+                    <a:pt x="4186447" y="0"/>
+                  </a:lnTo>
+                  <a:lnTo>
+                    <a:pt x="4186447" y="0"/>
                   </a:lnTo>
                 </a:path>
               </a:pathLst>
@@ -2575,20 +2575,20 @@
           <p:spPr>
             <a:xfrm>
               <a:off x="1496652" y="2722940"/>
-              <a:ext cx="3841835" cy="0"/>
+              <a:ext cx="4186447" cy="0"/>
             </a:xfrm>
             <a:custGeom>
               <a:avLst/>
               <a:pathLst>
-                <a:path w="3841835" h="0">
+                <a:path w="4186447" h="0">
                   <a:moveTo>
                     <a:pt x="0" y="0"/>
                   </a:moveTo>
                   <a:lnTo>
-                    <a:pt x="3841835" y="0"/>
-                  </a:lnTo>
-                  <a:lnTo>
-                    <a:pt x="3841835" y="0"/>
+                    <a:pt x="4186447" y="0"/>
+                  </a:lnTo>
+                  <a:lnTo>
+                    <a:pt x="4186447" y="0"/>
                   </a:lnTo>
                 </a:path>
               </a:pathLst>
@@ -2618,20 +2618,20 @@
           <p:spPr>
             <a:xfrm>
               <a:off x="1496652" y="2433115"/>
-              <a:ext cx="3841835" cy="0"/>
+              <a:ext cx="4186447" cy="0"/>
             </a:xfrm>
             <a:custGeom>
               <a:avLst/>
               <a:pathLst>
-                <a:path w="3841835" h="0">
+                <a:path w="4186447" h="0">
                   <a:moveTo>
                     <a:pt x="0" y="0"/>
                   </a:moveTo>
                   <a:lnTo>
-                    <a:pt x="3841835" y="0"/>
-                  </a:lnTo>
-                  <a:lnTo>
-                    <a:pt x="3841835" y="0"/>
+                    <a:pt x="4186447" y="0"/>
+                  </a:lnTo>
+                  <a:lnTo>
+                    <a:pt x="4186447" y="0"/>
                   </a:lnTo>
                 </a:path>
               </a:pathLst>
@@ -2661,20 +2661,20 @@
           <p:spPr>
             <a:xfrm>
               <a:off x="1496652" y="2143289"/>
-              <a:ext cx="3841835" cy="0"/>
+              <a:ext cx="4186447" cy="0"/>
             </a:xfrm>
             <a:custGeom>
               <a:avLst/>
               <a:pathLst>
-                <a:path w="3841835" h="0">
+                <a:path w="4186447" h="0">
                   <a:moveTo>
                     <a:pt x="0" y="0"/>
                   </a:moveTo>
                   <a:lnTo>
-                    <a:pt x="3841835" y="0"/>
-                  </a:lnTo>
-                  <a:lnTo>
-                    <a:pt x="3841835" y="0"/>
+                    <a:pt x="4186447" y="0"/>
+                  </a:lnTo>
+                  <a:lnTo>
+                    <a:pt x="4186447" y="0"/>
                   </a:lnTo>
                 </a:path>
               </a:pathLst>
@@ -2704,20 +2704,20 @@
           <p:spPr>
             <a:xfrm>
               <a:off x="1496652" y="1853464"/>
-              <a:ext cx="3841835" cy="0"/>
+              <a:ext cx="4186447" cy="0"/>
             </a:xfrm>
             <a:custGeom>
               <a:avLst/>
               <a:pathLst>
-                <a:path w="3841835" h="0">
+                <a:path w="4186447" h="0">
                   <a:moveTo>
                     <a:pt x="0" y="0"/>
                   </a:moveTo>
                   <a:lnTo>
-                    <a:pt x="3841835" y="0"/>
-                  </a:lnTo>
-                  <a:lnTo>
-                    <a:pt x="3841835" y="0"/>
+                    <a:pt x="4186447" y="0"/>
+                  </a:lnTo>
+                  <a:lnTo>
+                    <a:pt x="4186447" y="0"/>
                   </a:lnTo>
                 </a:path>
               </a:pathLst>
@@ -2747,20 +2747,20 @@
           <p:spPr>
             <a:xfrm>
               <a:off x="1496652" y="1563639"/>
-              <a:ext cx="3841835" cy="0"/>
+              <a:ext cx="4186447" cy="0"/>
             </a:xfrm>
             <a:custGeom>
               <a:avLst/>
               <a:pathLst>
-                <a:path w="3841835" h="0">
+                <a:path w="4186447" h="0">
                   <a:moveTo>
                     <a:pt x="0" y="0"/>
                   </a:moveTo>
                   <a:lnTo>
-                    <a:pt x="3841835" y="0"/>
-                  </a:lnTo>
-                  <a:lnTo>
-                    <a:pt x="3841835" y="0"/>
+                    <a:pt x="4186447" y="0"/>
+                  </a:lnTo>
+                  <a:lnTo>
+                    <a:pt x="4186447" y="0"/>
                   </a:lnTo>
                 </a:path>
               </a:pathLst>
@@ -2790,20 +2790,20 @@
           <p:spPr>
             <a:xfrm>
               <a:off x="1496652" y="1273814"/>
-              <a:ext cx="3841835" cy="0"/>
+              <a:ext cx="4186447" cy="0"/>
             </a:xfrm>
             <a:custGeom>
               <a:avLst/>
               <a:pathLst>
-                <a:path w="3841835" h="0">
+                <a:path w="4186447" h="0">
                   <a:moveTo>
                     <a:pt x="0" y="0"/>
                   </a:moveTo>
                   <a:lnTo>
-                    <a:pt x="3841835" y="0"/>
-                  </a:lnTo>
-                  <a:lnTo>
-                    <a:pt x="3841835" y="0"/>
+                    <a:pt x="4186447" y="0"/>
+                  </a:lnTo>
+                  <a:lnTo>
+                    <a:pt x="4186447" y="0"/>
                   </a:lnTo>
                 </a:path>
               </a:pathLst>
@@ -2833,20 +2833,20 @@
           <p:spPr>
             <a:xfrm>
               <a:off x="1496652" y="983989"/>
-              <a:ext cx="3841835" cy="0"/>
+              <a:ext cx="4186447" cy="0"/>
             </a:xfrm>
             <a:custGeom>
               <a:avLst/>
               <a:pathLst>
-                <a:path w="3841835" h="0">
+                <a:path w="4186447" h="0">
                   <a:moveTo>
                     <a:pt x="0" y="0"/>
                   </a:moveTo>
                   <a:lnTo>
-                    <a:pt x="3841835" y="0"/>
-                  </a:lnTo>
-                  <a:lnTo>
-                    <a:pt x="3841835" y="0"/>
+                    <a:pt x="4186447" y="0"/>
+                  </a:lnTo>
+                  <a:lnTo>
+                    <a:pt x="4186447" y="0"/>
                   </a:lnTo>
                 </a:path>
               </a:pathLst>
@@ -2875,7 +2875,7 @@
           </p:nvSpPr>
           <p:spPr>
             <a:xfrm>
-              <a:off x="1496652" y="983989"/>
+              <a:off x="1510748" y="983989"/>
               <a:ext cx="0" cy="3188077"/>
             </a:xfrm>
             <a:custGeom>
@@ -2918,7 +2918,7 @@
           </p:nvSpPr>
           <p:spPr>
             <a:xfrm>
-              <a:off x="1845910" y="983989"/>
+              <a:off x="1863143" y="983989"/>
               <a:ext cx="0" cy="3188077"/>
             </a:xfrm>
             <a:custGeom>
@@ -2961,7 +2961,7 @@
           </p:nvSpPr>
           <p:spPr>
             <a:xfrm>
-              <a:off x="2195168" y="983989"/>
+              <a:off x="2215537" y="983989"/>
               <a:ext cx="0" cy="3188077"/>
             </a:xfrm>
             <a:custGeom>
@@ -3004,7 +3004,7 @@
           </p:nvSpPr>
           <p:spPr>
             <a:xfrm>
-              <a:off x="2544426" y="983989"/>
+              <a:off x="2567932" y="983989"/>
               <a:ext cx="0" cy="3188077"/>
             </a:xfrm>
             <a:custGeom>
@@ -3047,7 +3047,7 @@
           </p:nvSpPr>
           <p:spPr>
             <a:xfrm>
-              <a:off x="2893684" y="983989"/>
+              <a:off x="2920326" y="983989"/>
               <a:ext cx="0" cy="3188077"/>
             </a:xfrm>
             <a:custGeom>
@@ -3090,7 +3090,7 @@
           </p:nvSpPr>
           <p:spPr>
             <a:xfrm>
-              <a:off x="3242941" y="983989"/>
+              <a:off x="3272721" y="983989"/>
               <a:ext cx="0" cy="3188077"/>
             </a:xfrm>
             <a:custGeom>
@@ -3133,7 +3133,7 @@
           </p:nvSpPr>
           <p:spPr>
             <a:xfrm>
-              <a:off x="3592199" y="983989"/>
+              <a:off x="3625116" y="983989"/>
               <a:ext cx="0" cy="3188077"/>
             </a:xfrm>
             <a:custGeom>
@@ -3176,7 +3176,7 @@
           </p:nvSpPr>
           <p:spPr>
             <a:xfrm>
-              <a:off x="3941457" y="983989"/>
+              <a:off x="3977510" y="983989"/>
               <a:ext cx="0" cy="3188077"/>
             </a:xfrm>
             <a:custGeom>
@@ -3219,7 +3219,7 @@
           </p:nvSpPr>
           <p:spPr>
             <a:xfrm>
-              <a:off x="4290715" y="983989"/>
+              <a:off x="4329905" y="983989"/>
               <a:ext cx="0" cy="3188077"/>
             </a:xfrm>
             <a:custGeom>
@@ -3262,7 +3262,7 @@
           </p:nvSpPr>
           <p:spPr>
             <a:xfrm>
-              <a:off x="4639973" y="983989"/>
+              <a:off x="4682299" y="983989"/>
               <a:ext cx="0" cy="3188077"/>
             </a:xfrm>
             <a:custGeom>
@@ -3305,7 +3305,7 @@
           </p:nvSpPr>
           <p:spPr>
             <a:xfrm>
-              <a:off x="4989230" y="983989"/>
+              <a:off x="5034694" y="983989"/>
               <a:ext cx="0" cy="3188077"/>
             </a:xfrm>
             <a:custGeom>
@@ -3348,7 +3348,7 @@
           </p:nvSpPr>
           <p:spPr>
             <a:xfrm>
-              <a:off x="5338488" y="983989"/>
+              <a:off x="5387088" y="983989"/>
               <a:ext cx="0" cy="3188077"/>
             </a:xfrm>
             <a:custGeom>
@@ -3392,20 +3392,20 @@
           <p:spPr>
             <a:xfrm>
               <a:off x="1496652" y="4027153"/>
-              <a:ext cx="3841835" cy="0"/>
+              <a:ext cx="4186447" cy="0"/>
             </a:xfrm>
             <a:custGeom>
               <a:avLst/>
               <a:pathLst>
-                <a:path w="3841835" h="0">
+                <a:path w="4186447" h="0">
                   <a:moveTo>
                     <a:pt x="0" y="0"/>
                   </a:moveTo>
                   <a:lnTo>
-                    <a:pt x="3841835" y="0"/>
-                  </a:lnTo>
-                  <a:lnTo>
-                    <a:pt x="3841835" y="0"/>
+                    <a:pt x="4186447" y="0"/>
+                  </a:lnTo>
+                  <a:lnTo>
+                    <a:pt x="4186447" y="0"/>
                   </a:lnTo>
                 </a:path>
               </a:pathLst>
@@ -3435,20 +3435,20 @@
           <p:spPr>
             <a:xfrm>
               <a:off x="1496652" y="3737328"/>
-              <a:ext cx="3841835" cy="0"/>
+              <a:ext cx="4186447" cy="0"/>
             </a:xfrm>
             <a:custGeom>
               <a:avLst/>
               <a:pathLst>
-                <a:path w="3841835" h="0">
+                <a:path w="4186447" h="0">
                   <a:moveTo>
                     <a:pt x="0" y="0"/>
                   </a:moveTo>
                   <a:lnTo>
-                    <a:pt x="3841835" y="0"/>
-                  </a:lnTo>
-                  <a:lnTo>
-                    <a:pt x="3841835" y="0"/>
+                    <a:pt x="4186447" y="0"/>
+                  </a:lnTo>
+                  <a:lnTo>
+                    <a:pt x="4186447" y="0"/>
                   </a:lnTo>
                 </a:path>
               </a:pathLst>
@@ -3478,20 +3478,20 @@
           <p:spPr>
             <a:xfrm>
               <a:off x="1496652" y="3447503"/>
-              <a:ext cx="3841835" cy="0"/>
+              <a:ext cx="4186447" cy="0"/>
             </a:xfrm>
             <a:custGeom>
               <a:avLst/>
               <a:pathLst>
-                <a:path w="3841835" h="0">
+                <a:path w="4186447" h="0">
                   <a:moveTo>
                     <a:pt x="0" y="0"/>
                   </a:moveTo>
                   <a:lnTo>
-                    <a:pt x="3841835" y="0"/>
-                  </a:lnTo>
-                  <a:lnTo>
-                    <a:pt x="3841835" y="0"/>
+                    <a:pt x="4186447" y="0"/>
+                  </a:lnTo>
+                  <a:lnTo>
+                    <a:pt x="4186447" y="0"/>
                   </a:lnTo>
                 </a:path>
               </a:pathLst>
@@ -3521,20 +3521,20 @@
           <p:spPr>
             <a:xfrm>
               <a:off x="1496652" y="3157678"/>
-              <a:ext cx="3841835" cy="0"/>
+              <a:ext cx="4186447" cy="0"/>
             </a:xfrm>
             <a:custGeom>
               <a:avLst/>
               <a:pathLst>
-                <a:path w="3841835" h="0">
+                <a:path w="4186447" h="0">
                   <a:moveTo>
                     <a:pt x="0" y="0"/>
                   </a:moveTo>
                   <a:lnTo>
-                    <a:pt x="3841835" y="0"/>
-                  </a:lnTo>
-                  <a:lnTo>
-                    <a:pt x="3841835" y="0"/>
+                    <a:pt x="4186447" y="0"/>
+                  </a:lnTo>
+                  <a:lnTo>
+                    <a:pt x="4186447" y="0"/>
                   </a:lnTo>
                 </a:path>
               </a:pathLst>
@@ -3564,20 +3564,20 @@
           <p:spPr>
             <a:xfrm>
               <a:off x="1496652" y="2867853"/>
-              <a:ext cx="3841835" cy="0"/>
+              <a:ext cx="4186447" cy="0"/>
             </a:xfrm>
             <a:custGeom>
               <a:avLst/>
               <a:pathLst>
-                <a:path w="3841835" h="0">
+                <a:path w="4186447" h="0">
                   <a:moveTo>
                     <a:pt x="0" y="0"/>
                   </a:moveTo>
                   <a:lnTo>
-                    <a:pt x="3841835" y="0"/>
-                  </a:lnTo>
-                  <a:lnTo>
-                    <a:pt x="3841835" y="0"/>
+                    <a:pt x="4186447" y="0"/>
+                  </a:lnTo>
+                  <a:lnTo>
+                    <a:pt x="4186447" y="0"/>
                   </a:lnTo>
                 </a:path>
               </a:pathLst>
@@ -3607,20 +3607,20 @@
           <p:spPr>
             <a:xfrm>
               <a:off x="1496652" y="2578027"/>
-              <a:ext cx="3841835" cy="0"/>
+              <a:ext cx="4186447" cy="0"/>
             </a:xfrm>
             <a:custGeom>
               <a:avLst/>
               <a:pathLst>
-                <a:path w="3841835" h="0">
+                <a:path w="4186447" h="0">
                   <a:moveTo>
                     <a:pt x="0" y="0"/>
                   </a:moveTo>
                   <a:lnTo>
-                    <a:pt x="3841835" y="0"/>
-                  </a:lnTo>
-                  <a:lnTo>
-                    <a:pt x="3841835" y="0"/>
+                    <a:pt x="4186447" y="0"/>
+                  </a:lnTo>
+                  <a:lnTo>
+                    <a:pt x="4186447" y="0"/>
                   </a:lnTo>
                 </a:path>
               </a:pathLst>
@@ -3650,20 +3650,20 @@
           <p:spPr>
             <a:xfrm>
               <a:off x="1496652" y="2288202"/>
-              <a:ext cx="3841835" cy="0"/>
+              <a:ext cx="4186447" cy="0"/>
             </a:xfrm>
             <a:custGeom>
               <a:avLst/>
               <a:pathLst>
-                <a:path w="3841835" h="0">
+                <a:path w="4186447" h="0">
                   <a:moveTo>
                     <a:pt x="0" y="0"/>
                   </a:moveTo>
                   <a:lnTo>
-                    <a:pt x="3841835" y="0"/>
-                  </a:lnTo>
-                  <a:lnTo>
-                    <a:pt x="3841835" y="0"/>
+                    <a:pt x="4186447" y="0"/>
+                  </a:lnTo>
+                  <a:lnTo>
+                    <a:pt x="4186447" y="0"/>
                   </a:lnTo>
                 </a:path>
               </a:pathLst>
@@ -3693,20 +3693,20 @@
           <p:spPr>
             <a:xfrm>
               <a:off x="1496652" y="1998377"/>
-              <a:ext cx="3841835" cy="0"/>
+              <a:ext cx="4186447" cy="0"/>
             </a:xfrm>
             <a:custGeom>
               <a:avLst/>
               <a:pathLst>
-                <a:path w="3841835" h="0">
+                <a:path w="4186447" h="0">
                   <a:moveTo>
                     <a:pt x="0" y="0"/>
                   </a:moveTo>
                   <a:lnTo>
-                    <a:pt x="3841835" y="0"/>
-                  </a:lnTo>
-                  <a:lnTo>
-                    <a:pt x="3841835" y="0"/>
+                    <a:pt x="4186447" y="0"/>
+                  </a:lnTo>
+                  <a:lnTo>
+                    <a:pt x="4186447" y="0"/>
                   </a:lnTo>
                 </a:path>
               </a:pathLst>
@@ -3736,20 +3736,20 @@
           <p:spPr>
             <a:xfrm>
               <a:off x="1496652" y="1708552"/>
-              <a:ext cx="3841835" cy="0"/>
+              <a:ext cx="4186447" cy="0"/>
             </a:xfrm>
             <a:custGeom>
               <a:avLst/>
               <a:pathLst>
-                <a:path w="3841835" h="0">
+                <a:path w="4186447" h="0">
                   <a:moveTo>
                     <a:pt x="0" y="0"/>
                   </a:moveTo>
                   <a:lnTo>
-                    <a:pt x="3841835" y="0"/>
-                  </a:lnTo>
-                  <a:lnTo>
-                    <a:pt x="3841835" y="0"/>
+                    <a:pt x="4186447" y="0"/>
+                  </a:lnTo>
+                  <a:lnTo>
+                    <a:pt x="4186447" y="0"/>
                   </a:lnTo>
                 </a:path>
               </a:pathLst>
@@ -3779,20 +3779,20 @@
           <p:spPr>
             <a:xfrm>
               <a:off x="1496652" y="1418726"/>
-              <a:ext cx="3841835" cy="0"/>
+              <a:ext cx="4186447" cy="0"/>
             </a:xfrm>
             <a:custGeom>
               <a:avLst/>
               <a:pathLst>
-                <a:path w="3841835" h="0">
+                <a:path w="4186447" h="0">
                   <a:moveTo>
                     <a:pt x="0" y="0"/>
                   </a:moveTo>
                   <a:lnTo>
-                    <a:pt x="3841835" y="0"/>
-                  </a:lnTo>
-                  <a:lnTo>
-                    <a:pt x="3841835" y="0"/>
+                    <a:pt x="4186447" y="0"/>
+                  </a:lnTo>
+                  <a:lnTo>
+                    <a:pt x="4186447" y="0"/>
                   </a:lnTo>
                 </a:path>
               </a:pathLst>
@@ -3822,20 +3822,20 @@
           <p:spPr>
             <a:xfrm>
               <a:off x="1496652" y="1128901"/>
-              <a:ext cx="3841835" cy="0"/>
+              <a:ext cx="4186447" cy="0"/>
             </a:xfrm>
             <a:custGeom>
               <a:avLst/>
               <a:pathLst>
-                <a:path w="3841835" h="0">
+                <a:path w="4186447" h="0">
                   <a:moveTo>
                     <a:pt x="0" y="0"/>
                   </a:moveTo>
                   <a:lnTo>
-                    <a:pt x="3841835" y="0"/>
-                  </a:lnTo>
-                  <a:lnTo>
-                    <a:pt x="3841835" y="0"/>
+                    <a:pt x="4186447" y="0"/>
+                  </a:lnTo>
+                  <a:lnTo>
+                    <a:pt x="4186447" y="0"/>
                   </a:lnTo>
                 </a:path>
               </a:pathLst>
@@ -3864,7 +3864,7 @@
           </p:nvSpPr>
           <p:spPr>
             <a:xfrm>
-              <a:off x="1671281" y="983989"/>
+              <a:off x="1686945" y="983989"/>
               <a:ext cx="0" cy="3188077"/>
             </a:xfrm>
             <a:custGeom>
@@ -3907,7 +3907,7 @@
           </p:nvSpPr>
           <p:spPr>
             <a:xfrm>
-              <a:off x="2020539" y="983989"/>
+              <a:off x="2039340" y="983989"/>
               <a:ext cx="0" cy="3188077"/>
             </a:xfrm>
             <a:custGeom>
@@ -3950,7 +3950,7 @@
           </p:nvSpPr>
           <p:spPr>
             <a:xfrm>
-              <a:off x="2369797" y="983989"/>
+              <a:off x="2391735" y="983989"/>
               <a:ext cx="0" cy="3188077"/>
             </a:xfrm>
             <a:custGeom>
@@ -3993,7 +3993,7 @@
           </p:nvSpPr>
           <p:spPr>
             <a:xfrm>
-              <a:off x="2719055" y="983989"/>
+              <a:off x="2744129" y="983989"/>
               <a:ext cx="0" cy="3188077"/>
             </a:xfrm>
             <a:custGeom>
@@ -4036,7 +4036,7 @@
           </p:nvSpPr>
           <p:spPr>
             <a:xfrm>
-              <a:off x="3068312" y="983989"/>
+              <a:off x="3096524" y="983989"/>
               <a:ext cx="0" cy="3188077"/>
             </a:xfrm>
             <a:custGeom>
@@ -4079,7 +4079,7 @@
           </p:nvSpPr>
           <p:spPr>
             <a:xfrm>
-              <a:off x="3417570" y="983989"/>
+              <a:off x="3448918" y="983989"/>
               <a:ext cx="0" cy="3188077"/>
             </a:xfrm>
             <a:custGeom>
@@ -4122,7 +4122,7 @@
           </p:nvSpPr>
           <p:spPr>
             <a:xfrm>
-              <a:off x="3766828" y="983989"/>
+              <a:off x="3801313" y="983989"/>
               <a:ext cx="0" cy="3188077"/>
             </a:xfrm>
             <a:custGeom>
@@ -4165,7 +4165,7 @@
           </p:nvSpPr>
           <p:spPr>
             <a:xfrm>
-              <a:off x="4116086" y="983989"/>
+              <a:off x="4153707" y="983989"/>
               <a:ext cx="0" cy="3188077"/>
             </a:xfrm>
             <a:custGeom>
@@ -4208,7 +4208,7 @@
           </p:nvSpPr>
           <p:spPr>
             <a:xfrm>
-              <a:off x="4465344" y="983989"/>
+              <a:off x="4506102" y="983989"/>
               <a:ext cx="0" cy="3188077"/>
             </a:xfrm>
             <a:custGeom>
@@ -4251,7 +4251,7 @@
           </p:nvSpPr>
           <p:spPr>
             <a:xfrm>
-              <a:off x="4814602" y="983989"/>
+              <a:off x="4858496" y="983989"/>
               <a:ext cx="0" cy="3188077"/>
             </a:xfrm>
             <a:custGeom>
@@ -4294,7 +4294,7 @@
           </p:nvSpPr>
           <p:spPr>
             <a:xfrm>
-              <a:off x="5163859" y="983989"/>
+              <a:off x="5210891" y="983989"/>
               <a:ext cx="0" cy="3188077"/>
             </a:xfrm>
             <a:custGeom>
@@ -4337,162 +4337,208 @@
           </p:nvSpPr>
           <p:spPr>
             <a:xfrm>
-              <a:off x="1671281" y="1128901"/>
-              <a:ext cx="3667206" cy="1024049"/>
+              <a:off x="5563286" y="983989"/>
+              <a:ext cx="0" cy="3188077"/>
             </a:xfrm>
             <a:custGeom>
               <a:avLst/>
               <a:pathLst>
-                <a:path w="3667206" h="1024049">
+                <a:path w="0" h="3188077">
                   <a:moveTo>
-                    <a:pt x="0" y="0"/>
+                    <a:pt x="0" y="3188077"/>
                   </a:moveTo>
                   <a:lnTo>
-                    <a:pt x="1606585" y="0"/>
-                  </a:lnTo>
-                  <a:lnTo>
-                    <a:pt x="1606585" y="9660"/>
-                  </a:lnTo>
-                  <a:lnTo>
-                    <a:pt x="1816140" y="9660"/>
-                  </a:lnTo>
-                  <a:lnTo>
-                    <a:pt x="1816140" y="57965"/>
-                  </a:lnTo>
-                  <a:lnTo>
-                    <a:pt x="1885992" y="57965"/>
-                  </a:lnTo>
-                  <a:lnTo>
-                    <a:pt x="1885992" y="96608"/>
-                  </a:lnTo>
-                  <a:lnTo>
-                    <a:pt x="2025695" y="96608"/>
-                  </a:lnTo>
-                  <a:lnTo>
-                    <a:pt x="2025695" y="106269"/>
-                  </a:lnTo>
-                  <a:lnTo>
-                    <a:pt x="2095546" y="106269"/>
-                  </a:lnTo>
-                  <a:lnTo>
-                    <a:pt x="2095546" y="135251"/>
-                  </a:lnTo>
-                  <a:lnTo>
-                    <a:pt x="2165398" y="135251"/>
-                  </a:lnTo>
-                  <a:lnTo>
-                    <a:pt x="2165398" y="173895"/>
-                  </a:lnTo>
-                  <a:lnTo>
-                    <a:pt x="2235249" y="173895"/>
-                  </a:lnTo>
-                  <a:lnTo>
-                    <a:pt x="2235249" y="251181"/>
-                  </a:lnTo>
-                  <a:lnTo>
-                    <a:pt x="2305101" y="251181"/>
-                  </a:lnTo>
-                  <a:lnTo>
-                    <a:pt x="2305101" y="309146"/>
-                  </a:lnTo>
-                  <a:lnTo>
-                    <a:pt x="2374953" y="309146"/>
-                  </a:lnTo>
-                  <a:lnTo>
-                    <a:pt x="2374953" y="367111"/>
-                  </a:lnTo>
-                  <a:lnTo>
-                    <a:pt x="2444804" y="367111"/>
-                  </a:lnTo>
-                  <a:lnTo>
-                    <a:pt x="2444804" y="444398"/>
-                  </a:lnTo>
-                  <a:lnTo>
-                    <a:pt x="2514656" y="444398"/>
-                  </a:lnTo>
-                  <a:lnTo>
-                    <a:pt x="2514656" y="550667"/>
-                  </a:lnTo>
-                  <a:lnTo>
-                    <a:pt x="2584507" y="550667"/>
-                  </a:lnTo>
-                  <a:lnTo>
-                    <a:pt x="2584507" y="627954"/>
-                  </a:lnTo>
-                  <a:lnTo>
-                    <a:pt x="2654359" y="627954"/>
-                  </a:lnTo>
-                  <a:lnTo>
-                    <a:pt x="2654359" y="656937"/>
-                  </a:lnTo>
-                  <a:lnTo>
-                    <a:pt x="2724210" y="656937"/>
-                  </a:lnTo>
-                  <a:lnTo>
-                    <a:pt x="2724210" y="695580"/>
-                  </a:lnTo>
-                  <a:lnTo>
-                    <a:pt x="2794062" y="695580"/>
-                  </a:lnTo>
-                  <a:lnTo>
-                    <a:pt x="2794062" y="753545"/>
-                  </a:lnTo>
-                  <a:lnTo>
-                    <a:pt x="2863914" y="753545"/>
-                  </a:lnTo>
-                  <a:lnTo>
-                    <a:pt x="2863914" y="772867"/>
-                  </a:lnTo>
-                  <a:lnTo>
-                    <a:pt x="3003617" y="772867"/>
-                  </a:lnTo>
-                  <a:lnTo>
-                    <a:pt x="3003617" y="792188"/>
-                  </a:lnTo>
-                  <a:lnTo>
-                    <a:pt x="3073468" y="792188"/>
-                  </a:lnTo>
-                  <a:lnTo>
-                    <a:pt x="3073468" y="811510"/>
-                  </a:lnTo>
-                  <a:lnTo>
-                    <a:pt x="3143320" y="811510"/>
-                  </a:lnTo>
-                  <a:lnTo>
-                    <a:pt x="3143320" y="869475"/>
-                  </a:lnTo>
-                  <a:lnTo>
-                    <a:pt x="3213171" y="869475"/>
-                  </a:lnTo>
-                  <a:lnTo>
-                    <a:pt x="3213171" y="879136"/>
-                  </a:lnTo>
-                  <a:lnTo>
-                    <a:pt x="3283023" y="879136"/>
-                  </a:lnTo>
-                  <a:lnTo>
-                    <a:pt x="3283023" y="917779"/>
-                  </a:lnTo>
-                  <a:lnTo>
-                    <a:pt x="3352874" y="917779"/>
-                  </a:lnTo>
-                  <a:lnTo>
-                    <a:pt x="3352874" y="975744"/>
-                  </a:lnTo>
-                  <a:lnTo>
-                    <a:pt x="3422726" y="975744"/>
-                  </a:lnTo>
-                  <a:lnTo>
-                    <a:pt x="3422726" y="1004727"/>
-                  </a:lnTo>
-                  <a:lnTo>
-                    <a:pt x="3492578" y="1004727"/>
-                  </a:lnTo>
-                  <a:lnTo>
-                    <a:pt x="3492578" y="1024049"/>
-                  </a:lnTo>
-                  <a:lnTo>
-                    <a:pt x="3667206" y="1024049"/>
+                    <a:pt x="0" y="0"/>
+                  </a:lnTo>
+                  <a:lnTo>
+                    <a:pt x="0" y="0"/>
+                  </a:lnTo>
+                </a:path>
+              </a:pathLst>
+            </a:custGeom>
+            <a:ln w="13550" cap="flat">
+              <a:solidFill>
+                <a:srgbClr val="FFFFFF">
+                  <a:alpha val="100000"/>
+                </a:srgbClr>
+              </a:solidFill>
+              <a:prstDash val="solid"/>
+              <a:round/>
+            </a:ln>
+          </p:spPr>
+          <p:txBody>
+            <a:bodyPr/>
+            <a:lstStyle/>
+            <a:p/>
+          </p:txBody>
+        </p:sp>
+        <p:sp>
+          <p:nvSpPr>
+            <p:cNvPr id="54" name="pl53"/>
+            <p:cNvSpPr/>
+            <p:nvPr/>
+          </p:nvSpPr>
+          <p:spPr>
+            <a:xfrm>
+              <a:off x="1686945" y="1128901"/>
+              <a:ext cx="3805861" cy="1033709"/>
+            </a:xfrm>
+            <a:custGeom>
+              <a:avLst/>
+              <a:pathLst>
+                <a:path w="3805861" h="1033709">
+                  <a:moveTo>
+                    <a:pt x="0" y="0"/>
+                  </a:moveTo>
+                  <a:lnTo>
+                    <a:pt x="1621014" y="0"/>
+                  </a:lnTo>
+                  <a:lnTo>
+                    <a:pt x="1621014" y="9660"/>
+                  </a:lnTo>
+                  <a:lnTo>
+                    <a:pt x="1832451" y="9660"/>
+                  </a:lnTo>
+                  <a:lnTo>
+                    <a:pt x="1832451" y="57965"/>
+                  </a:lnTo>
+                  <a:lnTo>
+                    <a:pt x="1902930" y="57965"/>
+                  </a:lnTo>
+                  <a:lnTo>
+                    <a:pt x="1902930" y="96608"/>
+                  </a:lnTo>
+                  <a:lnTo>
+                    <a:pt x="2043888" y="96608"/>
+                  </a:lnTo>
+                  <a:lnTo>
+                    <a:pt x="2043888" y="106269"/>
+                  </a:lnTo>
+                  <a:lnTo>
+                    <a:pt x="2114367" y="106269"/>
+                  </a:lnTo>
+                  <a:lnTo>
+                    <a:pt x="2114367" y="135251"/>
+                  </a:lnTo>
+                  <a:lnTo>
+                    <a:pt x="2184846" y="135251"/>
+                  </a:lnTo>
+                  <a:lnTo>
+                    <a:pt x="2184846" y="173895"/>
+                  </a:lnTo>
+                  <a:lnTo>
+                    <a:pt x="2255325" y="173895"/>
+                  </a:lnTo>
+                  <a:lnTo>
+                    <a:pt x="2255325" y="251181"/>
+                  </a:lnTo>
+                  <a:lnTo>
+                    <a:pt x="2325804" y="251181"/>
+                  </a:lnTo>
+                  <a:lnTo>
+                    <a:pt x="2325804" y="309146"/>
+                  </a:lnTo>
+                  <a:lnTo>
+                    <a:pt x="2396283" y="309146"/>
+                  </a:lnTo>
+                  <a:lnTo>
+                    <a:pt x="2396283" y="367111"/>
+                  </a:lnTo>
+                  <a:lnTo>
+                    <a:pt x="2466761" y="367111"/>
+                  </a:lnTo>
+                  <a:lnTo>
+                    <a:pt x="2466761" y="444398"/>
+                  </a:lnTo>
+                  <a:lnTo>
+                    <a:pt x="2537240" y="444398"/>
+                  </a:lnTo>
+                  <a:lnTo>
+                    <a:pt x="2537240" y="550667"/>
+                  </a:lnTo>
+                  <a:lnTo>
+                    <a:pt x="2607719" y="550667"/>
+                  </a:lnTo>
+                  <a:lnTo>
+                    <a:pt x="2607719" y="627954"/>
+                  </a:lnTo>
+                  <a:lnTo>
+                    <a:pt x="2678198" y="627954"/>
+                  </a:lnTo>
+                  <a:lnTo>
+                    <a:pt x="2678198" y="656937"/>
+                  </a:lnTo>
+                  <a:lnTo>
+                    <a:pt x="2748677" y="656937"/>
+                  </a:lnTo>
+                  <a:lnTo>
+                    <a:pt x="2748677" y="695580"/>
+                  </a:lnTo>
+                  <a:lnTo>
+                    <a:pt x="2819156" y="695580"/>
+                  </a:lnTo>
+                  <a:lnTo>
+                    <a:pt x="2819156" y="753545"/>
+                  </a:lnTo>
+                  <a:lnTo>
+                    <a:pt x="2889635" y="753545"/>
+                  </a:lnTo>
+                  <a:lnTo>
+                    <a:pt x="2889635" y="772867"/>
+                  </a:lnTo>
+                  <a:lnTo>
+                    <a:pt x="3030593" y="772867"/>
+                  </a:lnTo>
+                  <a:lnTo>
+                    <a:pt x="3030593" y="792188"/>
+                  </a:lnTo>
+                  <a:lnTo>
+                    <a:pt x="3101072" y="792188"/>
+                  </a:lnTo>
+                  <a:lnTo>
+                    <a:pt x="3101072" y="811510"/>
+                  </a:lnTo>
+                  <a:lnTo>
+                    <a:pt x="3171551" y="811510"/>
+                  </a:lnTo>
+                  <a:lnTo>
+                    <a:pt x="3171551" y="869475"/>
+                  </a:lnTo>
+                  <a:lnTo>
+                    <a:pt x="3242029" y="869475"/>
+                  </a:lnTo>
+                  <a:lnTo>
+                    <a:pt x="3242029" y="879136"/>
+                  </a:lnTo>
+                  <a:lnTo>
+                    <a:pt x="3312508" y="879136"/>
+                  </a:lnTo>
+                  <a:lnTo>
+                    <a:pt x="3312508" y="917779"/>
+                  </a:lnTo>
+                  <a:lnTo>
+                    <a:pt x="3382987" y="917779"/>
+                  </a:lnTo>
+                  <a:lnTo>
+                    <a:pt x="3382987" y="975744"/>
+                  </a:lnTo>
+                  <a:lnTo>
+                    <a:pt x="3453466" y="975744"/>
+                  </a:lnTo>
+                  <a:lnTo>
+                    <a:pt x="3453466" y="1004727"/>
+                  </a:lnTo>
+                  <a:lnTo>
+                    <a:pt x="3523945" y="1004727"/>
+                  </a:lnTo>
+                  <a:lnTo>
+                    <a:pt x="3523945" y="1024049"/>
+                  </a:lnTo>
+                  <a:lnTo>
+                    <a:pt x="3805861" y="1024049"/>
+                  </a:lnTo>
+                  <a:lnTo>
+                    <a:pt x="3805861" y="1033709"/>
                   </a:lnTo>
                 </a:path>
               </a:pathLst>
@@ -4515,19 +4561,19 @@
         </p:sp>
         <p:sp>
           <p:nvSpPr>
-            <p:cNvPr id="54" name="pl53"/>
-            <p:cNvSpPr/>
-            <p:nvPr/>
-          </p:nvSpPr>
-          <p:spPr>
-            <a:xfrm>
-              <a:off x="1671281" y="1128901"/>
-              <a:ext cx="3667206" cy="1043370"/>
+            <p:cNvPr id="55" name="pl54"/>
+            <p:cNvSpPr/>
+            <p:nvPr/>
+          </p:nvSpPr>
+          <p:spPr>
+            <a:xfrm>
+              <a:off x="1686945" y="1128901"/>
+              <a:ext cx="3805861" cy="1043370"/>
             </a:xfrm>
             <a:custGeom>
               <a:avLst/>
               <a:pathLst>
-                <a:path w="3667206" h="1043370">
+                <a:path w="3805861" h="1043370">
                   <a:moveTo>
                     <a:pt x="0" y="0"/>
                   </a:moveTo>
@@ -4538,169 +4584,172 @@
                     <a:pt x="0" y="9660"/>
                   </a:lnTo>
                   <a:lnTo>
-                    <a:pt x="279406" y="9660"/>
-                  </a:lnTo>
-                  <a:lnTo>
-                    <a:pt x="279406" y="19321"/>
-                  </a:lnTo>
-                  <a:lnTo>
-                    <a:pt x="488960" y="19321"/>
-                  </a:lnTo>
-                  <a:lnTo>
-                    <a:pt x="488960" y="28982"/>
-                  </a:lnTo>
-                  <a:lnTo>
-                    <a:pt x="1327179" y="28982"/>
-                  </a:lnTo>
-                  <a:lnTo>
-                    <a:pt x="1327179" y="38643"/>
-                  </a:lnTo>
-                  <a:lnTo>
-                    <a:pt x="1397031" y="38643"/>
-                  </a:lnTo>
-                  <a:lnTo>
-                    <a:pt x="1397031" y="57965"/>
-                  </a:lnTo>
-                  <a:lnTo>
-                    <a:pt x="1466882" y="57965"/>
-                  </a:lnTo>
-                  <a:lnTo>
-                    <a:pt x="1466882" y="67625"/>
-                  </a:lnTo>
-                  <a:lnTo>
-                    <a:pt x="1536734" y="67625"/>
-                  </a:lnTo>
-                  <a:lnTo>
-                    <a:pt x="1536734" y="86947"/>
-                  </a:lnTo>
-                  <a:lnTo>
-                    <a:pt x="1676437" y="86947"/>
-                  </a:lnTo>
-                  <a:lnTo>
-                    <a:pt x="1676437" y="106269"/>
-                  </a:lnTo>
-                  <a:lnTo>
-                    <a:pt x="1746289" y="106269"/>
-                  </a:lnTo>
-                  <a:lnTo>
-                    <a:pt x="1746289" y="125590"/>
-                  </a:lnTo>
-                  <a:lnTo>
-                    <a:pt x="1816140" y="125590"/>
-                  </a:lnTo>
-                  <a:lnTo>
-                    <a:pt x="1816140" y="164234"/>
-                  </a:lnTo>
-                  <a:lnTo>
-                    <a:pt x="1885992" y="164234"/>
-                  </a:lnTo>
-                  <a:lnTo>
-                    <a:pt x="1885992" y="241521"/>
-                  </a:lnTo>
-                  <a:lnTo>
-                    <a:pt x="1955843" y="241521"/>
-                  </a:lnTo>
-                  <a:lnTo>
-                    <a:pt x="1955843" y="280164"/>
-                  </a:lnTo>
-                  <a:lnTo>
-                    <a:pt x="2025695" y="280164"/>
-                  </a:lnTo>
-                  <a:lnTo>
-                    <a:pt x="2025695" y="357451"/>
-                  </a:lnTo>
-                  <a:lnTo>
-                    <a:pt x="2095546" y="357451"/>
-                  </a:lnTo>
-                  <a:lnTo>
-                    <a:pt x="2095546" y="502363"/>
-                  </a:lnTo>
-                  <a:lnTo>
-                    <a:pt x="2165398" y="502363"/>
-                  </a:lnTo>
-                  <a:lnTo>
-                    <a:pt x="2165398" y="560328"/>
-                  </a:lnTo>
-                  <a:lnTo>
-                    <a:pt x="2235249" y="560328"/>
-                  </a:lnTo>
-                  <a:lnTo>
-                    <a:pt x="2235249" y="589311"/>
-                  </a:lnTo>
-                  <a:lnTo>
-                    <a:pt x="2305101" y="589311"/>
-                  </a:lnTo>
-                  <a:lnTo>
-                    <a:pt x="2305101" y="676258"/>
-                  </a:lnTo>
-                  <a:lnTo>
-                    <a:pt x="2374953" y="676258"/>
-                  </a:lnTo>
-                  <a:lnTo>
-                    <a:pt x="2374953" y="734223"/>
-                  </a:lnTo>
-                  <a:lnTo>
-                    <a:pt x="2444804" y="734223"/>
-                  </a:lnTo>
-                  <a:lnTo>
-                    <a:pt x="2444804" y="811510"/>
-                  </a:lnTo>
-                  <a:lnTo>
-                    <a:pt x="2514656" y="811510"/>
-                  </a:lnTo>
-                  <a:lnTo>
-                    <a:pt x="2514656" y="850154"/>
-                  </a:lnTo>
-                  <a:lnTo>
-                    <a:pt x="2584507" y="850154"/>
-                  </a:lnTo>
-                  <a:lnTo>
-                    <a:pt x="2584507" y="908119"/>
-                  </a:lnTo>
-                  <a:lnTo>
-                    <a:pt x="2654359" y="908119"/>
-                  </a:lnTo>
-                  <a:lnTo>
-                    <a:pt x="2654359" y="937101"/>
-                  </a:lnTo>
-                  <a:lnTo>
-                    <a:pt x="2794062" y="937101"/>
-                  </a:lnTo>
-                  <a:lnTo>
-                    <a:pt x="2794062" y="966084"/>
-                  </a:lnTo>
-                  <a:lnTo>
-                    <a:pt x="2863914" y="966084"/>
-                  </a:lnTo>
-                  <a:lnTo>
-                    <a:pt x="2863914" y="985405"/>
-                  </a:lnTo>
-                  <a:lnTo>
-                    <a:pt x="2933765" y="985405"/>
-                  </a:lnTo>
-                  <a:lnTo>
-                    <a:pt x="2933765" y="995066"/>
-                  </a:lnTo>
-                  <a:lnTo>
-                    <a:pt x="3003617" y="995066"/>
-                  </a:lnTo>
-                  <a:lnTo>
-                    <a:pt x="3003617" y="1024049"/>
-                  </a:lnTo>
-                  <a:lnTo>
-                    <a:pt x="3352874" y="1024049"/>
-                  </a:lnTo>
-                  <a:lnTo>
-                    <a:pt x="3352874" y="1033709"/>
-                  </a:lnTo>
-                  <a:lnTo>
-                    <a:pt x="3422726" y="1033709"/>
-                  </a:lnTo>
-                  <a:lnTo>
-                    <a:pt x="3422726" y="1043370"/>
-                  </a:lnTo>
-                  <a:lnTo>
-                    <a:pt x="3667206" y="1043370"/>
+                    <a:pt x="281915" y="9660"/>
+                  </a:lnTo>
+                  <a:lnTo>
+                    <a:pt x="281915" y="19321"/>
+                  </a:lnTo>
+                  <a:lnTo>
+                    <a:pt x="493352" y="19321"/>
+                  </a:lnTo>
+                  <a:lnTo>
+                    <a:pt x="493352" y="28982"/>
+                  </a:lnTo>
+                  <a:lnTo>
+                    <a:pt x="1339099" y="28982"/>
+                  </a:lnTo>
+                  <a:lnTo>
+                    <a:pt x="1339099" y="38643"/>
+                  </a:lnTo>
+                  <a:lnTo>
+                    <a:pt x="1409578" y="38643"/>
+                  </a:lnTo>
+                  <a:lnTo>
+                    <a:pt x="1409578" y="57965"/>
+                  </a:lnTo>
+                  <a:lnTo>
+                    <a:pt x="1480057" y="57965"/>
+                  </a:lnTo>
+                  <a:lnTo>
+                    <a:pt x="1480057" y="67625"/>
+                  </a:lnTo>
+                  <a:lnTo>
+                    <a:pt x="1550536" y="67625"/>
+                  </a:lnTo>
+                  <a:lnTo>
+                    <a:pt x="1550536" y="86947"/>
+                  </a:lnTo>
+                  <a:lnTo>
+                    <a:pt x="1691493" y="86947"/>
+                  </a:lnTo>
+                  <a:lnTo>
+                    <a:pt x="1691493" y="106269"/>
+                  </a:lnTo>
+                  <a:lnTo>
+                    <a:pt x="1761972" y="106269"/>
+                  </a:lnTo>
+                  <a:lnTo>
+                    <a:pt x="1761972" y="125590"/>
+                  </a:lnTo>
+                  <a:lnTo>
+                    <a:pt x="1832451" y="125590"/>
+                  </a:lnTo>
+                  <a:lnTo>
+                    <a:pt x="1832451" y="164234"/>
+                  </a:lnTo>
+                  <a:lnTo>
+                    <a:pt x="1902930" y="164234"/>
+                  </a:lnTo>
+                  <a:lnTo>
+                    <a:pt x="1902930" y="241521"/>
+                  </a:lnTo>
+                  <a:lnTo>
+                    <a:pt x="1973409" y="241521"/>
+                  </a:lnTo>
+                  <a:lnTo>
+                    <a:pt x="1973409" y="280164"/>
+                  </a:lnTo>
+                  <a:lnTo>
+                    <a:pt x="2043888" y="280164"/>
+                  </a:lnTo>
+                  <a:lnTo>
+                    <a:pt x="2043888" y="357451"/>
+                  </a:lnTo>
+                  <a:lnTo>
+                    <a:pt x="2114367" y="357451"/>
+                  </a:lnTo>
+                  <a:lnTo>
+                    <a:pt x="2114367" y="502363"/>
+                  </a:lnTo>
+                  <a:lnTo>
+                    <a:pt x="2184846" y="502363"/>
+                  </a:lnTo>
+                  <a:lnTo>
+                    <a:pt x="2184846" y="560328"/>
+                  </a:lnTo>
+                  <a:lnTo>
+                    <a:pt x="2255325" y="560328"/>
+                  </a:lnTo>
+                  <a:lnTo>
+                    <a:pt x="2255325" y="589311"/>
+                  </a:lnTo>
+                  <a:lnTo>
+                    <a:pt x="2325804" y="589311"/>
+                  </a:lnTo>
+                  <a:lnTo>
+                    <a:pt x="2325804" y="676258"/>
+                  </a:lnTo>
+                  <a:lnTo>
+                    <a:pt x="2396283" y="676258"/>
+                  </a:lnTo>
+                  <a:lnTo>
+                    <a:pt x="2396283" y="734223"/>
+                  </a:lnTo>
+                  <a:lnTo>
+                    <a:pt x="2466761" y="734223"/>
+                  </a:lnTo>
+                  <a:lnTo>
+                    <a:pt x="2466761" y="811510"/>
+                  </a:lnTo>
+                  <a:lnTo>
+                    <a:pt x="2537240" y="811510"/>
+                  </a:lnTo>
+                  <a:lnTo>
+                    <a:pt x="2537240" y="850154"/>
+                  </a:lnTo>
+                  <a:lnTo>
+                    <a:pt x="2607719" y="850154"/>
+                  </a:lnTo>
+                  <a:lnTo>
+                    <a:pt x="2607719" y="908119"/>
+                  </a:lnTo>
+                  <a:lnTo>
+                    <a:pt x="2678198" y="908119"/>
+                  </a:lnTo>
+                  <a:lnTo>
+                    <a:pt x="2678198" y="937101"/>
+                  </a:lnTo>
+                  <a:lnTo>
+                    <a:pt x="2819156" y="937101"/>
+                  </a:lnTo>
+                  <a:lnTo>
+                    <a:pt x="2819156" y="966084"/>
+                  </a:lnTo>
+                  <a:lnTo>
+                    <a:pt x="2889635" y="966084"/>
+                  </a:lnTo>
+                  <a:lnTo>
+                    <a:pt x="2889635" y="985405"/>
+                  </a:lnTo>
+                  <a:lnTo>
+                    <a:pt x="2960114" y="985405"/>
+                  </a:lnTo>
+                  <a:lnTo>
+                    <a:pt x="2960114" y="995066"/>
+                  </a:lnTo>
+                  <a:lnTo>
+                    <a:pt x="3030593" y="995066"/>
+                  </a:lnTo>
+                  <a:lnTo>
+                    <a:pt x="3030593" y="1024049"/>
+                  </a:lnTo>
+                  <a:lnTo>
+                    <a:pt x="3382987" y="1024049"/>
+                  </a:lnTo>
+                  <a:lnTo>
+                    <a:pt x="3382987" y="1033709"/>
+                  </a:lnTo>
+                  <a:lnTo>
+                    <a:pt x="3453466" y="1033709"/>
+                  </a:lnTo>
+                  <a:lnTo>
+                    <a:pt x="3453466" y="1043370"/>
+                  </a:lnTo>
+                  <a:lnTo>
+                    <a:pt x="3805861" y="1043370"/>
+                  </a:lnTo>
+                  <a:lnTo>
+                    <a:pt x="3805861" y="1043370"/>
                   </a:lnTo>
                 </a:path>
               </a:pathLst>
@@ -4723,174 +4772,177 @@
         </p:sp>
         <p:sp>
           <p:nvSpPr>
-            <p:cNvPr id="55" name="pl54"/>
-            <p:cNvSpPr/>
-            <p:nvPr/>
-          </p:nvSpPr>
-          <p:spPr>
-            <a:xfrm>
-              <a:off x="1671281" y="1128901"/>
-              <a:ext cx="3667206" cy="850154"/>
+            <p:cNvPr id="56" name="pl55"/>
+            <p:cNvSpPr/>
+            <p:nvPr/>
+          </p:nvSpPr>
+          <p:spPr>
+            <a:xfrm>
+              <a:off x="1686945" y="1128901"/>
+              <a:ext cx="3805861" cy="850154"/>
             </a:xfrm>
             <a:custGeom>
               <a:avLst/>
               <a:pathLst>
-                <a:path w="3667206" h="850154">
+                <a:path w="3805861" h="850154">
                   <a:moveTo>
                     <a:pt x="0" y="0"/>
                   </a:moveTo>
                   <a:lnTo>
-                    <a:pt x="1397031" y="0"/>
-                  </a:lnTo>
-                  <a:lnTo>
-                    <a:pt x="1397031" y="9660"/>
-                  </a:lnTo>
-                  <a:lnTo>
-                    <a:pt x="1536734" y="9660"/>
-                  </a:lnTo>
-                  <a:lnTo>
-                    <a:pt x="1536734" y="19321"/>
-                  </a:lnTo>
-                  <a:lnTo>
-                    <a:pt x="1676437" y="19321"/>
-                  </a:lnTo>
-                  <a:lnTo>
-                    <a:pt x="1676437" y="28982"/>
-                  </a:lnTo>
-                  <a:lnTo>
-                    <a:pt x="1816140" y="28982"/>
-                  </a:lnTo>
-                  <a:lnTo>
-                    <a:pt x="1816140" y="48304"/>
-                  </a:lnTo>
-                  <a:lnTo>
-                    <a:pt x="1885992" y="48304"/>
-                  </a:lnTo>
-                  <a:lnTo>
-                    <a:pt x="1885992" y="77286"/>
-                  </a:lnTo>
-                  <a:lnTo>
-                    <a:pt x="1955843" y="77286"/>
-                  </a:lnTo>
-                  <a:lnTo>
-                    <a:pt x="1955843" y="106269"/>
-                  </a:lnTo>
-                  <a:lnTo>
-                    <a:pt x="2025695" y="106269"/>
-                  </a:lnTo>
-                  <a:lnTo>
-                    <a:pt x="2025695" y="125590"/>
-                  </a:lnTo>
-                  <a:lnTo>
-                    <a:pt x="2095546" y="125590"/>
-                  </a:lnTo>
-                  <a:lnTo>
-                    <a:pt x="2095546" y="173895"/>
-                  </a:lnTo>
-                  <a:lnTo>
-                    <a:pt x="2165398" y="173895"/>
-                  </a:lnTo>
-                  <a:lnTo>
-                    <a:pt x="2165398" y="241521"/>
-                  </a:lnTo>
-                  <a:lnTo>
-                    <a:pt x="2235249" y="241521"/>
-                  </a:lnTo>
-                  <a:lnTo>
-                    <a:pt x="2235249" y="260842"/>
-                  </a:lnTo>
-                  <a:lnTo>
-                    <a:pt x="2305101" y="260842"/>
-                  </a:lnTo>
-                  <a:lnTo>
-                    <a:pt x="2305101" y="367111"/>
-                  </a:lnTo>
-                  <a:lnTo>
-                    <a:pt x="2374953" y="367111"/>
-                  </a:lnTo>
-                  <a:lnTo>
-                    <a:pt x="2374953" y="444398"/>
-                  </a:lnTo>
-                  <a:lnTo>
-                    <a:pt x="2444804" y="444398"/>
-                  </a:lnTo>
-                  <a:lnTo>
-                    <a:pt x="2444804" y="541007"/>
-                  </a:lnTo>
-                  <a:lnTo>
-                    <a:pt x="2514656" y="541007"/>
-                  </a:lnTo>
-                  <a:lnTo>
-                    <a:pt x="2514656" y="598972"/>
-                  </a:lnTo>
-                  <a:lnTo>
-                    <a:pt x="2584507" y="598972"/>
-                  </a:lnTo>
-                  <a:lnTo>
-                    <a:pt x="2584507" y="656937"/>
-                  </a:lnTo>
-                  <a:lnTo>
-                    <a:pt x="2654359" y="656937"/>
-                  </a:lnTo>
-                  <a:lnTo>
-                    <a:pt x="2654359" y="695580"/>
-                  </a:lnTo>
-                  <a:lnTo>
-                    <a:pt x="2724210" y="695580"/>
-                  </a:lnTo>
-                  <a:lnTo>
-                    <a:pt x="2724210" y="724563"/>
-                  </a:lnTo>
-                  <a:lnTo>
-                    <a:pt x="2794062" y="724563"/>
-                  </a:lnTo>
-                  <a:lnTo>
-                    <a:pt x="2794062" y="734223"/>
-                  </a:lnTo>
-                  <a:lnTo>
-                    <a:pt x="2863914" y="734223"/>
-                  </a:lnTo>
-                  <a:lnTo>
-                    <a:pt x="2863914" y="763206"/>
-                  </a:lnTo>
-                  <a:lnTo>
-                    <a:pt x="3003617" y="763206"/>
-                  </a:lnTo>
-                  <a:lnTo>
-                    <a:pt x="3003617" y="772867"/>
-                  </a:lnTo>
-                  <a:lnTo>
-                    <a:pt x="3073468" y="772867"/>
-                  </a:lnTo>
-                  <a:lnTo>
-                    <a:pt x="3073468" y="782528"/>
-                  </a:lnTo>
-                  <a:lnTo>
-                    <a:pt x="3143320" y="782528"/>
-                  </a:lnTo>
-                  <a:lnTo>
-                    <a:pt x="3143320" y="811510"/>
-                  </a:lnTo>
-                  <a:lnTo>
-                    <a:pt x="3352874" y="811510"/>
-                  </a:lnTo>
-                  <a:lnTo>
-                    <a:pt x="3352874" y="821171"/>
-                  </a:lnTo>
-                  <a:lnTo>
-                    <a:pt x="3422726" y="821171"/>
-                  </a:lnTo>
-                  <a:lnTo>
-                    <a:pt x="3422726" y="840493"/>
-                  </a:lnTo>
-                  <a:lnTo>
-                    <a:pt x="3562429" y="840493"/>
-                  </a:lnTo>
-                  <a:lnTo>
-                    <a:pt x="3562429" y="850154"/>
-                  </a:lnTo>
-                  <a:lnTo>
-                    <a:pt x="3667206" y="850154"/>
+                    <a:pt x="1409578" y="0"/>
+                  </a:lnTo>
+                  <a:lnTo>
+                    <a:pt x="1409578" y="9660"/>
+                  </a:lnTo>
+                  <a:lnTo>
+                    <a:pt x="1550536" y="9660"/>
+                  </a:lnTo>
+                  <a:lnTo>
+                    <a:pt x="1550536" y="19321"/>
+                  </a:lnTo>
+                  <a:lnTo>
+                    <a:pt x="1691493" y="19321"/>
+                  </a:lnTo>
+                  <a:lnTo>
+                    <a:pt x="1691493" y="28982"/>
+                  </a:lnTo>
+                  <a:lnTo>
+                    <a:pt x="1832451" y="28982"/>
+                  </a:lnTo>
+                  <a:lnTo>
+                    <a:pt x="1832451" y="48304"/>
+                  </a:lnTo>
+                  <a:lnTo>
+                    <a:pt x="1902930" y="48304"/>
+                  </a:lnTo>
+                  <a:lnTo>
+                    <a:pt x="1902930" y="77286"/>
+                  </a:lnTo>
+                  <a:lnTo>
+                    <a:pt x="1973409" y="77286"/>
+                  </a:lnTo>
+                  <a:lnTo>
+                    <a:pt x="1973409" y="106269"/>
+                  </a:lnTo>
+                  <a:lnTo>
+                    <a:pt x="2043888" y="106269"/>
+                  </a:lnTo>
+                  <a:lnTo>
+                    <a:pt x="2043888" y="125590"/>
+                  </a:lnTo>
+                  <a:lnTo>
+                    <a:pt x="2114367" y="125590"/>
+                  </a:lnTo>
+                  <a:lnTo>
+                    <a:pt x="2114367" y="173895"/>
+                  </a:lnTo>
+                  <a:lnTo>
+                    <a:pt x="2184846" y="173895"/>
+                  </a:lnTo>
+                  <a:lnTo>
+                    <a:pt x="2184846" y="241521"/>
+                  </a:lnTo>
+                  <a:lnTo>
+                    <a:pt x="2255325" y="241521"/>
+                  </a:lnTo>
+                  <a:lnTo>
+                    <a:pt x="2255325" y="260842"/>
+                  </a:lnTo>
+                  <a:lnTo>
+                    <a:pt x="2325804" y="260842"/>
+                  </a:lnTo>
+                  <a:lnTo>
+                    <a:pt x="2325804" y="367111"/>
+                  </a:lnTo>
+                  <a:lnTo>
+                    <a:pt x="2396283" y="367111"/>
+                  </a:lnTo>
+                  <a:lnTo>
+                    <a:pt x="2396283" y="444398"/>
+                  </a:lnTo>
+                  <a:lnTo>
+                    <a:pt x="2466761" y="444398"/>
+                  </a:lnTo>
+                  <a:lnTo>
+                    <a:pt x="2466761" y="541007"/>
+                  </a:lnTo>
+                  <a:lnTo>
+                    <a:pt x="2537240" y="541007"/>
+                  </a:lnTo>
+                  <a:lnTo>
+                    <a:pt x="2537240" y="598972"/>
+                  </a:lnTo>
+                  <a:lnTo>
+                    <a:pt x="2607719" y="598972"/>
+                  </a:lnTo>
+                  <a:lnTo>
+                    <a:pt x="2607719" y="656937"/>
+                  </a:lnTo>
+                  <a:lnTo>
+                    <a:pt x="2678198" y="656937"/>
+                  </a:lnTo>
+                  <a:lnTo>
+                    <a:pt x="2678198" y="695580"/>
+                  </a:lnTo>
+                  <a:lnTo>
+                    <a:pt x="2748677" y="695580"/>
+                  </a:lnTo>
+                  <a:lnTo>
+                    <a:pt x="2748677" y="724563"/>
+                  </a:lnTo>
+                  <a:lnTo>
+                    <a:pt x="2819156" y="724563"/>
+                  </a:lnTo>
+                  <a:lnTo>
+                    <a:pt x="2819156" y="734223"/>
+                  </a:lnTo>
+                  <a:lnTo>
+                    <a:pt x="2889635" y="734223"/>
+                  </a:lnTo>
+                  <a:lnTo>
+                    <a:pt x="2889635" y="763206"/>
+                  </a:lnTo>
+                  <a:lnTo>
+                    <a:pt x="3030593" y="763206"/>
+                  </a:lnTo>
+                  <a:lnTo>
+                    <a:pt x="3030593" y="772867"/>
+                  </a:lnTo>
+                  <a:lnTo>
+                    <a:pt x="3101072" y="772867"/>
+                  </a:lnTo>
+                  <a:lnTo>
+                    <a:pt x="3101072" y="782528"/>
+                  </a:lnTo>
+                  <a:lnTo>
+                    <a:pt x="3171551" y="782528"/>
+                  </a:lnTo>
+                  <a:lnTo>
+                    <a:pt x="3171551" y="811510"/>
+                  </a:lnTo>
+                  <a:lnTo>
+                    <a:pt x="3382987" y="811510"/>
+                  </a:lnTo>
+                  <a:lnTo>
+                    <a:pt x="3382987" y="821171"/>
+                  </a:lnTo>
+                  <a:lnTo>
+                    <a:pt x="3453466" y="821171"/>
+                  </a:lnTo>
+                  <a:lnTo>
+                    <a:pt x="3453466" y="840493"/>
+                  </a:lnTo>
+                  <a:lnTo>
+                    <a:pt x="3594424" y="840493"/>
+                  </a:lnTo>
+                  <a:lnTo>
+                    <a:pt x="3594424" y="850154"/>
+                  </a:lnTo>
+                  <a:lnTo>
+                    <a:pt x="3805861" y="850154"/>
+                  </a:lnTo>
+                  <a:lnTo>
+                    <a:pt x="3805861" y="850154"/>
                   </a:lnTo>
                 </a:path>
               </a:pathLst>
@@ -4913,174 +4965,177 @@
         </p:sp>
         <p:sp>
           <p:nvSpPr>
-            <p:cNvPr id="56" name="pl55"/>
-            <p:cNvSpPr/>
-            <p:nvPr/>
-          </p:nvSpPr>
-          <p:spPr>
-            <a:xfrm>
-              <a:off x="1671281" y="1128901"/>
-              <a:ext cx="3667206" cy="917779"/>
+            <p:cNvPr id="57" name="pl56"/>
+            <p:cNvSpPr/>
+            <p:nvPr/>
+          </p:nvSpPr>
+          <p:spPr>
+            <a:xfrm>
+              <a:off x="1686945" y="1128901"/>
+              <a:ext cx="3805861" cy="927440"/>
             </a:xfrm>
             <a:custGeom>
               <a:avLst/>
               <a:pathLst>
-                <a:path w="3667206" h="917779">
+                <a:path w="3805861" h="927440">
                   <a:moveTo>
                     <a:pt x="0" y="0"/>
                   </a:moveTo>
                   <a:lnTo>
-                    <a:pt x="1327179" y="0"/>
-                  </a:lnTo>
-                  <a:lnTo>
-                    <a:pt x="1327179" y="9660"/>
-                  </a:lnTo>
-                  <a:lnTo>
-                    <a:pt x="1466882" y="9660"/>
-                  </a:lnTo>
-                  <a:lnTo>
-                    <a:pt x="1466882" y="19321"/>
-                  </a:lnTo>
-                  <a:lnTo>
-                    <a:pt x="1536734" y="19321"/>
-                  </a:lnTo>
-                  <a:lnTo>
-                    <a:pt x="1536734" y="28982"/>
-                  </a:lnTo>
-                  <a:lnTo>
-                    <a:pt x="1746289" y="28982"/>
-                  </a:lnTo>
-                  <a:lnTo>
-                    <a:pt x="1746289" y="38643"/>
-                  </a:lnTo>
-                  <a:lnTo>
-                    <a:pt x="1816140" y="38643"/>
-                  </a:lnTo>
-                  <a:lnTo>
-                    <a:pt x="1816140" y="57965"/>
-                  </a:lnTo>
-                  <a:lnTo>
-                    <a:pt x="1885992" y="57965"/>
-                  </a:lnTo>
-                  <a:lnTo>
-                    <a:pt x="1885992" y="77286"/>
-                  </a:lnTo>
-                  <a:lnTo>
-                    <a:pt x="1955843" y="77286"/>
-                  </a:lnTo>
-                  <a:lnTo>
-                    <a:pt x="1955843" y="86947"/>
-                  </a:lnTo>
-                  <a:lnTo>
-                    <a:pt x="2025695" y="86947"/>
-                  </a:lnTo>
-                  <a:lnTo>
-                    <a:pt x="2025695" y="154573"/>
-                  </a:lnTo>
-                  <a:lnTo>
-                    <a:pt x="2095546" y="154573"/>
-                  </a:lnTo>
-                  <a:lnTo>
-                    <a:pt x="2095546" y="222199"/>
-                  </a:lnTo>
-                  <a:lnTo>
-                    <a:pt x="2165398" y="222199"/>
-                  </a:lnTo>
-                  <a:lnTo>
-                    <a:pt x="2165398" y="318807"/>
-                  </a:lnTo>
-                  <a:lnTo>
-                    <a:pt x="2235249" y="318807"/>
-                  </a:lnTo>
-                  <a:lnTo>
-                    <a:pt x="2235249" y="357451"/>
-                  </a:lnTo>
-                  <a:lnTo>
-                    <a:pt x="2305101" y="357451"/>
-                  </a:lnTo>
-                  <a:lnTo>
-                    <a:pt x="2305101" y="386433"/>
-                  </a:lnTo>
-                  <a:lnTo>
-                    <a:pt x="2374953" y="386433"/>
-                  </a:lnTo>
-                  <a:lnTo>
-                    <a:pt x="2374953" y="454059"/>
-                  </a:lnTo>
-                  <a:lnTo>
-                    <a:pt x="2444804" y="454059"/>
-                  </a:lnTo>
-                  <a:lnTo>
-                    <a:pt x="2444804" y="579650"/>
-                  </a:lnTo>
-                  <a:lnTo>
-                    <a:pt x="2514656" y="579650"/>
-                  </a:lnTo>
-                  <a:lnTo>
-                    <a:pt x="2514656" y="656937"/>
-                  </a:lnTo>
-                  <a:lnTo>
-                    <a:pt x="2584507" y="656937"/>
-                  </a:lnTo>
-                  <a:lnTo>
-                    <a:pt x="2584507" y="695580"/>
-                  </a:lnTo>
-                  <a:lnTo>
-                    <a:pt x="2654359" y="695580"/>
-                  </a:lnTo>
-                  <a:lnTo>
-                    <a:pt x="2654359" y="763206"/>
-                  </a:lnTo>
-                  <a:lnTo>
-                    <a:pt x="2724210" y="763206"/>
-                  </a:lnTo>
-                  <a:lnTo>
-                    <a:pt x="2724210" y="811510"/>
-                  </a:lnTo>
-                  <a:lnTo>
-                    <a:pt x="2794062" y="811510"/>
-                  </a:lnTo>
-                  <a:lnTo>
-                    <a:pt x="2794062" y="830832"/>
-                  </a:lnTo>
-                  <a:lnTo>
-                    <a:pt x="2933765" y="830832"/>
-                  </a:lnTo>
-                  <a:lnTo>
-                    <a:pt x="2933765" y="840493"/>
-                  </a:lnTo>
-                  <a:lnTo>
-                    <a:pt x="3143320" y="840493"/>
-                  </a:lnTo>
-                  <a:lnTo>
-                    <a:pt x="3143320" y="859814"/>
-                  </a:lnTo>
-                  <a:lnTo>
-                    <a:pt x="3213171" y="859814"/>
-                  </a:lnTo>
-                  <a:lnTo>
-                    <a:pt x="3213171" y="869475"/>
-                  </a:lnTo>
-                  <a:lnTo>
-                    <a:pt x="3283023" y="869475"/>
-                  </a:lnTo>
-                  <a:lnTo>
-                    <a:pt x="3283023" y="888797"/>
-                  </a:lnTo>
-                  <a:lnTo>
-                    <a:pt x="3352874" y="888797"/>
-                  </a:lnTo>
-                  <a:lnTo>
-                    <a:pt x="3352874" y="908119"/>
-                  </a:lnTo>
-                  <a:lnTo>
-                    <a:pt x="3562429" y="908119"/>
-                  </a:lnTo>
-                  <a:lnTo>
-                    <a:pt x="3562429" y="917779"/>
-                  </a:lnTo>
-                  <a:lnTo>
-                    <a:pt x="3667206" y="917779"/>
+                    <a:pt x="1339099" y="0"/>
+                  </a:lnTo>
+                  <a:lnTo>
+                    <a:pt x="1339099" y="9660"/>
+                  </a:lnTo>
+                  <a:lnTo>
+                    <a:pt x="1480057" y="9660"/>
+                  </a:lnTo>
+                  <a:lnTo>
+                    <a:pt x="1480057" y="19321"/>
+                  </a:lnTo>
+                  <a:lnTo>
+                    <a:pt x="1550536" y="19321"/>
+                  </a:lnTo>
+                  <a:lnTo>
+                    <a:pt x="1550536" y="28982"/>
+                  </a:lnTo>
+                  <a:lnTo>
+                    <a:pt x="1761972" y="28982"/>
+                  </a:lnTo>
+                  <a:lnTo>
+                    <a:pt x="1761972" y="38643"/>
+                  </a:lnTo>
+                  <a:lnTo>
+                    <a:pt x="1832451" y="38643"/>
+                  </a:lnTo>
+                  <a:lnTo>
+                    <a:pt x="1832451" y="57965"/>
+                  </a:lnTo>
+                  <a:lnTo>
+                    <a:pt x="1902930" y="57965"/>
+                  </a:lnTo>
+                  <a:lnTo>
+                    <a:pt x="1902930" y="77286"/>
+                  </a:lnTo>
+                  <a:lnTo>
+                    <a:pt x="1973409" y="77286"/>
+                  </a:lnTo>
+                  <a:lnTo>
+                    <a:pt x="1973409" y="86947"/>
+                  </a:lnTo>
+                  <a:lnTo>
+                    <a:pt x="2043888" y="86947"/>
+                  </a:lnTo>
+                  <a:lnTo>
+                    <a:pt x="2043888" y="154573"/>
+                  </a:lnTo>
+                  <a:lnTo>
+                    <a:pt x="2114367" y="154573"/>
+                  </a:lnTo>
+                  <a:lnTo>
+                    <a:pt x="2114367" y="222199"/>
+                  </a:lnTo>
+                  <a:lnTo>
+                    <a:pt x="2184846" y="222199"/>
+                  </a:lnTo>
+                  <a:lnTo>
+                    <a:pt x="2184846" y="318807"/>
+                  </a:lnTo>
+                  <a:lnTo>
+                    <a:pt x="2255325" y="318807"/>
+                  </a:lnTo>
+                  <a:lnTo>
+                    <a:pt x="2255325" y="357451"/>
+                  </a:lnTo>
+                  <a:lnTo>
+                    <a:pt x="2325804" y="357451"/>
+                  </a:lnTo>
+                  <a:lnTo>
+                    <a:pt x="2325804" y="386433"/>
+                  </a:lnTo>
+                  <a:lnTo>
+                    <a:pt x="2396283" y="386433"/>
+                  </a:lnTo>
+                  <a:lnTo>
+                    <a:pt x="2396283" y="454059"/>
+                  </a:lnTo>
+                  <a:lnTo>
+                    <a:pt x="2466761" y="454059"/>
+                  </a:lnTo>
+                  <a:lnTo>
+                    <a:pt x="2466761" y="579650"/>
+                  </a:lnTo>
+                  <a:lnTo>
+                    <a:pt x="2537240" y="579650"/>
+                  </a:lnTo>
+                  <a:lnTo>
+                    <a:pt x="2537240" y="656937"/>
+                  </a:lnTo>
+                  <a:lnTo>
+                    <a:pt x="2607719" y="656937"/>
+                  </a:lnTo>
+                  <a:lnTo>
+                    <a:pt x="2607719" y="695580"/>
+                  </a:lnTo>
+                  <a:lnTo>
+                    <a:pt x="2678198" y="695580"/>
+                  </a:lnTo>
+                  <a:lnTo>
+                    <a:pt x="2678198" y="763206"/>
+                  </a:lnTo>
+                  <a:lnTo>
+                    <a:pt x="2748677" y="763206"/>
+                  </a:lnTo>
+                  <a:lnTo>
+                    <a:pt x="2748677" y="811510"/>
+                  </a:lnTo>
+                  <a:lnTo>
+                    <a:pt x="2819156" y="811510"/>
+                  </a:lnTo>
+                  <a:lnTo>
+                    <a:pt x="2819156" y="830832"/>
+                  </a:lnTo>
+                  <a:lnTo>
+                    <a:pt x="2960114" y="830832"/>
+                  </a:lnTo>
+                  <a:lnTo>
+                    <a:pt x="2960114" y="840493"/>
+                  </a:lnTo>
+                  <a:lnTo>
+                    <a:pt x="3171551" y="840493"/>
+                  </a:lnTo>
+                  <a:lnTo>
+                    <a:pt x="3171551" y="859814"/>
+                  </a:lnTo>
+                  <a:lnTo>
+                    <a:pt x="3242029" y="859814"/>
+                  </a:lnTo>
+                  <a:lnTo>
+                    <a:pt x="3242029" y="869475"/>
+                  </a:lnTo>
+                  <a:lnTo>
+                    <a:pt x="3312508" y="869475"/>
+                  </a:lnTo>
+                  <a:lnTo>
+                    <a:pt x="3312508" y="888797"/>
+                  </a:lnTo>
+                  <a:lnTo>
+                    <a:pt x="3382987" y="888797"/>
+                  </a:lnTo>
+                  <a:lnTo>
+                    <a:pt x="3382987" y="908119"/>
+                  </a:lnTo>
+                  <a:lnTo>
+                    <a:pt x="3594424" y="908119"/>
+                  </a:lnTo>
+                  <a:lnTo>
+                    <a:pt x="3594424" y="917779"/>
+                  </a:lnTo>
+                  <a:lnTo>
+                    <a:pt x="3805861" y="917779"/>
+                  </a:lnTo>
+                  <a:lnTo>
+                    <a:pt x="3805861" y="927440"/>
                   </a:lnTo>
                 </a:path>
               </a:pathLst>
@@ -5103,13 +5158,13 @@
         </p:sp>
         <p:sp>
           <p:nvSpPr>
-            <p:cNvPr id="57" name="tx56"/>
-            <p:cNvSpPr/>
-            <p:nvPr/>
-          </p:nvSpPr>
-          <p:spPr>
-            <a:xfrm>
-              <a:off x="5392282" y="2141510"/>
+            <p:cNvPr id="58" name="tx57"/>
+            <p:cNvSpPr/>
+            <p:nvPr/>
+          </p:nvSpPr>
+          <p:spPr>
+            <a:xfrm>
+              <a:off x="5441823" y="2141510"/>
               <a:ext cx="101968" cy="82614"/>
             </a:xfrm>
             <a:prstGeom prst="rect">
@@ -5149,13 +5204,13 @@
         </p:sp>
         <p:sp>
           <p:nvSpPr>
-            <p:cNvPr id="58" name="tx57"/>
-            <p:cNvSpPr/>
-            <p:nvPr/>
-          </p:nvSpPr>
-          <p:spPr>
-            <a:xfrm>
-              <a:off x="5392282" y="2151171"/>
+            <p:cNvPr id="59" name="tx58"/>
+            <p:cNvSpPr/>
+            <p:nvPr/>
+          </p:nvSpPr>
+          <p:spPr>
+            <a:xfrm>
+              <a:off x="5441823" y="2151171"/>
               <a:ext cx="101968" cy="82614"/>
             </a:xfrm>
             <a:prstGeom prst="rect">
@@ -5195,13 +5250,13 @@
         </p:sp>
         <p:sp>
           <p:nvSpPr>
-            <p:cNvPr id="59" name="tx58"/>
-            <p:cNvSpPr/>
-            <p:nvPr/>
-          </p:nvSpPr>
-          <p:spPr>
-            <a:xfrm>
-              <a:off x="5392282" y="1957954"/>
+            <p:cNvPr id="60" name="tx59"/>
+            <p:cNvSpPr/>
+            <p:nvPr/>
+          </p:nvSpPr>
+          <p:spPr>
+            <a:xfrm>
+              <a:off x="5441823" y="1957954"/>
               <a:ext cx="101968" cy="82614"/>
             </a:xfrm>
             <a:prstGeom prst="rect">
@@ -5241,13 +5296,13 @@
         </p:sp>
         <p:sp>
           <p:nvSpPr>
-            <p:cNvPr id="60" name="tx59"/>
-            <p:cNvSpPr/>
-            <p:nvPr/>
-          </p:nvSpPr>
-          <p:spPr>
-            <a:xfrm>
-              <a:off x="5392282" y="2035241"/>
+            <p:cNvPr id="61" name="tx60"/>
+            <p:cNvSpPr/>
+            <p:nvPr/>
+          </p:nvSpPr>
+          <p:spPr>
+            <a:xfrm>
+              <a:off x="5441823" y="2035241"/>
               <a:ext cx="101968" cy="82614"/>
             </a:xfrm>
             <a:prstGeom prst="rect">
@@ -5287,7 +5342,7 @@
         </p:sp>
         <p:sp>
           <p:nvSpPr>
-            <p:cNvPr id="61" name="tx60"/>
+            <p:cNvPr id="62" name="tx61"/>
             <p:cNvSpPr/>
             <p:nvPr/>
           </p:nvSpPr>
@@ -5333,7 +5388,7 @@
         </p:sp>
         <p:sp>
           <p:nvSpPr>
-            <p:cNvPr id="62" name="tx61"/>
+            <p:cNvPr id="63" name="tx62"/>
             <p:cNvSpPr/>
             <p:nvPr/>
           </p:nvSpPr>
@@ -5379,7 +5434,7 @@
         </p:sp>
         <p:sp>
           <p:nvSpPr>
-            <p:cNvPr id="63" name="tx62"/>
+            <p:cNvPr id="64" name="tx63"/>
             <p:cNvSpPr/>
             <p:nvPr/>
           </p:nvSpPr>
@@ -5425,7 +5480,7 @@
         </p:sp>
         <p:sp>
           <p:nvSpPr>
-            <p:cNvPr id="64" name="tx63"/>
+            <p:cNvPr id="65" name="tx64"/>
             <p:cNvSpPr/>
             <p:nvPr/>
           </p:nvSpPr>
@@ -5471,7 +5526,7 @@
         </p:sp>
         <p:sp>
           <p:nvSpPr>
-            <p:cNvPr id="65" name="tx64"/>
+            <p:cNvPr id="66" name="tx65"/>
             <p:cNvSpPr/>
             <p:nvPr/>
           </p:nvSpPr>
@@ -5517,7 +5572,7 @@
         </p:sp>
         <p:sp>
           <p:nvSpPr>
-            <p:cNvPr id="66" name="tx65"/>
+            <p:cNvPr id="67" name="tx66"/>
             <p:cNvSpPr/>
             <p:nvPr/>
           </p:nvSpPr>
@@ -5563,7 +5618,7 @@
         </p:sp>
         <p:sp>
           <p:nvSpPr>
-            <p:cNvPr id="67" name="tx66"/>
+            <p:cNvPr id="68" name="tx67"/>
             <p:cNvSpPr/>
             <p:nvPr/>
           </p:nvSpPr>
@@ -5609,7 +5664,7 @@
         </p:sp>
         <p:sp>
           <p:nvSpPr>
-            <p:cNvPr id="68" name="tx67"/>
+            <p:cNvPr id="69" name="tx68"/>
             <p:cNvSpPr/>
             <p:nvPr/>
           </p:nvSpPr>
@@ -5655,7 +5710,7 @@
         </p:sp>
         <p:sp>
           <p:nvSpPr>
-            <p:cNvPr id="69" name="tx68"/>
+            <p:cNvPr id="70" name="tx69"/>
             <p:cNvSpPr/>
             <p:nvPr/>
           </p:nvSpPr>
@@ -5701,7 +5756,7 @@
         </p:sp>
         <p:sp>
           <p:nvSpPr>
-            <p:cNvPr id="70" name="tx69"/>
+            <p:cNvPr id="71" name="tx70"/>
             <p:cNvSpPr/>
             <p:nvPr/>
           </p:nvSpPr>
@@ -5747,7 +5802,7 @@
         </p:sp>
         <p:sp>
           <p:nvSpPr>
-            <p:cNvPr id="71" name="tx70"/>
+            <p:cNvPr id="72" name="tx71"/>
             <p:cNvSpPr/>
             <p:nvPr/>
           </p:nvSpPr>
@@ -5793,7 +5848,7 @@
         </p:sp>
         <p:sp>
           <p:nvSpPr>
-            <p:cNvPr id="72" name="pl71"/>
+            <p:cNvPr id="73" name="pl72"/>
             <p:cNvSpPr/>
             <p:nvPr/>
           </p:nvSpPr>
@@ -5833,7 +5888,7 @@
         </p:sp>
         <p:sp>
           <p:nvSpPr>
-            <p:cNvPr id="73" name="pl72"/>
+            <p:cNvPr id="74" name="pl73"/>
             <p:cNvSpPr/>
             <p:nvPr/>
           </p:nvSpPr>
@@ -5873,7 +5928,7 @@
         </p:sp>
         <p:sp>
           <p:nvSpPr>
-            <p:cNvPr id="74" name="pl73"/>
+            <p:cNvPr id="75" name="pl74"/>
             <p:cNvSpPr/>
             <p:nvPr/>
           </p:nvSpPr>
@@ -5913,7 +5968,7 @@
         </p:sp>
         <p:sp>
           <p:nvSpPr>
-            <p:cNvPr id="75" name="pl74"/>
+            <p:cNvPr id="76" name="pl75"/>
             <p:cNvSpPr/>
             <p:nvPr/>
           </p:nvSpPr>
@@ -5953,7 +6008,7 @@
         </p:sp>
         <p:sp>
           <p:nvSpPr>
-            <p:cNvPr id="76" name="pl75"/>
+            <p:cNvPr id="77" name="pl76"/>
             <p:cNvSpPr/>
             <p:nvPr/>
           </p:nvSpPr>
@@ -5993,7 +6048,7 @@
         </p:sp>
         <p:sp>
           <p:nvSpPr>
-            <p:cNvPr id="77" name="pl76"/>
+            <p:cNvPr id="78" name="pl77"/>
             <p:cNvSpPr/>
             <p:nvPr/>
           </p:nvSpPr>
@@ -6033,7 +6088,7 @@
         </p:sp>
         <p:sp>
           <p:nvSpPr>
-            <p:cNvPr id="78" name="pl77"/>
+            <p:cNvPr id="79" name="pl78"/>
             <p:cNvSpPr/>
             <p:nvPr/>
           </p:nvSpPr>
@@ -6073,7 +6128,7 @@
         </p:sp>
         <p:sp>
           <p:nvSpPr>
-            <p:cNvPr id="79" name="pl78"/>
+            <p:cNvPr id="80" name="pl79"/>
             <p:cNvSpPr/>
             <p:nvPr/>
           </p:nvSpPr>
@@ -6113,7 +6168,7 @@
         </p:sp>
         <p:sp>
           <p:nvSpPr>
-            <p:cNvPr id="80" name="pl79"/>
+            <p:cNvPr id="81" name="pl80"/>
             <p:cNvSpPr/>
             <p:nvPr/>
           </p:nvSpPr>
@@ -6153,7 +6208,7 @@
         </p:sp>
         <p:sp>
           <p:nvSpPr>
-            <p:cNvPr id="81" name="pl80"/>
+            <p:cNvPr id="82" name="pl81"/>
             <p:cNvSpPr/>
             <p:nvPr/>
           </p:nvSpPr>
@@ -6193,7 +6248,7 @@
         </p:sp>
         <p:sp>
           <p:nvSpPr>
-            <p:cNvPr id="82" name="pl81"/>
+            <p:cNvPr id="83" name="pl82"/>
             <p:cNvSpPr/>
             <p:nvPr/>
           </p:nvSpPr>
@@ -6233,13 +6288,13 @@
         </p:sp>
         <p:sp>
           <p:nvSpPr>
-            <p:cNvPr id="83" name="pl82"/>
-            <p:cNvSpPr/>
-            <p:nvPr/>
-          </p:nvSpPr>
-          <p:spPr>
-            <a:xfrm>
-              <a:off x="1671281" y="4172066"/>
+            <p:cNvPr id="84" name="pl83"/>
+            <p:cNvSpPr/>
+            <p:nvPr/>
+          </p:nvSpPr>
+          <p:spPr>
+            <a:xfrm>
+              <a:off x="1686945" y="4172066"/>
               <a:ext cx="0" cy="34794"/>
             </a:xfrm>
             <a:custGeom>
@@ -6273,13 +6328,13 @@
         </p:sp>
         <p:sp>
           <p:nvSpPr>
-            <p:cNvPr id="84" name="pl83"/>
-            <p:cNvSpPr/>
-            <p:nvPr/>
-          </p:nvSpPr>
-          <p:spPr>
-            <a:xfrm>
-              <a:off x="2020539" y="4172066"/>
+            <p:cNvPr id="85" name="pl84"/>
+            <p:cNvSpPr/>
+            <p:nvPr/>
+          </p:nvSpPr>
+          <p:spPr>
+            <a:xfrm>
+              <a:off x="2039340" y="4172066"/>
               <a:ext cx="0" cy="34794"/>
             </a:xfrm>
             <a:custGeom>
@@ -6313,13 +6368,13 @@
         </p:sp>
         <p:sp>
           <p:nvSpPr>
-            <p:cNvPr id="85" name="pl84"/>
-            <p:cNvSpPr/>
-            <p:nvPr/>
-          </p:nvSpPr>
-          <p:spPr>
-            <a:xfrm>
-              <a:off x="2369797" y="4172066"/>
+            <p:cNvPr id="86" name="pl85"/>
+            <p:cNvSpPr/>
+            <p:nvPr/>
+          </p:nvSpPr>
+          <p:spPr>
+            <a:xfrm>
+              <a:off x="2391735" y="4172066"/>
               <a:ext cx="0" cy="34794"/>
             </a:xfrm>
             <a:custGeom>
@@ -6353,13 +6408,13 @@
         </p:sp>
         <p:sp>
           <p:nvSpPr>
-            <p:cNvPr id="86" name="pl85"/>
-            <p:cNvSpPr/>
-            <p:nvPr/>
-          </p:nvSpPr>
-          <p:spPr>
-            <a:xfrm>
-              <a:off x="2719055" y="4172066"/>
+            <p:cNvPr id="87" name="pl86"/>
+            <p:cNvSpPr/>
+            <p:nvPr/>
+          </p:nvSpPr>
+          <p:spPr>
+            <a:xfrm>
+              <a:off x="2744129" y="4172066"/>
               <a:ext cx="0" cy="34794"/>
             </a:xfrm>
             <a:custGeom>
@@ -6393,13 +6448,13 @@
         </p:sp>
         <p:sp>
           <p:nvSpPr>
-            <p:cNvPr id="87" name="pl86"/>
-            <p:cNvSpPr/>
-            <p:nvPr/>
-          </p:nvSpPr>
-          <p:spPr>
-            <a:xfrm>
-              <a:off x="3068312" y="4172066"/>
+            <p:cNvPr id="88" name="pl87"/>
+            <p:cNvSpPr/>
+            <p:nvPr/>
+          </p:nvSpPr>
+          <p:spPr>
+            <a:xfrm>
+              <a:off x="3096524" y="4172066"/>
               <a:ext cx="0" cy="34794"/>
             </a:xfrm>
             <a:custGeom>
@@ -6433,13 +6488,13 @@
         </p:sp>
         <p:sp>
           <p:nvSpPr>
-            <p:cNvPr id="88" name="pl87"/>
-            <p:cNvSpPr/>
-            <p:nvPr/>
-          </p:nvSpPr>
-          <p:spPr>
-            <a:xfrm>
-              <a:off x="3417570" y="4172066"/>
+            <p:cNvPr id="89" name="pl88"/>
+            <p:cNvSpPr/>
+            <p:nvPr/>
+          </p:nvSpPr>
+          <p:spPr>
+            <a:xfrm>
+              <a:off x="3448918" y="4172066"/>
               <a:ext cx="0" cy="34794"/>
             </a:xfrm>
             <a:custGeom>
@@ -6473,13 +6528,13 @@
         </p:sp>
         <p:sp>
           <p:nvSpPr>
-            <p:cNvPr id="89" name="pl88"/>
-            <p:cNvSpPr/>
-            <p:nvPr/>
-          </p:nvSpPr>
-          <p:spPr>
-            <a:xfrm>
-              <a:off x="3766828" y="4172066"/>
+            <p:cNvPr id="90" name="pl89"/>
+            <p:cNvSpPr/>
+            <p:nvPr/>
+          </p:nvSpPr>
+          <p:spPr>
+            <a:xfrm>
+              <a:off x="3801313" y="4172066"/>
               <a:ext cx="0" cy="34794"/>
             </a:xfrm>
             <a:custGeom>
@@ -6513,13 +6568,13 @@
         </p:sp>
         <p:sp>
           <p:nvSpPr>
-            <p:cNvPr id="90" name="pl89"/>
-            <p:cNvSpPr/>
-            <p:nvPr/>
-          </p:nvSpPr>
-          <p:spPr>
-            <a:xfrm>
-              <a:off x="4116086" y="4172066"/>
+            <p:cNvPr id="91" name="pl90"/>
+            <p:cNvSpPr/>
+            <p:nvPr/>
+          </p:nvSpPr>
+          <p:spPr>
+            <a:xfrm>
+              <a:off x="4153707" y="4172066"/>
               <a:ext cx="0" cy="34794"/>
             </a:xfrm>
             <a:custGeom>
@@ -6553,13 +6608,13 @@
         </p:sp>
         <p:sp>
           <p:nvSpPr>
-            <p:cNvPr id="91" name="pl90"/>
-            <p:cNvSpPr/>
-            <p:nvPr/>
-          </p:nvSpPr>
-          <p:spPr>
-            <a:xfrm>
-              <a:off x="4465344" y="4172066"/>
+            <p:cNvPr id="92" name="pl91"/>
+            <p:cNvSpPr/>
+            <p:nvPr/>
+          </p:nvSpPr>
+          <p:spPr>
+            <a:xfrm>
+              <a:off x="4506102" y="4172066"/>
               <a:ext cx="0" cy="34794"/>
             </a:xfrm>
             <a:custGeom>
@@ -6593,13 +6648,13 @@
         </p:sp>
         <p:sp>
           <p:nvSpPr>
-            <p:cNvPr id="92" name="pl91"/>
-            <p:cNvSpPr/>
-            <p:nvPr/>
-          </p:nvSpPr>
-          <p:spPr>
-            <a:xfrm>
-              <a:off x="4814602" y="4172066"/>
+            <p:cNvPr id="93" name="pl92"/>
+            <p:cNvSpPr/>
+            <p:nvPr/>
+          </p:nvSpPr>
+          <p:spPr>
+            <a:xfrm>
+              <a:off x="4858496" y="4172066"/>
               <a:ext cx="0" cy="34794"/>
             </a:xfrm>
             <a:custGeom>
@@ -6633,13 +6688,13 @@
         </p:sp>
         <p:sp>
           <p:nvSpPr>
-            <p:cNvPr id="93" name="pl92"/>
-            <p:cNvSpPr/>
-            <p:nvPr/>
-          </p:nvSpPr>
-          <p:spPr>
-            <a:xfrm>
-              <a:off x="5163859" y="4172066"/>
+            <p:cNvPr id="94" name="pl93"/>
+            <p:cNvSpPr/>
+            <p:nvPr/>
+          </p:nvSpPr>
+          <p:spPr>
+            <a:xfrm>
+              <a:off x="5210891" y="4172066"/>
               <a:ext cx="0" cy="34794"/>
             </a:xfrm>
             <a:custGeom>
@@ -6673,13 +6728,53 @@
         </p:sp>
         <p:sp>
           <p:nvSpPr>
-            <p:cNvPr id="94" name="tx93"/>
-            <p:cNvSpPr/>
-            <p:nvPr/>
-          </p:nvSpPr>
-          <p:spPr>
-            <a:xfrm>
-              <a:off x="1640203" y="4233005"/>
+            <p:cNvPr id="95" name="pl94"/>
+            <p:cNvSpPr/>
+            <p:nvPr/>
+          </p:nvSpPr>
+          <p:spPr>
+            <a:xfrm>
+              <a:off x="5563286" y="4172066"/>
+              <a:ext cx="0" cy="34794"/>
+            </a:xfrm>
+            <a:custGeom>
+              <a:avLst/>
+              <a:pathLst>
+                <a:path w="0" h="34794">
+                  <a:moveTo>
+                    <a:pt x="0" y="34794"/>
+                  </a:moveTo>
+                  <a:lnTo>
+                    <a:pt x="0" y="0"/>
+                  </a:lnTo>
+                </a:path>
+              </a:pathLst>
+            </a:custGeom>
+            <a:ln w="13550" cap="flat">
+              <a:solidFill>
+                <a:srgbClr val="000000">
+                  <a:alpha val="100000"/>
+                </a:srgbClr>
+              </a:solidFill>
+              <a:prstDash val="solid"/>
+              <a:round/>
+            </a:ln>
+          </p:spPr>
+          <p:txBody>
+            <a:bodyPr/>
+            <a:lstStyle/>
+            <a:p/>
+          </p:txBody>
+        </p:sp>
+        <p:sp>
+          <p:nvSpPr>
+            <p:cNvPr id="96" name="tx95"/>
+            <p:cNvSpPr/>
+            <p:nvPr/>
+          </p:nvSpPr>
+          <p:spPr>
+            <a:xfrm>
+              <a:off x="1655868" y="4233005"/>
               <a:ext cx="62155" cy="81691"/>
             </a:xfrm>
             <a:prstGeom prst="rect">
@@ -6719,13 +6814,13 @@
         </p:sp>
         <p:sp>
           <p:nvSpPr>
-            <p:cNvPr id="95" name="tx94"/>
-            <p:cNvSpPr/>
-            <p:nvPr/>
-          </p:nvSpPr>
-          <p:spPr>
-            <a:xfrm>
-              <a:off x="1989461" y="4234423"/>
+            <p:cNvPr id="97" name="tx96"/>
+            <p:cNvSpPr/>
+            <p:nvPr/>
+          </p:nvSpPr>
+          <p:spPr>
+            <a:xfrm>
+              <a:off x="2008262" y="4234423"/>
               <a:ext cx="62155" cy="80272"/>
             </a:xfrm>
             <a:prstGeom prst="rect">
@@ -6765,13 +6860,13 @@
         </p:sp>
         <p:sp>
           <p:nvSpPr>
-            <p:cNvPr id="96" name="tx95"/>
-            <p:cNvSpPr/>
-            <p:nvPr/>
-          </p:nvSpPr>
-          <p:spPr>
-            <a:xfrm>
-              <a:off x="2307641" y="4233005"/>
+            <p:cNvPr id="98" name="tx97"/>
+            <p:cNvSpPr/>
+            <p:nvPr/>
+          </p:nvSpPr>
+          <p:spPr>
+            <a:xfrm>
+              <a:off x="2329579" y="4233005"/>
               <a:ext cx="124311" cy="81691"/>
             </a:xfrm>
             <a:prstGeom prst="rect">
@@ -6811,13 +6906,13 @@
         </p:sp>
         <p:sp>
           <p:nvSpPr>
-            <p:cNvPr id="97" name="tx96"/>
-            <p:cNvSpPr/>
-            <p:nvPr/>
-          </p:nvSpPr>
-          <p:spPr>
-            <a:xfrm>
-              <a:off x="2656899" y="4233005"/>
+            <p:cNvPr id="99" name="tx98"/>
+            <p:cNvSpPr/>
+            <p:nvPr/>
+          </p:nvSpPr>
+          <p:spPr>
+            <a:xfrm>
+              <a:off x="2681974" y="4233005"/>
               <a:ext cx="124311" cy="81691"/>
             </a:xfrm>
             <a:prstGeom prst="rect">
@@ -6857,13 +6952,13 @@
         </p:sp>
         <p:sp>
           <p:nvSpPr>
-            <p:cNvPr id="98" name="tx97"/>
-            <p:cNvSpPr/>
-            <p:nvPr/>
-          </p:nvSpPr>
-          <p:spPr>
-            <a:xfrm>
-              <a:off x="3006157" y="4233005"/>
+            <p:cNvPr id="100" name="tx99"/>
+            <p:cNvSpPr/>
+            <p:nvPr/>
+          </p:nvSpPr>
+          <p:spPr>
+            <a:xfrm>
+              <a:off x="3034368" y="4233005"/>
               <a:ext cx="124311" cy="81691"/>
             </a:xfrm>
             <a:prstGeom prst="rect">
@@ -6903,13 +6998,13 @@
         </p:sp>
         <p:sp>
           <p:nvSpPr>
-            <p:cNvPr id="99" name="tx98"/>
-            <p:cNvSpPr/>
-            <p:nvPr/>
-          </p:nvSpPr>
-          <p:spPr>
-            <a:xfrm>
-              <a:off x="3355415" y="4233005"/>
+            <p:cNvPr id="101" name="tx100"/>
+            <p:cNvSpPr/>
+            <p:nvPr/>
+          </p:nvSpPr>
+          <p:spPr>
+            <a:xfrm>
+              <a:off x="3386763" y="4233005"/>
               <a:ext cx="124311" cy="81691"/>
             </a:xfrm>
             <a:prstGeom prst="rect">
@@ -6949,13 +7044,13 @@
         </p:sp>
         <p:sp>
           <p:nvSpPr>
-            <p:cNvPr id="100" name="tx99"/>
-            <p:cNvSpPr/>
-            <p:nvPr/>
-          </p:nvSpPr>
-          <p:spPr>
-            <a:xfrm>
-              <a:off x="3704673" y="4232950"/>
+            <p:cNvPr id="102" name="tx101"/>
+            <p:cNvSpPr/>
+            <p:nvPr/>
+          </p:nvSpPr>
+          <p:spPr>
+            <a:xfrm>
+              <a:off x="3739157" y="4232950"/>
               <a:ext cx="124311" cy="81746"/>
             </a:xfrm>
             <a:prstGeom prst="rect">
@@ -6995,13 +7090,13 @@
         </p:sp>
         <p:sp>
           <p:nvSpPr>
-            <p:cNvPr id="101" name="tx100"/>
-            <p:cNvSpPr/>
-            <p:nvPr/>
-          </p:nvSpPr>
-          <p:spPr>
-            <a:xfrm>
-              <a:off x="4053930" y="4232950"/>
+            <p:cNvPr id="103" name="tx102"/>
+            <p:cNvSpPr/>
+            <p:nvPr/>
+          </p:nvSpPr>
+          <p:spPr>
+            <a:xfrm>
+              <a:off x="4091552" y="4232950"/>
               <a:ext cx="124311" cy="81746"/>
             </a:xfrm>
             <a:prstGeom prst="rect">
@@ -7041,13 +7136,13 @@
         </p:sp>
         <p:sp>
           <p:nvSpPr>
-            <p:cNvPr id="102" name="tx101"/>
-            <p:cNvSpPr/>
-            <p:nvPr/>
-          </p:nvSpPr>
-          <p:spPr>
-            <a:xfrm>
-              <a:off x="4403188" y="4233005"/>
+            <p:cNvPr id="104" name="tx103"/>
+            <p:cNvSpPr/>
+            <p:nvPr/>
+          </p:nvSpPr>
+          <p:spPr>
+            <a:xfrm>
+              <a:off x="4443946" y="4233005"/>
               <a:ext cx="124311" cy="81691"/>
             </a:xfrm>
             <a:prstGeom prst="rect">
@@ -7087,13 +7182,13 @@
         </p:sp>
         <p:sp>
           <p:nvSpPr>
-            <p:cNvPr id="103" name="tx102"/>
-            <p:cNvSpPr/>
-            <p:nvPr/>
-          </p:nvSpPr>
-          <p:spPr>
-            <a:xfrm>
-              <a:off x="4752446" y="4233332"/>
+            <p:cNvPr id="105" name="tx104"/>
+            <p:cNvSpPr/>
+            <p:nvPr/>
+          </p:nvSpPr>
+          <p:spPr>
+            <a:xfrm>
+              <a:off x="4796341" y="4233332"/>
               <a:ext cx="124311" cy="81364"/>
             </a:xfrm>
             <a:prstGeom prst="rect">
@@ -7133,13 +7228,13 @@
         </p:sp>
         <p:sp>
           <p:nvSpPr>
-            <p:cNvPr id="104" name="tx103"/>
-            <p:cNvSpPr/>
-            <p:nvPr/>
-          </p:nvSpPr>
-          <p:spPr>
-            <a:xfrm>
-              <a:off x="5101704" y="4233005"/>
+            <p:cNvPr id="106" name="tx105"/>
+            <p:cNvSpPr/>
+            <p:nvPr/>
+          </p:nvSpPr>
+          <p:spPr>
+            <a:xfrm>
+              <a:off x="5148735" y="4233005"/>
               <a:ext cx="124311" cy="81691"/>
             </a:xfrm>
             <a:prstGeom prst="rect">
@@ -7179,13 +7274,59 @@
         </p:sp>
         <p:sp>
           <p:nvSpPr>
-            <p:cNvPr id="105" name="tx104"/>
-            <p:cNvSpPr/>
-            <p:nvPr/>
-          </p:nvSpPr>
-          <p:spPr>
-            <a:xfrm>
-              <a:off x="2765285" y="4341906"/>
+            <p:cNvPr id="107" name="tx106"/>
+            <p:cNvSpPr/>
+            <p:nvPr/>
+          </p:nvSpPr>
+          <p:spPr>
+            <a:xfrm>
+              <a:off x="5501130" y="4234423"/>
+              <a:ext cx="124311" cy="80272"/>
+            </a:xfrm>
+            <a:prstGeom prst="rect">
+              <a:avLst/>
+            </a:prstGeom>
+            <a:noFill/>
+          </p:spPr>
+          <p:txBody>
+            <a:bodyPr lIns="0" rIns="0" tIns="0" bIns="0" anchorCtr="1" anchor="ctr" wrap="none"/>
+            <a:lstStyle/>
+            <a:p>
+              <a:pPr algn="l" marL="0" marR="0" indent="0">
+                <a:lnSpc>
+                  <a:spcPts val="880"/>
+                </a:lnSpc>
+                <a:spcBef>
+                  <a:spcPts val="0"/>
+                </a:spcBef>
+                <a:spcAft>
+                  <a:spcPts val="0"/>
+                </a:spcAft>
+              </a:pPr>
+              <a:r>
+                <a:rPr sz="880">
+                  <a:solidFill>
+                    <a:srgbClr val="4D4D4D">
+                      <a:alpha val="100000"/>
+                    </a:srgbClr>
+                  </a:solidFill>
+                  <a:latin typeface="Arial"/>
+                  <a:cs typeface="Arial"/>
+                </a:rPr>
+                <a:t>55</a:t>
+              </a:r>
+            </a:p>
+          </p:txBody>
+        </p:sp>
+        <p:sp>
+          <p:nvSpPr>
+            <p:cNvPr id="108" name="tx107"/>
+            <p:cNvSpPr/>
+            <p:nvPr/>
+          </p:nvSpPr>
+          <p:spPr>
+            <a:xfrm>
+              <a:off x="2937590" y="4341906"/>
               <a:ext cx="1304571" cy="131105"/>
             </a:xfrm>
             <a:prstGeom prst="rect">
@@ -7225,7 +7366,7 @@
         </p:sp>
         <p:sp>
           <p:nvSpPr>
-            <p:cNvPr id="106" name="tx105"/>
+            <p:cNvPr id="109" name="tx108"/>
             <p:cNvSpPr/>
             <p:nvPr/>
           </p:nvSpPr>
@@ -7271,14 +7412,14 @@
         </p:sp>
         <p:sp>
           <p:nvSpPr>
-            <p:cNvPr id="107" name="rc106"/>
-            <p:cNvSpPr/>
-            <p:nvPr/>
-          </p:nvSpPr>
-          <p:spPr>
-            <a:xfrm>
-              <a:off x="5477666" y="1970032"/>
-              <a:ext cx="853544" cy="1215990"/>
+            <p:cNvPr id="110" name="rc109"/>
+            <p:cNvSpPr/>
+            <p:nvPr/>
+          </p:nvSpPr>
+          <p:spPr>
+            <a:xfrm>
+              <a:off x="5822278" y="1970032"/>
+              <a:ext cx="508932" cy="1215990"/>
             </a:xfrm>
             <a:prstGeom prst="rect">
               <a:avLst/>
@@ -7297,13 +7438,13 @@
         </p:sp>
         <p:sp>
           <p:nvSpPr>
-            <p:cNvPr id="108" name="tx107"/>
-            <p:cNvSpPr/>
-            <p:nvPr/>
-          </p:nvSpPr>
-          <p:spPr>
-            <a:xfrm>
-              <a:off x="5547255" y="2053366"/>
+            <p:cNvPr id="111" name="tx110"/>
+            <p:cNvSpPr/>
+            <p:nvPr/>
+          </p:nvSpPr>
+          <p:spPr>
+            <a:xfrm>
+              <a:off x="5891867" y="2053366"/>
               <a:ext cx="349181" cy="100955"/>
             </a:xfrm>
             <a:prstGeom prst="rect">
@@ -7343,13 +7484,13 @@
         </p:sp>
         <p:sp>
           <p:nvSpPr>
-            <p:cNvPr id="109" name="rc108"/>
-            <p:cNvSpPr/>
-            <p:nvPr/>
-          </p:nvSpPr>
-          <p:spPr>
-            <a:xfrm>
-              <a:off x="5547255" y="2238610"/>
+            <p:cNvPr id="112" name="rc111"/>
+            <p:cNvSpPr/>
+            <p:nvPr/>
+          </p:nvSpPr>
+          <p:spPr>
+            <a:xfrm>
+              <a:off x="5891867" y="2238610"/>
               <a:ext cx="219455" cy="219456"/>
             </a:xfrm>
             <a:prstGeom prst="rect">
@@ -7369,13 +7510,13 @@
         </p:sp>
         <p:sp>
           <p:nvSpPr>
-            <p:cNvPr id="110" name="pl109"/>
-            <p:cNvSpPr/>
-            <p:nvPr/>
-          </p:nvSpPr>
-          <p:spPr>
-            <a:xfrm>
-              <a:off x="5569201" y="2348338"/>
+            <p:cNvPr id="113" name="pl112"/>
+            <p:cNvSpPr/>
+            <p:nvPr/>
+          </p:nvSpPr>
+          <p:spPr>
+            <a:xfrm>
+              <a:off x="5913812" y="2348338"/>
               <a:ext cx="175564" cy="0"/>
             </a:xfrm>
             <a:custGeom>
@@ -7409,13 +7550,13 @@
         </p:sp>
         <p:sp>
           <p:nvSpPr>
-            <p:cNvPr id="111" name="tx110"/>
-            <p:cNvSpPr/>
-            <p:nvPr/>
-          </p:nvSpPr>
-          <p:spPr>
-            <a:xfrm>
-              <a:off x="5605999" y="2327237"/>
+            <p:cNvPr id="114" name="tx113"/>
+            <p:cNvSpPr/>
+            <p:nvPr/>
+          </p:nvSpPr>
+          <p:spPr>
+            <a:xfrm>
+              <a:off x="5950611" y="2327237"/>
               <a:ext cx="101968" cy="82614"/>
             </a:xfrm>
             <a:prstGeom prst="rect">
@@ -7455,13 +7596,13 @@
         </p:sp>
         <p:sp>
           <p:nvSpPr>
-            <p:cNvPr id="112" name="rc111"/>
-            <p:cNvSpPr/>
-            <p:nvPr/>
-          </p:nvSpPr>
-          <p:spPr>
-            <a:xfrm>
-              <a:off x="5547255" y="2458066"/>
+            <p:cNvPr id="115" name="rc114"/>
+            <p:cNvSpPr/>
+            <p:nvPr/>
+          </p:nvSpPr>
+          <p:spPr>
+            <a:xfrm>
+              <a:off x="5891867" y="2458066"/>
               <a:ext cx="219455" cy="219456"/>
             </a:xfrm>
             <a:prstGeom prst="rect">
@@ -7481,13 +7622,13 @@
         </p:sp>
         <p:sp>
           <p:nvSpPr>
-            <p:cNvPr id="113" name="pl112"/>
-            <p:cNvSpPr/>
-            <p:nvPr/>
-          </p:nvSpPr>
-          <p:spPr>
-            <a:xfrm>
-              <a:off x="5569201" y="2567794"/>
+            <p:cNvPr id="116" name="pl115"/>
+            <p:cNvSpPr/>
+            <p:nvPr/>
+          </p:nvSpPr>
+          <p:spPr>
+            <a:xfrm>
+              <a:off x="5913812" y="2567794"/>
               <a:ext cx="175564" cy="0"/>
             </a:xfrm>
             <a:custGeom>
@@ -7521,13 +7662,13 @@
         </p:sp>
         <p:sp>
           <p:nvSpPr>
-            <p:cNvPr id="114" name="tx113"/>
-            <p:cNvSpPr/>
-            <p:nvPr/>
-          </p:nvSpPr>
-          <p:spPr>
-            <a:xfrm>
-              <a:off x="5605999" y="2546693"/>
+            <p:cNvPr id="117" name="tx116"/>
+            <p:cNvSpPr/>
+            <p:nvPr/>
+          </p:nvSpPr>
+          <p:spPr>
+            <a:xfrm>
+              <a:off x="5950611" y="2546693"/>
               <a:ext cx="101968" cy="82614"/>
             </a:xfrm>
             <a:prstGeom prst="rect">
@@ -7567,13 +7708,13 @@
         </p:sp>
         <p:sp>
           <p:nvSpPr>
-            <p:cNvPr id="115" name="rc114"/>
-            <p:cNvSpPr/>
-            <p:nvPr/>
-          </p:nvSpPr>
-          <p:spPr>
-            <a:xfrm>
-              <a:off x="5547255" y="2677522"/>
+            <p:cNvPr id="118" name="rc117"/>
+            <p:cNvSpPr/>
+            <p:nvPr/>
+          </p:nvSpPr>
+          <p:spPr>
+            <a:xfrm>
+              <a:off x="5891867" y="2677522"/>
               <a:ext cx="219455" cy="219456"/>
             </a:xfrm>
             <a:prstGeom prst="rect">
@@ -7593,13 +7734,13 @@
         </p:sp>
         <p:sp>
           <p:nvSpPr>
-            <p:cNvPr id="116" name="pl115"/>
-            <p:cNvSpPr/>
-            <p:nvPr/>
-          </p:nvSpPr>
-          <p:spPr>
-            <a:xfrm>
-              <a:off x="5569201" y="2787250"/>
+            <p:cNvPr id="119" name="pl118"/>
+            <p:cNvSpPr/>
+            <p:nvPr/>
+          </p:nvSpPr>
+          <p:spPr>
+            <a:xfrm>
+              <a:off x="5913812" y="2787250"/>
               <a:ext cx="175564" cy="0"/>
             </a:xfrm>
             <a:custGeom>
@@ -7633,13 +7774,13 @@
         </p:sp>
         <p:sp>
           <p:nvSpPr>
-            <p:cNvPr id="117" name="tx116"/>
-            <p:cNvSpPr/>
-            <p:nvPr/>
-          </p:nvSpPr>
-          <p:spPr>
-            <a:xfrm>
-              <a:off x="5605999" y="2766149"/>
+            <p:cNvPr id="120" name="tx119"/>
+            <p:cNvSpPr/>
+            <p:nvPr/>
+          </p:nvSpPr>
+          <p:spPr>
+            <a:xfrm>
+              <a:off x="5950611" y="2766149"/>
               <a:ext cx="101968" cy="82614"/>
             </a:xfrm>
             <a:prstGeom prst="rect">
@@ -7679,13 +7820,13 @@
         </p:sp>
         <p:sp>
           <p:nvSpPr>
-            <p:cNvPr id="118" name="rc117"/>
-            <p:cNvSpPr/>
-            <p:nvPr/>
-          </p:nvSpPr>
-          <p:spPr>
-            <a:xfrm>
-              <a:off x="5547255" y="2896978"/>
+            <p:cNvPr id="121" name="rc120"/>
+            <p:cNvSpPr/>
+            <p:nvPr/>
+          </p:nvSpPr>
+          <p:spPr>
+            <a:xfrm>
+              <a:off x="5891867" y="2896978"/>
               <a:ext cx="219455" cy="219456"/>
             </a:xfrm>
             <a:prstGeom prst="rect">
@@ -7705,13 +7846,13 @@
         </p:sp>
         <p:sp>
           <p:nvSpPr>
-            <p:cNvPr id="119" name="pl118"/>
-            <p:cNvSpPr/>
-            <p:nvPr/>
-          </p:nvSpPr>
-          <p:spPr>
-            <a:xfrm>
-              <a:off x="5569201" y="3006706"/>
+            <p:cNvPr id="122" name="pl121"/>
+            <p:cNvSpPr/>
+            <p:nvPr/>
+          </p:nvSpPr>
+          <p:spPr>
+            <a:xfrm>
+              <a:off x="5913812" y="3006706"/>
               <a:ext cx="175564" cy="0"/>
             </a:xfrm>
             <a:custGeom>
@@ -7745,13 +7886,13 @@
         </p:sp>
         <p:sp>
           <p:nvSpPr>
-            <p:cNvPr id="120" name="tx119"/>
-            <p:cNvSpPr/>
-            <p:nvPr/>
-          </p:nvSpPr>
-          <p:spPr>
-            <a:xfrm>
-              <a:off x="5605999" y="2985605"/>
+            <p:cNvPr id="123" name="tx122"/>
+            <p:cNvSpPr/>
+            <p:nvPr/>
+          </p:nvSpPr>
+          <p:spPr>
+            <a:xfrm>
+              <a:off x="5950611" y="2985605"/>
               <a:ext cx="101968" cy="82614"/>
             </a:xfrm>
             <a:prstGeom prst="rect">
@@ -7791,14 +7932,14 @@
         </p:sp>
         <p:sp>
           <p:nvSpPr>
-            <p:cNvPr id="121" name="tx120"/>
-            <p:cNvSpPr/>
-            <p:nvPr/>
-          </p:nvSpPr>
-          <p:spPr>
-            <a:xfrm>
-              <a:off x="5836300" y="2307574"/>
-              <a:ext cx="419154" cy="80764"/>
+            <p:cNvPr id="124" name="tx123"/>
+            <p:cNvSpPr/>
+            <p:nvPr/>
+          </p:nvSpPr>
+          <p:spPr>
+            <a:xfrm>
+              <a:off x="6180912" y="2308338"/>
+              <a:ext cx="74543" cy="80000"/>
             </a:xfrm>
             <a:prstGeom prst="rect">
               <a:avLst/>
@@ -7830,21 +7971,21 @@
                   <a:latin typeface="Arial"/>
                   <a:cs typeface="Arial"/>
                 </a:rPr>
-                <a:t>Trt.ID=A</a:t>
+                <a:t>A</a:t>
               </a:r>
             </a:p>
           </p:txBody>
         </p:sp>
         <p:sp>
           <p:nvSpPr>
-            <p:cNvPr id="122" name="tx121"/>
-            <p:cNvSpPr/>
-            <p:nvPr/>
-          </p:nvSpPr>
-          <p:spPr>
-            <a:xfrm>
-              <a:off x="5836300" y="2527030"/>
-              <a:ext cx="419154" cy="80764"/>
+            <p:cNvPr id="125" name="tx124"/>
+            <p:cNvSpPr/>
+            <p:nvPr/>
+          </p:nvSpPr>
+          <p:spPr>
+            <a:xfrm>
+              <a:off x="6180912" y="2527794"/>
+              <a:ext cx="74543" cy="80000"/>
             </a:xfrm>
             <a:prstGeom prst="rect">
               <a:avLst/>
@@ -7876,21 +8017,21 @@
                   <a:latin typeface="Arial"/>
                   <a:cs typeface="Arial"/>
                 </a:rPr>
-                <a:t>Trt.ID=B</a:t>
+                <a:t>B</a:t>
               </a:r>
             </a:p>
           </p:txBody>
         </p:sp>
         <p:sp>
           <p:nvSpPr>
-            <p:cNvPr id="123" name="tx122"/>
-            <p:cNvSpPr/>
-            <p:nvPr/>
-          </p:nvSpPr>
-          <p:spPr>
-            <a:xfrm>
-              <a:off x="5836300" y="2744521"/>
-              <a:ext cx="425321" cy="82728"/>
+            <p:cNvPr id="126" name="tx125"/>
+            <p:cNvSpPr/>
+            <p:nvPr/>
+          </p:nvSpPr>
+          <p:spPr>
+            <a:xfrm>
+              <a:off x="6180912" y="2744521"/>
+              <a:ext cx="80709" cy="82728"/>
             </a:xfrm>
             <a:prstGeom prst="rect">
               <a:avLst/>
@@ -7922,21 +8063,21 @@
                   <a:latin typeface="Arial"/>
                   <a:cs typeface="Arial"/>
                 </a:rPr>
-                <a:t>Trt.ID=C</a:t>
+                <a:t>C</a:t>
               </a:r>
             </a:p>
           </p:txBody>
         </p:sp>
         <p:sp>
           <p:nvSpPr>
-            <p:cNvPr id="124" name="tx123"/>
-            <p:cNvSpPr/>
-            <p:nvPr/>
-          </p:nvSpPr>
-          <p:spPr>
-            <a:xfrm>
-              <a:off x="5836300" y="2965942"/>
-              <a:ext cx="425321" cy="80764"/>
+            <p:cNvPr id="127" name="tx126"/>
+            <p:cNvSpPr/>
+            <p:nvPr/>
+          </p:nvSpPr>
+          <p:spPr>
+            <a:xfrm>
+              <a:off x="6180912" y="2966706"/>
+              <a:ext cx="80709" cy="80000"/>
             </a:xfrm>
             <a:prstGeom prst="rect">
               <a:avLst/>
@@ -7968,7 +8109,7 @@
                   <a:latin typeface="Arial"/>
                   <a:cs typeface="Arial"/>
                 </a:rPr>
-                <a:t>Trt.ID=D</a:t>
+                <a:t>D</a:t>
               </a:r>
             </a:p>
           </p:txBody>

</xml_diff>

<commit_message>
Cancel changes to Surv_Plots()
</commit_message>
<xml_diff>
--- a/vignettes/ONDA_XX-Survival-Curve.pptx
+++ b/vignettes/ONDA_XX-Survival-Curve.pptx
@@ -2359,7 +2359,7 @@
           </p:nvSpPr>
           <p:spPr>
             <a:xfrm>
-              <a:off x="1496652" y="4172066"/>
+              <a:off x="1496652" y="3875253"/>
               <a:ext cx="4186447" cy="0"/>
             </a:xfrm>
             <a:custGeom>
@@ -2369,9 +2369,6 @@
                   <a:moveTo>
                     <a:pt x="0" y="0"/>
                   </a:moveTo>
-                  <a:lnTo>
-                    <a:pt x="4186447" y="0"/>
-                  </a:lnTo>
                   <a:lnTo>
                     <a:pt x="4186447" y="0"/>
                   </a:lnTo>
@@ -2402,7 +2399,7 @@
           </p:nvSpPr>
           <p:spPr>
             <a:xfrm>
-              <a:off x="1496652" y="3882241"/>
+              <a:off x="1496652" y="3571453"/>
               <a:ext cx="4186447" cy="0"/>
             </a:xfrm>
             <a:custGeom>
@@ -2412,9 +2409,6 @@
                   <a:moveTo>
                     <a:pt x="0" y="0"/>
                   </a:moveTo>
-                  <a:lnTo>
-                    <a:pt x="4186447" y="0"/>
-                  </a:lnTo>
                   <a:lnTo>
                     <a:pt x="4186447" y="0"/>
                   </a:lnTo>
@@ -2445,7 +2439,7 @@
           </p:nvSpPr>
           <p:spPr>
             <a:xfrm>
-              <a:off x="1496652" y="3592416"/>
+              <a:off x="1496652" y="3267653"/>
               <a:ext cx="4186447" cy="0"/>
             </a:xfrm>
             <a:custGeom>
@@ -2455,9 +2449,6 @@
                   <a:moveTo>
                     <a:pt x="0" y="0"/>
                   </a:moveTo>
-                  <a:lnTo>
-                    <a:pt x="4186447" y="0"/>
-                  </a:lnTo>
                   <a:lnTo>
                     <a:pt x="4186447" y="0"/>
                   </a:lnTo>
@@ -2488,7 +2479,7 @@
           </p:nvSpPr>
           <p:spPr>
             <a:xfrm>
-              <a:off x="1496652" y="3302590"/>
+              <a:off x="1496652" y="2963853"/>
               <a:ext cx="4186447" cy="0"/>
             </a:xfrm>
             <a:custGeom>
@@ -2498,9 +2489,6 @@
                   <a:moveTo>
                     <a:pt x="0" y="0"/>
                   </a:moveTo>
-                  <a:lnTo>
-                    <a:pt x="4186447" y="0"/>
-                  </a:lnTo>
                   <a:lnTo>
                     <a:pt x="4186447" y="0"/>
                   </a:lnTo>
@@ -2531,7 +2519,7 @@
           </p:nvSpPr>
           <p:spPr>
             <a:xfrm>
-              <a:off x="1496652" y="3012765"/>
+              <a:off x="1496652" y="2660053"/>
               <a:ext cx="4186447" cy="0"/>
             </a:xfrm>
             <a:custGeom>
@@ -2541,9 +2529,6 @@
                   <a:moveTo>
                     <a:pt x="0" y="0"/>
                   </a:moveTo>
-                  <a:lnTo>
-                    <a:pt x="4186447" y="0"/>
-                  </a:lnTo>
                   <a:lnTo>
                     <a:pt x="4186447" y="0"/>
                   </a:lnTo>
@@ -2574,7 +2559,7 @@
           </p:nvSpPr>
           <p:spPr>
             <a:xfrm>
-              <a:off x="1496652" y="2722940"/>
+              <a:off x="1496652" y="2356253"/>
               <a:ext cx="4186447" cy="0"/>
             </a:xfrm>
             <a:custGeom>
@@ -2584,9 +2569,6 @@
                   <a:moveTo>
                     <a:pt x="0" y="0"/>
                   </a:moveTo>
-                  <a:lnTo>
-                    <a:pt x="4186447" y="0"/>
-                  </a:lnTo>
                   <a:lnTo>
                     <a:pt x="4186447" y="0"/>
                   </a:lnTo>
@@ -2617,7 +2599,7 @@
           </p:nvSpPr>
           <p:spPr>
             <a:xfrm>
-              <a:off x="1496652" y="2433115"/>
+              <a:off x="1496652" y="2052453"/>
               <a:ext cx="4186447" cy="0"/>
             </a:xfrm>
             <a:custGeom>
@@ -2627,9 +2609,6 @@
                   <a:moveTo>
                     <a:pt x="0" y="0"/>
                   </a:moveTo>
-                  <a:lnTo>
-                    <a:pt x="4186447" y="0"/>
-                  </a:lnTo>
                   <a:lnTo>
                     <a:pt x="4186447" y="0"/>
                   </a:lnTo>
@@ -2660,7 +2639,7 @@
           </p:nvSpPr>
           <p:spPr>
             <a:xfrm>
-              <a:off x="1496652" y="2143289"/>
+              <a:off x="1496652" y="1748653"/>
               <a:ext cx="4186447" cy="0"/>
             </a:xfrm>
             <a:custGeom>
@@ -2670,9 +2649,6 @@
                   <a:moveTo>
                     <a:pt x="0" y="0"/>
                   </a:moveTo>
-                  <a:lnTo>
-                    <a:pt x="4186447" y="0"/>
-                  </a:lnTo>
                   <a:lnTo>
                     <a:pt x="4186447" y="0"/>
                   </a:lnTo>
@@ -2703,7 +2679,7 @@
           </p:nvSpPr>
           <p:spPr>
             <a:xfrm>
-              <a:off x="1496652" y="1853464"/>
+              <a:off x="1496652" y="1444853"/>
               <a:ext cx="4186447" cy="0"/>
             </a:xfrm>
             <a:custGeom>
@@ -2713,9 +2689,6 @@
                   <a:moveTo>
                     <a:pt x="0" y="0"/>
                   </a:moveTo>
-                  <a:lnTo>
-                    <a:pt x="4186447" y="0"/>
-                  </a:lnTo>
                   <a:lnTo>
                     <a:pt x="4186447" y="0"/>
                   </a:lnTo>
@@ -2746,7 +2719,7 @@
           </p:nvSpPr>
           <p:spPr>
             <a:xfrm>
-              <a:off x="1496652" y="1563639"/>
+              <a:off x="1496652" y="1141053"/>
               <a:ext cx="4186447" cy="0"/>
             </a:xfrm>
             <a:custGeom>
@@ -2756,9 +2729,6 @@
                   <a:moveTo>
                     <a:pt x="0" y="0"/>
                   </a:moveTo>
-                  <a:lnTo>
-                    <a:pt x="4186447" y="0"/>
-                  </a:lnTo>
                   <a:lnTo>
                     <a:pt x="4186447" y="0"/>
                   </a:lnTo>
@@ -2789,21 +2759,18 @@
           </p:nvSpPr>
           <p:spPr>
             <a:xfrm>
-              <a:off x="1496652" y="1273814"/>
-              <a:ext cx="4186447" cy="0"/>
+              <a:off x="1510748" y="983989"/>
+              <a:ext cx="0" cy="3188077"/>
             </a:xfrm>
             <a:custGeom>
               <a:avLst/>
               <a:pathLst>
-                <a:path w="4186447" h="0">
+                <a:path w="0" h="3188077">
                   <a:moveTo>
+                    <a:pt x="0" y="3188077"/>
+                  </a:moveTo>
+                  <a:lnTo>
                     <a:pt x="0" y="0"/>
-                  </a:moveTo>
-                  <a:lnTo>
-                    <a:pt x="4186447" y="0"/>
-                  </a:lnTo>
-                  <a:lnTo>
-                    <a:pt x="4186447" y="0"/>
                   </a:lnTo>
                 </a:path>
               </a:pathLst>
@@ -2832,21 +2799,18 @@
           </p:nvSpPr>
           <p:spPr>
             <a:xfrm>
-              <a:off x="1496652" y="983989"/>
-              <a:ext cx="4186447" cy="0"/>
+              <a:off x="1863143" y="983989"/>
+              <a:ext cx="0" cy="3188077"/>
             </a:xfrm>
             <a:custGeom>
               <a:avLst/>
               <a:pathLst>
-                <a:path w="4186447" h="0">
+                <a:path w="0" h="3188077">
                   <a:moveTo>
+                    <a:pt x="0" y="3188077"/>
+                  </a:moveTo>
+                  <a:lnTo>
                     <a:pt x="0" y="0"/>
-                  </a:moveTo>
-                  <a:lnTo>
-                    <a:pt x="4186447" y="0"/>
-                  </a:lnTo>
-                  <a:lnTo>
-                    <a:pt x="4186447" y="0"/>
                   </a:lnTo>
                 </a:path>
               </a:pathLst>
@@ -2875,7 +2839,7 @@
           </p:nvSpPr>
           <p:spPr>
             <a:xfrm>
-              <a:off x="1510748" y="983989"/>
+              <a:off x="2215537" y="983989"/>
               <a:ext cx="0" cy="3188077"/>
             </a:xfrm>
             <a:custGeom>
@@ -2885,9 +2849,6 @@
                   <a:moveTo>
                     <a:pt x="0" y="3188077"/>
                   </a:moveTo>
-                  <a:lnTo>
-                    <a:pt x="0" y="0"/>
-                  </a:lnTo>
                   <a:lnTo>
                     <a:pt x="0" y="0"/>
                   </a:lnTo>
@@ -2918,7 +2879,7 @@
           </p:nvSpPr>
           <p:spPr>
             <a:xfrm>
-              <a:off x="1863143" y="983989"/>
+              <a:off x="2567932" y="983989"/>
               <a:ext cx="0" cy="3188077"/>
             </a:xfrm>
             <a:custGeom>
@@ -2928,9 +2889,6 @@
                   <a:moveTo>
                     <a:pt x="0" y="3188077"/>
                   </a:moveTo>
-                  <a:lnTo>
-                    <a:pt x="0" y="0"/>
-                  </a:lnTo>
                   <a:lnTo>
                     <a:pt x="0" y="0"/>
                   </a:lnTo>
@@ -2961,7 +2919,7 @@
           </p:nvSpPr>
           <p:spPr>
             <a:xfrm>
-              <a:off x="2215537" y="983989"/>
+              <a:off x="2920326" y="983989"/>
               <a:ext cx="0" cy="3188077"/>
             </a:xfrm>
             <a:custGeom>
@@ -2971,9 +2929,6 @@
                   <a:moveTo>
                     <a:pt x="0" y="3188077"/>
                   </a:moveTo>
-                  <a:lnTo>
-                    <a:pt x="0" y="0"/>
-                  </a:lnTo>
                   <a:lnTo>
                     <a:pt x="0" y="0"/>
                   </a:lnTo>
@@ -3004,7 +2959,7 @@
           </p:nvSpPr>
           <p:spPr>
             <a:xfrm>
-              <a:off x="2567932" y="983989"/>
+              <a:off x="3272721" y="983989"/>
               <a:ext cx="0" cy="3188077"/>
             </a:xfrm>
             <a:custGeom>
@@ -3014,9 +2969,6 @@
                   <a:moveTo>
                     <a:pt x="0" y="3188077"/>
                   </a:moveTo>
-                  <a:lnTo>
-                    <a:pt x="0" y="0"/>
-                  </a:lnTo>
                   <a:lnTo>
                     <a:pt x="0" y="0"/>
                   </a:lnTo>
@@ -3047,7 +2999,7 @@
           </p:nvSpPr>
           <p:spPr>
             <a:xfrm>
-              <a:off x="2920326" y="983989"/>
+              <a:off x="3625116" y="983989"/>
               <a:ext cx="0" cy="3188077"/>
             </a:xfrm>
             <a:custGeom>
@@ -3057,9 +3009,6 @@
                   <a:moveTo>
                     <a:pt x="0" y="3188077"/>
                   </a:moveTo>
-                  <a:lnTo>
-                    <a:pt x="0" y="0"/>
-                  </a:lnTo>
                   <a:lnTo>
                     <a:pt x="0" y="0"/>
                   </a:lnTo>
@@ -3090,7 +3039,7 @@
           </p:nvSpPr>
           <p:spPr>
             <a:xfrm>
-              <a:off x="3272721" y="983989"/>
+              <a:off x="3977510" y="983989"/>
               <a:ext cx="0" cy="3188077"/>
             </a:xfrm>
             <a:custGeom>
@@ -3100,9 +3049,6 @@
                   <a:moveTo>
                     <a:pt x="0" y="3188077"/>
                   </a:moveTo>
-                  <a:lnTo>
-                    <a:pt x="0" y="0"/>
-                  </a:lnTo>
                   <a:lnTo>
                     <a:pt x="0" y="0"/>
                   </a:lnTo>
@@ -3133,7 +3079,7 @@
           </p:nvSpPr>
           <p:spPr>
             <a:xfrm>
-              <a:off x="3625116" y="983989"/>
+              <a:off x="4329905" y="983989"/>
               <a:ext cx="0" cy="3188077"/>
             </a:xfrm>
             <a:custGeom>
@@ -3143,9 +3089,6 @@
                   <a:moveTo>
                     <a:pt x="0" y="3188077"/>
                   </a:moveTo>
-                  <a:lnTo>
-                    <a:pt x="0" y="0"/>
-                  </a:lnTo>
                   <a:lnTo>
                     <a:pt x="0" y="0"/>
                   </a:lnTo>
@@ -3176,7 +3119,7 @@
           </p:nvSpPr>
           <p:spPr>
             <a:xfrm>
-              <a:off x="3977510" y="983989"/>
+              <a:off x="4682299" y="983989"/>
               <a:ext cx="0" cy="3188077"/>
             </a:xfrm>
             <a:custGeom>
@@ -3186,9 +3129,6 @@
                   <a:moveTo>
                     <a:pt x="0" y="3188077"/>
                   </a:moveTo>
-                  <a:lnTo>
-                    <a:pt x="0" y="0"/>
-                  </a:lnTo>
                   <a:lnTo>
                     <a:pt x="0" y="0"/>
                   </a:lnTo>
@@ -3219,7 +3159,7 @@
           </p:nvSpPr>
           <p:spPr>
             <a:xfrm>
-              <a:off x="4329905" y="983989"/>
+              <a:off x="5034694" y="983989"/>
               <a:ext cx="0" cy="3188077"/>
             </a:xfrm>
             <a:custGeom>
@@ -3229,9 +3169,6 @@
                   <a:moveTo>
                     <a:pt x="0" y="3188077"/>
                   </a:moveTo>
-                  <a:lnTo>
-                    <a:pt x="0" y="0"/>
-                  </a:lnTo>
                   <a:lnTo>
                     <a:pt x="0" y="0"/>
                   </a:lnTo>
@@ -3262,7 +3199,7 @@
           </p:nvSpPr>
           <p:spPr>
             <a:xfrm>
-              <a:off x="4682299" y="983989"/>
+              <a:off x="5387088" y="983989"/>
               <a:ext cx="0" cy="3188077"/>
             </a:xfrm>
             <a:custGeom>
@@ -3272,9 +3209,6 @@
                   <a:moveTo>
                     <a:pt x="0" y="3188077"/>
                   </a:moveTo>
-                  <a:lnTo>
-                    <a:pt x="0" y="0"/>
-                  </a:lnTo>
                   <a:lnTo>
                     <a:pt x="0" y="0"/>
                   </a:lnTo>
@@ -3305,92 +3239,6 @@
           </p:nvSpPr>
           <p:spPr>
             <a:xfrm>
-              <a:off x="5034694" y="983989"/>
-              <a:ext cx="0" cy="3188077"/>
-            </a:xfrm>
-            <a:custGeom>
-              <a:avLst/>
-              <a:pathLst>
-                <a:path w="0" h="3188077">
-                  <a:moveTo>
-                    <a:pt x="0" y="3188077"/>
-                  </a:moveTo>
-                  <a:lnTo>
-                    <a:pt x="0" y="0"/>
-                  </a:lnTo>
-                  <a:lnTo>
-                    <a:pt x="0" y="0"/>
-                  </a:lnTo>
-                </a:path>
-              </a:pathLst>
-            </a:custGeom>
-            <a:ln w="6775" cap="flat">
-              <a:solidFill>
-                <a:srgbClr val="FFFFFF">
-                  <a:alpha val="100000"/>
-                </a:srgbClr>
-              </a:solidFill>
-              <a:prstDash val="solid"/>
-              <a:round/>
-            </a:ln>
-          </p:spPr>
-          <p:txBody>
-            <a:bodyPr/>
-            <a:lstStyle/>
-            <a:p/>
-          </p:txBody>
-        </p:sp>
-        <p:sp>
-          <p:nvSpPr>
-            <p:cNvPr id="30" name="pl29"/>
-            <p:cNvSpPr/>
-            <p:nvPr/>
-          </p:nvSpPr>
-          <p:spPr>
-            <a:xfrm>
-              <a:off x="5387088" y="983989"/>
-              <a:ext cx="0" cy="3188077"/>
-            </a:xfrm>
-            <a:custGeom>
-              <a:avLst/>
-              <a:pathLst>
-                <a:path w="0" h="3188077">
-                  <a:moveTo>
-                    <a:pt x="0" y="3188077"/>
-                  </a:moveTo>
-                  <a:lnTo>
-                    <a:pt x="0" y="0"/>
-                  </a:lnTo>
-                  <a:lnTo>
-                    <a:pt x="0" y="0"/>
-                  </a:lnTo>
-                </a:path>
-              </a:pathLst>
-            </a:custGeom>
-            <a:ln w="6775" cap="flat">
-              <a:solidFill>
-                <a:srgbClr val="FFFFFF">
-                  <a:alpha val="100000"/>
-                </a:srgbClr>
-              </a:solidFill>
-              <a:prstDash val="solid"/>
-              <a:round/>
-            </a:ln>
-          </p:spPr>
-          <p:txBody>
-            <a:bodyPr/>
-            <a:lstStyle/>
-            <a:p/>
-          </p:txBody>
-        </p:sp>
-        <p:sp>
-          <p:nvSpPr>
-            <p:cNvPr id="31" name="pl30"/>
-            <p:cNvSpPr/>
-            <p:nvPr/>
-          </p:nvSpPr>
-          <p:spPr>
-            <a:xfrm>
               <a:off x="1496652" y="4027153"/>
               <a:ext cx="4186447" cy="0"/>
             </a:xfrm>
@@ -3401,9 +3249,6 @@
                   <a:moveTo>
                     <a:pt x="0" y="0"/>
                   </a:moveTo>
-                  <a:lnTo>
-                    <a:pt x="4186447" y="0"/>
-                  </a:lnTo>
                   <a:lnTo>
                     <a:pt x="4186447" y="0"/>
                   </a:lnTo>
@@ -3428,13 +3273,13 @@
         </p:sp>
         <p:sp>
           <p:nvSpPr>
-            <p:cNvPr id="32" name="pl31"/>
-            <p:cNvSpPr/>
-            <p:nvPr/>
-          </p:nvSpPr>
-          <p:spPr>
-            <a:xfrm>
-              <a:off x="1496652" y="3737328"/>
+            <p:cNvPr id="30" name="pl29"/>
+            <p:cNvSpPr/>
+            <p:nvPr/>
+          </p:nvSpPr>
+          <p:spPr>
+            <a:xfrm>
+              <a:off x="1496652" y="3723353"/>
               <a:ext cx="4186447" cy="0"/>
             </a:xfrm>
             <a:custGeom>
@@ -3444,9 +3289,6 @@
                   <a:moveTo>
                     <a:pt x="0" y="0"/>
                   </a:moveTo>
-                  <a:lnTo>
-                    <a:pt x="4186447" y="0"/>
-                  </a:lnTo>
                   <a:lnTo>
                     <a:pt x="4186447" y="0"/>
                   </a:lnTo>
@@ -3471,13 +3313,13 @@
         </p:sp>
         <p:sp>
           <p:nvSpPr>
-            <p:cNvPr id="33" name="pl32"/>
-            <p:cNvSpPr/>
-            <p:nvPr/>
-          </p:nvSpPr>
-          <p:spPr>
-            <a:xfrm>
-              <a:off x="1496652" y="3447503"/>
+            <p:cNvPr id="31" name="pl30"/>
+            <p:cNvSpPr/>
+            <p:nvPr/>
+          </p:nvSpPr>
+          <p:spPr>
+            <a:xfrm>
+              <a:off x="1496652" y="3419553"/>
               <a:ext cx="4186447" cy="0"/>
             </a:xfrm>
             <a:custGeom>
@@ -3487,9 +3329,6 @@
                   <a:moveTo>
                     <a:pt x="0" y="0"/>
                   </a:moveTo>
-                  <a:lnTo>
-                    <a:pt x="4186447" y="0"/>
-                  </a:lnTo>
                   <a:lnTo>
                     <a:pt x="4186447" y="0"/>
                   </a:lnTo>
@@ -3514,13 +3353,13 @@
         </p:sp>
         <p:sp>
           <p:nvSpPr>
-            <p:cNvPr id="34" name="pl33"/>
-            <p:cNvSpPr/>
-            <p:nvPr/>
-          </p:nvSpPr>
-          <p:spPr>
-            <a:xfrm>
-              <a:off x="1496652" y="3157678"/>
+            <p:cNvPr id="32" name="pl31"/>
+            <p:cNvSpPr/>
+            <p:nvPr/>
+          </p:nvSpPr>
+          <p:spPr>
+            <a:xfrm>
+              <a:off x="1496652" y="3115753"/>
               <a:ext cx="4186447" cy="0"/>
             </a:xfrm>
             <a:custGeom>
@@ -3530,9 +3369,6 @@
                   <a:moveTo>
                     <a:pt x="0" y="0"/>
                   </a:moveTo>
-                  <a:lnTo>
-                    <a:pt x="4186447" y="0"/>
-                  </a:lnTo>
                   <a:lnTo>
                     <a:pt x="4186447" y="0"/>
                   </a:lnTo>
@@ -3557,13 +3393,13 @@
         </p:sp>
         <p:sp>
           <p:nvSpPr>
-            <p:cNvPr id="35" name="pl34"/>
-            <p:cNvSpPr/>
-            <p:nvPr/>
-          </p:nvSpPr>
-          <p:spPr>
-            <a:xfrm>
-              <a:off x="1496652" y="2867853"/>
+            <p:cNvPr id="33" name="pl32"/>
+            <p:cNvSpPr/>
+            <p:nvPr/>
+          </p:nvSpPr>
+          <p:spPr>
+            <a:xfrm>
+              <a:off x="1496652" y="2811953"/>
               <a:ext cx="4186447" cy="0"/>
             </a:xfrm>
             <a:custGeom>
@@ -3573,9 +3409,6 @@
                   <a:moveTo>
                     <a:pt x="0" y="0"/>
                   </a:moveTo>
-                  <a:lnTo>
-                    <a:pt x="4186447" y="0"/>
-                  </a:lnTo>
                   <a:lnTo>
                     <a:pt x="4186447" y="0"/>
                   </a:lnTo>
@@ -3600,13 +3433,13 @@
         </p:sp>
         <p:sp>
           <p:nvSpPr>
-            <p:cNvPr id="36" name="pl35"/>
-            <p:cNvSpPr/>
-            <p:nvPr/>
-          </p:nvSpPr>
-          <p:spPr>
-            <a:xfrm>
-              <a:off x="1496652" y="2578027"/>
+            <p:cNvPr id="34" name="pl33"/>
+            <p:cNvSpPr/>
+            <p:nvPr/>
+          </p:nvSpPr>
+          <p:spPr>
+            <a:xfrm>
+              <a:off x="1496652" y="2508153"/>
               <a:ext cx="4186447" cy="0"/>
             </a:xfrm>
             <a:custGeom>
@@ -3616,9 +3449,6 @@
                   <a:moveTo>
                     <a:pt x="0" y="0"/>
                   </a:moveTo>
-                  <a:lnTo>
-                    <a:pt x="4186447" y="0"/>
-                  </a:lnTo>
                   <a:lnTo>
                     <a:pt x="4186447" y="0"/>
                   </a:lnTo>
@@ -3643,13 +3473,13 @@
         </p:sp>
         <p:sp>
           <p:nvSpPr>
-            <p:cNvPr id="37" name="pl36"/>
-            <p:cNvSpPr/>
-            <p:nvPr/>
-          </p:nvSpPr>
-          <p:spPr>
-            <a:xfrm>
-              <a:off x="1496652" y="2288202"/>
+            <p:cNvPr id="35" name="pl34"/>
+            <p:cNvSpPr/>
+            <p:nvPr/>
+          </p:nvSpPr>
+          <p:spPr>
+            <a:xfrm>
+              <a:off x="1496652" y="2204353"/>
               <a:ext cx="4186447" cy="0"/>
             </a:xfrm>
             <a:custGeom>
@@ -3659,9 +3489,6 @@
                   <a:moveTo>
                     <a:pt x="0" y="0"/>
                   </a:moveTo>
-                  <a:lnTo>
-                    <a:pt x="4186447" y="0"/>
-                  </a:lnTo>
                   <a:lnTo>
                     <a:pt x="4186447" y="0"/>
                   </a:lnTo>
@@ -3686,13 +3513,13 @@
         </p:sp>
         <p:sp>
           <p:nvSpPr>
-            <p:cNvPr id="38" name="pl37"/>
-            <p:cNvSpPr/>
-            <p:nvPr/>
-          </p:nvSpPr>
-          <p:spPr>
-            <a:xfrm>
-              <a:off x="1496652" y="1998377"/>
+            <p:cNvPr id="36" name="pl35"/>
+            <p:cNvSpPr/>
+            <p:nvPr/>
+          </p:nvSpPr>
+          <p:spPr>
+            <a:xfrm>
+              <a:off x="1496652" y="1900553"/>
               <a:ext cx="4186447" cy="0"/>
             </a:xfrm>
             <a:custGeom>
@@ -3702,9 +3529,6 @@
                   <a:moveTo>
                     <a:pt x="0" y="0"/>
                   </a:moveTo>
-                  <a:lnTo>
-                    <a:pt x="4186447" y="0"/>
-                  </a:lnTo>
                   <a:lnTo>
                     <a:pt x="4186447" y="0"/>
                   </a:lnTo>
@@ -3729,13 +3553,13 @@
         </p:sp>
         <p:sp>
           <p:nvSpPr>
-            <p:cNvPr id="39" name="pl38"/>
-            <p:cNvSpPr/>
-            <p:nvPr/>
-          </p:nvSpPr>
-          <p:spPr>
-            <a:xfrm>
-              <a:off x="1496652" y="1708552"/>
+            <p:cNvPr id="37" name="pl36"/>
+            <p:cNvSpPr/>
+            <p:nvPr/>
+          </p:nvSpPr>
+          <p:spPr>
+            <a:xfrm>
+              <a:off x="1496652" y="1596753"/>
               <a:ext cx="4186447" cy="0"/>
             </a:xfrm>
             <a:custGeom>
@@ -3745,9 +3569,6 @@
                   <a:moveTo>
                     <a:pt x="0" y="0"/>
                   </a:moveTo>
-                  <a:lnTo>
-                    <a:pt x="4186447" y="0"/>
-                  </a:lnTo>
                   <a:lnTo>
                     <a:pt x="4186447" y="0"/>
                   </a:lnTo>
@@ -3772,13 +3593,13 @@
         </p:sp>
         <p:sp>
           <p:nvSpPr>
-            <p:cNvPr id="40" name="pl39"/>
-            <p:cNvSpPr/>
-            <p:nvPr/>
-          </p:nvSpPr>
-          <p:spPr>
-            <a:xfrm>
-              <a:off x="1496652" y="1418726"/>
+            <p:cNvPr id="38" name="pl37"/>
+            <p:cNvSpPr/>
+            <p:nvPr/>
+          </p:nvSpPr>
+          <p:spPr>
+            <a:xfrm>
+              <a:off x="1496652" y="1292953"/>
               <a:ext cx="4186447" cy="0"/>
             </a:xfrm>
             <a:custGeom>
@@ -3788,9 +3609,6 @@
                   <a:moveTo>
                     <a:pt x="0" y="0"/>
                   </a:moveTo>
-                  <a:lnTo>
-                    <a:pt x="4186447" y="0"/>
-                  </a:lnTo>
                   <a:lnTo>
                     <a:pt x="4186447" y="0"/>
                   </a:lnTo>
@@ -3815,13 +3633,13 @@
         </p:sp>
         <p:sp>
           <p:nvSpPr>
-            <p:cNvPr id="41" name="pl40"/>
-            <p:cNvSpPr/>
-            <p:nvPr/>
-          </p:nvSpPr>
-          <p:spPr>
-            <a:xfrm>
-              <a:off x="1496652" y="1128901"/>
+            <p:cNvPr id="39" name="pl38"/>
+            <p:cNvSpPr/>
+            <p:nvPr/>
+          </p:nvSpPr>
+          <p:spPr>
+            <a:xfrm>
+              <a:off x="1496652" y="989153"/>
               <a:ext cx="4186447" cy="0"/>
             </a:xfrm>
             <a:custGeom>
@@ -3831,9 +3649,6 @@
                   <a:moveTo>
                     <a:pt x="0" y="0"/>
                   </a:moveTo>
-                  <a:lnTo>
-                    <a:pt x="4186447" y="0"/>
-                  </a:lnTo>
                   <a:lnTo>
                     <a:pt x="4186447" y="0"/>
                   </a:lnTo>
@@ -3858,7 +3673,7 @@
         </p:sp>
         <p:sp>
           <p:nvSpPr>
-            <p:cNvPr id="42" name="pl41"/>
+            <p:cNvPr id="40" name="pl39"/>
             <p:cNvSpPr/>
             <p:nvPr/>
           </p:nvSpPr>
@@ -3874,9 +3689,6 @@
                   <a:moveTo>
                     <a:pt x="0" y="3188077"/>
                   </a:moveTo>
-                  <a:lnTo>
-                    <a:pt x="0" y="0"/>
-                  </a:lnTo>
                   <a:lnTo>
                     <a:pt x="0" y="0"/>
                   </a:lnTo>
@@ -3901,7 +3713,7 @@
         </p:sp>
         <p:sp>
           <p:nvSpPr>
-            <p:cNvPr id="43" name="pl42"/>
+            <p:cNvPr id="41" name="pl40"/>
             <p:cNvSpPr/>
             <p:nvPr/>
           </p:nvSpPr>
@@ -3917,9 +3729,6 @@
                   <a:moveTo>
                     <a:pt x="0" y="3188077"/>
                   </a:moveTo>
-                  <a:lnTo>
-                    <a:pt x="0" y="0"/>
-                  </a:lnTo>
                   <a:lnTo>
                     <a:pt x="0" y="0"/>
                   </a:lnTo>
@@ -3944,7 +3753,7 @@
         </p:sp>
         <p:sp>
           <p:nvSpPr>
-            <p:cNvPr id="44" name="pl43"/>
+            <p:cNvPr id="42" name="pl41"/>
             <p:cNvSpPr/>
             <p:nvPr/>
           </p:nvSpPr>
@@ -3960,9 +3769,6 @@
                   <a:moveTo>
                     <a:pt x="0" y="3188077"/>
                   </a:moveTo>
-                  <a:lnTo>
-                    <a:pt x="0" y="0"/>
-                  </a:lnTo>
                   <a:lnTo>
                     <a:pt x="0" y="0"/>
                   </a:lnTo>
@@ -3987,7 +3793,7 @@
         </p:sp>
         <p:sp>
           <p:nvSpPr>
-            <p:cNvPr id="45" name="pl44"/>
+            <p:cNvPr id="43" name="pl42"/>
             <p:cNvSpPr/>
             <p:nvPr/>
           </p:nvSpPr>
@@ -4003,9 +3809,6 @@
                   <a:moveTo>
                     <a:pt x="0" y="3188077"/>
                   </a:moveTo>
-                  <a:lnTo>
-                    <a:pt x="0" y="0"/>
-                  </a:lnTo>
                   <a:lnTo>
                     <a:pt x="0" y="0"/>
                   </a:lnTo>
@@ -4030,7 +3833,7 @@
         </p:sp>
         <p:sp>
           <p:nvSpPr>
-            <p:cNvPr id="46" name="pl45"/>
+            <p:cNvPr id="44" name="pl43"/>
             <p:cNvSpPr/>
             <p:nvPr/>
           </p:nvSpPr>
@@ -4046,9 +3849,6 @@
                   <a:moveTo>
                     <a:pt x="0" y="3188077"/>
                   </a:moveTo>
-                  <a:lnTo>
-                    <a:pt x="0" y="0"/>
-                  </a:lnTo>
                   <a:lnTo>
                     <a:pt x="0" y="0"/>
                   </a:lnTo>
@@ -4073,7 +3873,7 @@
         </p:sp>
         <p:sp>
           <p:nvSpPr>
-            <p:cNvPr id="47" name="pl46"/>
+            <p:cNvPr id="45" name="pl44"/>
             <p:cNvSpPr/>
             <p:nvPr/>
           </p:nvSpPr>
@@ -4089,9 +3889,6 @@
                   <a:moveTo>
                     <a:pt x="0" y="3188077"/>
                   </a:moveTo>
-                  <a:lnTo>
-                    <a:pt x="0" y="0"/>
-                  </a:lnTo>
                   <a:lnTo>
                     <a:pt x="0" y="0"/>
                   </a:lnTo>
@@ -4116,7 +3913,7 @@
         </p:sp>
         <p:sp>
           <p:nvSpPr>
-            <p:cNvPr id="48" name="pl47"/>
+            <p:cNvPr id="46" name="pl45"/>
             <p:cNvSpPr/>
             <p:nvPr/>
           </p:nvSpPr>
@@ -4132,9 +3929,6 @@
                   <a:moveTo>
                     <a:pt x="0" y="3188077"/>
                   </a:moveTo>
-                  <a:lnTo>
-                    <a:pt x="0" y="0"/>
-                  </a:lnTo>
                   <a:lnTo>
                     <a:pt x="0" y="0"/>
                   </a:lnTo>
@@ -4159,7 +3953,7 @@
         </p:sp>
         <p:sp>
           <p:nvSpPr>
-            <p:cNvPr id="49" name="pl48"/>
+            <p:cNvPr id="47" name="pl46"/>
             <p:cNvSpPr/>
             <p:nvPr/>
           </p:nvSpPr>
@@ -4175,9 +3969,6 @@
                   <a:moveTo>
                     <a:pt x="0" y="3188077"/>
                   </a:moveTo>
-                  <a:lnTo>
-                    <a:pt x="0" y="0"/>
-                  </a:lnTo>
                   <a:lnTo>
                     <a:pt x="0" y="0"/>
                   </a:lnTo>
@@ -4202,7 +3993,7 @@
         </p:sp>
         <p:sp>
           <p:nvSpPr>
-            <p:cNvPr id="50" name="pl49"/>
+            <p:cNvPr id="48" name="pl47"/>
             <p:cNvSpPr/>
             <p:nvPr/>
           </p:nvSpPr>
@@ -4218,9 +4009,6 @@
                   <a:moveTo>
                     <a:pt x="0" y="3188077"/>
                   </a:moveTo>
-                  <a:lnTo>
-                    <a:pt x="0" y="0"/>
-                  </a:lnTo>
                   <a:lnTo>
                     <a:pt x="0" y="0"/>
                   </a:lnTo>
@@ -4245,7 +4033,7 @@
         </p:sp>
         <p:sp>
           <p:nvSpPr>
-            <p:cNvPr id="51" name="pl50"/>
+            <p:cNvPr id="49" name="pl48"/>
             <p:cNvSpPr/>
             <p:nvPr/>
           </p:nvSpPr>
@@ -4261,9 +4049,6 @@
                   <a:moveTo>
                     <a:pt x="0" y="3188077"/>
                   </a:moveTo>
-                  <a:lnTo>
-                    <a:pt x="0" y="0"/>
-                  </a:lnTo>
                   <a:lnTo>
                     <a:pt x="0" y="0"/>
                   </a:lnTo>
@@ -4288,7 +4073,7 @@
         </p:sp>
         <p:sp>
           <p:nvSpPr>
-            <p:cNvPr id="52" name="pl51"/>
+            <p:cNvPr id="50" name="pl49"/>
             <p:cNvSpPr/>
             <p:nvPr/>
           </p:nvSpPr>
@@ -4304,9 +4089,6 @@
                   <a:moveTo>
                     <a:pt x="0" y="3188077"/>
                   </a:moveTo>
-                  <a:lnTo>
-                    <a:pt x="0" y="0"/>
-                  </a:lnTo>
                   <a:lnTo>
                     <a:pt x="0" y="0"/>
                   </a:lnTo>
@@ -4331,7 +4113,7 @@
         </p:sp>
         <p:sp>
           <p:nvSpPr>
-            <p:cNvPr id="53" name="pl52"/>
+            <p:cNvPr id="51" name="pl50"/>
             <p:cNvSpPr/>
             <p:nvPr/>
           </p:nvSpPr>
@@ -4347,9 +4129,6 @@
                   <a:moveTo>
                     <a:pt x="0" y="3188077"/>
                   </a:moveTo>
-                  <a:lnTo>
-                    <a:pt x="0" y="0"/>
-                  </a:lnTo>
                   <a:lnTo>
                     <a:pt x="0" y="0"/>
                   </a:lnTo>
@@ -4374,19 +4153,19 @@
         </p:sp>
         <p:sp>
           <p:nvSpPr>
-            <p:cNvPr id="54" name="pl53"/>
-            <p:cNvSpPr/>
-            <p:nvPr/>
-          </p:nvSpPr>
-          <p:spPr>
-            <a:xfrm>
-              <a:off x="1686945" y="1128901"/>
-              <a:ext cx="3805861" cy="1033709"/>
+            <p:cNvPr id="52" name="pl51"/>
+            <p:cNvSpPr/>
+            <p:nvPr/>
+          </p:nvSpPr>
+          <p:spPr>
+            <a:xfrm>
+              <a:off x="1686945" y="989153"/>
+              <a:ext cx="3805861" cy="1083553"/>
             </a:xfrm>
             <a:custGeom>
               <a:avLst/>
               <a:pathLst>
-                <a:path w="3805861" h="1033709">
+                <a:path w="3805861" h="1083553">
                   <a:moveTo>
                     <a:pt x="0" y="0"/>
                   </a:moveTo>
@@ -4394,151 +4173,151 @@
                     <a:pt x="1621014" y="0"/>
                   </a:lnTo>
                   <a:lnTo>
-                    <a:pt x="1621014" y="9660"/>
-                  </a:lnTo>
-                  <a:lnTo>
-                    <a:pt x="1832451" y="9660"/>
-                  </a:lnTo>
-                  <a:lnTo>
-                    <a:pt x="1832451" y="57965"/>
-                  </a:lnTo>
-                  <a:lnTo>
-                    <a:pt x="1902930" y="57965"/>
-                  </a:lnTo>
-                  <a:lnTo>
-                    <a:pt x="1902930" y="96608"/>
-                  </a:lnTo>
-                  <a:lnTo>
-                    <a:pt x="2043888" y="96608"/>
-                  </a:lnTo>
-                  <a:lnTo>
-                    <a:pt x="2043888" y="106269"/>
-                  </a:lnTo>
-                  <a:lnTo>
-                    <a:pt x="2114367" y="106269"/>
-                  </a:lnTo>
-                  <a:lnTo>
-                    <a:pt x="2114367" y="135251"/>
-                  </a:lnTo>
-                  <a:lnTo>
-                    <a:pt x="2184846" y="135251"/>
-                  </a:lnTo>
-                  <a:lnTo>
-                    <a:pt x="2184846" y="173895"/>
-                  </a:lnTo>
-                  <a:lnTo>
-                    <a:pt x="2255325" y="173895"/>
-                  </a:lnTo>
-                  <a:lnTo>
-                    <a:pt x="2255325" y="251181"/>
-                  </a:lnTo>
-                  <a:lnTo>
-                    <a:pt x="2325804" y="251181"/>
-                  </a:lnTo>
-                  <a:lnTo>
-                    <a:pt x="2325804" y="309146"/>
-                  </a:lnTo>
-                  <a:lnTo>
-                    <a:pt x="2396283" y="309146"/>
-                  </a:lnTo>
-                  <a:lnTo>
-                    <a:pt x="2396283" y="367111"/>
-                  </a:lnTo>
-                  <a:lnTo>
-                    <a:pt x="2466761" y="367111"/>
-                  </a:lnTo>
-                  <a:lnTo>
-                    <a:pt x="2466761" y="444398"/>
-                  </a:lnTo>
-                  <a:lnTo>
-                    <a:pt x="2537240" y="444398"/>
-                  </a:lnTo>
-                  <a:lnTo>
-                    <a:pt x="2537240" y="550667"/>
-                  </a:lnTo>
-                  <a:lnTo>
-                    <a:pt x="2607719" y="550667"/>
-                  </a:lnTo>
-                  <a:lnTo>
-                    <a:pt x="2607719" y="627954"/>
-                  </a:lnTo>
-                  <a:lnTo>
-                    <a:pt x="2678198" y="627954"/>
-                  </a:lnTo>
-                  <a:lnTo>
-                    <a:pt x="2678198" y="656937"/>
-                  </a:lnTo>
-                  <a:lnTo>
-                    <a:pt x="2748677" y="656937"/>
-                  </a:lnTo>
-                  <a:lnTo>
-                    <a:pt x="2748677" y="695580"/>
-                  </a:lnTo>
-                  <a:lnTo>
-                    <a:pt x="2819156" y="695580"/>
-                  </a:lnTo>
-                  <a:lnTo>
-                    <a:pt x="2819156" y="753545"/>
-                  </a:lnTo>
-                  <a:lnTo>
-                    <a:pt x="2889635" y="753545"/>
-                  </a:lnTo>
-                  <a:lnTo>
-                    <a:pt x="2889635" y="772867"/>
-                  </a:lnTo>
-                  <a:lnTo>
-                    <a:pt x="3030593" y="772867"/>
-                  </a:lnTo>
-                  <a:lnTo>
-                    <a:pt x="3030593" y="792188"/>
-                  </a:lnTo>
-                  <a:lnTo>
-                    <a:pt x="3101072" y="792188"/>
-                  </a:lnTo>
-                  <a:lnTo>
-                    <a:pt x="3101072" y="811510"/>
-                  </a:lnTo>
-                  <a:lnTo>
-                    <a:pt x="3171551" y="811510"/>
-                  </a:lnTo>
-                  <a:lnTo>
-                    <a:pt x="3171551" y="869475"/>
-                  </a:lnTo>
-                  <a:lnTo>
-                    <a:pt x="3242029" y="869475"/>
-                  </a:lnTo>
-                  <a:lnTo>
-                    <a:pt x="3242029" y="879136"/>
-                  </a:lnTo>
-                  <a:lnTo>
-                    <a:pt x="3312508" y="879136"/>
-                  </a:lnTo>
-                  <a:lnTo>
-                    <a:pt x="3312508" y="917779"/>
-                  </a:lnTo>
-                  <a:lnTo>
-                    <a:pt x="3382987" y="917779"/>
-                  </a:lnTo>
-                  <a:lnTo>
-                    <a:pt x="3382987" y="975744"/>
-                  </a:lnTo>
-                  <a:lnTo>
-                    <a:pt x="3453466" y="975744"/>
-                  </a:lnTo>
-                  <a:lnTo>
-                    <a:pt x="3453466" y="1004727"/>
-                  </a:lnTo>
-                  <a:lnTo>
-                    <a:pt x="3523945" y="1004727"/>
-                  </a:lnTo>
-                  <a:lnTo>
-                    <a:pt x="3523945" y="1024049"/>
-                  </a:lnTo>
-                  <a:lnTo>
-                    <a:pt x="3805861" y="1024049"/>
-                  </a:lnTo>
-                  <a:lnTo>
-                    <a:pt x="3805861" y="1033709"/>
+                    <a:pt x="1621014" y="10126"/>
+                  </a:lnTo>
+                  <a:lnTo>
+                    <a:pt x="1832451" y="10126"/>
+                  </a:lnTo>
+                  <a:lnTo>
+                    <a:pt x="1832451" y="60760"/>
+                  </a:lnTo>
+                  <a:lnTo>
+                    <a:pt x="1902930" y="60760"/>
+                  </a:lnTo>
+                  <a:lnTo>
+                    <a:pt x="1902930" y="101266"/>
+                  </a:lnTo>
+                  <a:lnTo>
+                    <a:pt x="2043888" y="101266"/>
+                  </a:lnTo>
+                  <a:lnTo>
+                    <a:pt x="2043888" y="111393"/>
+                  </a:lnTo>
+                  <a:lnTo>
+                    <a:pt x="2114367" y="111393"/>
+                  </a:lnTo>
+                  <a:lnTo>
+                    <a:pt x="2114367" y="141773"/>
+                  </a:lnTo>
+                  <a:lnTo>
+                    <a:pt x="2184846" y="141773"/>
+                  </a:lnTo>
+                  <a:lnTo>
+                    <a:pt x="2184846" y="182280"/>
+                  </a:lnTo>
+                  <a:lnTo>
+                    <a:pt x="2255325" y="182280"/>
+                  </a:lnTo>
+                  <a:lnTo>
+                    <a:pt x="2255325" y="263293"/>
+                  </a:lnTo>
+                  <a:lnTo>
+                    <a:pt x="2325804" y="263293"/>
+                  </a:lnTo>
+                  <a:lnTo>
+                    <a:pt x="2325804" y="324053"/>
+                  </a:lnTo>
+                  <a:lnTo>
+                    <a:pt x="2396283" y="324053"/>
+                  </a:lnTo>
+                  <a:lnTo>
+                    <a:pt x="2396283" y="384813"/>
+                  </a:lnTo>
+                  <a:lnTo>
+                    <a:pt x="2466761" y="384813"/>
+                  </a:lnTo>
+                  <a:lnTo>
+                    <a:pt x="2466761" y="465826"/>
+                  </a:lnTo>
+                  <a:lnTo>
+                    <a:pt x="2537240" y="465826"/>
+                  </a:lnTo>
+                  <a:lnTo>
+                    <a:pt x="2537240" y="577220"/>
+                  </a:lnTo>
+                  <a:lnTo>
+                    <a:pt x="2607719" y="577220"/>
+                  </a:lnTo>
+                  <a:lnTo>
+                    <a:pt x="2607719" y="658233"/>
+                  </a:lnTo>
+                  <a:lnTo>
+                    <a:pt x="2678198" y="658233"/>
+                  </a:lnTo>
+                  <a:lnTo>
+                    <a:pt x="2678198" y="688613"/>
+                  </a:lnTo>
+                  <a:lnTo>
+                    <a:pt x="2748677" y="688613"/>
+                  </a:lnTo>
+                  <a:lnTo>
+                    <a:pt x="2748677" y="729120"/>
+                  </a:lnTo>
+                  <a:lnTo>
+                    <a:pt x="2819156" y="729120"/>
+                  </a:lnTo>
+                  <a:lnTo>
+                    <a:pt x="2819156" y="789880"/>
+                  </a:lnTo>
+                  <a:lnTo>
+                    <a:pt x="2889635" y="789880"/>
+                  </a:lnTo>
+                  <a:lnTo>
+                    <a:pt x="2889635" y="810133"/>
+                  </a:lnTo>
+                  <a:lnTo>
+                    <a:pt x="3030593" y="810133"/>
+                  </a:lnTo>
+                  <a:lnTo>
+                    <a:pt x="3030593" y="830386"/>
+                  </a:lnTo>
+                  <a:lnTo>
+                    <a:pt x="3101072" y="830386"/>
+                  </a:lnTo>
+                  <a:lnTo>
+                    <a:pt x="3101072" y="850640"/>
+                  </a:lnTo>
+                  <a:lnTo>
+                    <a:pt x="3171551" y="850640"/>
+                  </a:lnTo>
+                  <a:lnTo>
+                    <a:pt x="3171551" y="911400"/>
+                  </a:lnTo>
+                  <a:lnTo>
+                    <a:pt x="3242029" y="911400"/>
+                  </a:lnTo>
+                  <a:lnTo>
+                    <a:pt x="3242029" y="921526"/>
+                  </a:lnTo>
+                  <a:lnTo>
+                    <a:pt x="3312508" y="921526"/>
+                  </a:lnTo>
+                  <a:lnTo>
+                    <a:pt x="3312508" y="962033"/>
+                  </a:lnTo>
+                  <a:lnTo>
+                    <a:pt x="3382987" y="962033"/>
+                  </a:lnTo>
+                  <a:lnTo>
+                    <a:pt x="3382987" y="1022793"/>
+                  </a:lnTo>
+                  <a:lnTo>
+                    <a:pt x="3453466" y="1022793"/>
+                  </a:lnTo>
+                  <a:lnTo>
+                    <a:pt x="3453466" y="1053173"/>
+                  </a:lnTo>
+                  <a:lnTo>
+                    <a:pt x="3523945" y="1053173"/>
+                  </a:lnTo>
+                  <a:lnTo>
+                    <a:pt x="3523945" y="1073426"/>
+                  </a:lnTo>
+                  <a:lnTo>
+                    <a:pt x="3805861" y="1073426"/>
+                  </a:lnTo>
+                  <a:lnTo>
+                    <a:pt x="3805861" y="1083553"/>
                   </a:lnTo>
                 </a:path>
               </a:pathLst>
@@ -4561,19 +4340,19 @@
         </p:sp>
         <p:sp>
           <p:nvSpPr>
-            <p:cNvPr id="55" name="pl54"/>
-            <p:cNvSpPr/>
-            <p:nvPr/>
-          </p:nvSpPr>
-          <p:spPr>
-            <a:xfrm>
-              <a:off x="1686945" y="1128901"/>
-              <a:ext cx="3805861" cy="1043370"/>
+            <p:cNvPr id="53" name="pl52"/>
+            <p:cNvSpPr/>
+            <p:nvPr/>
+          </p:nvSpPr>
+          <p:spPr>
+            <a:xfrm>
+              <a:off x="1686945" y="989153"/>
+              <a:ext cx="3805861" cy="1093680"/>
             </a:xfrm>
             <a:custGeom>
               <a:avLst/>
               <a:pathLst>
-                <a:path w="3805861" h="1043370">
+                <a:path w="3805861" h="1093680">
                   <a:moveTo>
                     <a:pt x="0" y="0"/>
                   </a:moveTo>
@@ -4581,175 +4360,175 @@
                     <a:pt x="0" y="0"/>
                   </a:lnTo>
                   <a:lnTo>
-                    <a:pt x="0" y="9660"/>
-                  </a:lnTo>
-                  <a:lnTo>
-                    <a:pt x="281915" y="9660"/>
-                  </a:lnTo>
-                  <a:lnTo>
-                    <a:pt x="281915" y="19321"/>
-                  </a:lnTo>
-                  <a:lnTo>
-                    <a:pt x="493352" y="19321"/>
-                  </a:lnTo>
-                  <a:lnTo>
-                    <a:pt x="493352" y="28982"/>
-                  </a:lnTo>
-                  <a:lnTo>
-                    <a:pt x="1339099" y="28982"/>
-                  </a:lnTo>
-                  <a:lnTo>
-                    <a:pt x="1339099" y="38643"/>
-                  </a:lnTo>
-                  <a:lnTo>
-                    <a:pt x="1409578" y="38643"/>
-                  </a:lnTo>
-                  <a:lnTo>
-                    <a:pt x="1409578" y="57965"/>
-                  </a:lnTo>
-                  <a:lnTo>
-                    <a:pt x="1480057" y="57965"/>
-                  </a:lnTo>
-                  <a:lnTo>
-                    <a:pt x="1480057" y="67625"/>
-                  </a:lnTo>
-                  <a:lnTo>
-                    <a:pt x="1550536" y="67625"/>
-                  </a:lnTo>
-                  <a:lnTo>
-                    <a:pt x="1550536" y="86947"/>
-                  </a:lnTo>
-                  <a:lnTo>
-                    <a:pt x="1691493" y="86947"/>
-                  </a:lnTo>
-                  <a:lnTo>
-                    <a:pt x="1691493" y="106269"/>
-                  </a:lnTo>
-                  <a:lnTo>
-                    <a:pt x="1761972" y="106269"/>
-                  </a:lnTo>
-                  <a:lnTo>
-                    <a:pt x="1761972" y="125590"/>
-                  </a:lnTo>
-                  <a:lnTo>
-                    <a:pt x="1832451" y="125590"/>
-                  </a:lnTo>
-                  <a:lnTo>
-                    <a:pt x="1832451" y="164234"/>
-                  </a:lnTo>
-                  <a:lnTo>
-                    <a:pt x="1902930" y="164234"/>
-                  </a:lnTo>
-                  <a:lnTo>
-                    <a:pt x="1902930" y="241521"/>
-                  </a:lnTo>
-                  <a:lnTo>
-                    <a:pt x="1973409" y="241521"/>
-                  </a:lnTo>
-                  <a:lnTo>
-                    <a:pt x="1973409" y="280164"/>
-                  </a:lnTo>
-                  <a:lnTo>
-                    <a:pt x="2043888" y="280164"/>
-                  </a:lnTo>
-                  <a:lnTo>
-                    <a:pt x="2043888" y="357451"/>
-                  </a:lnTo>
-                  <a:lnTo>
-                    <a:pt x="2114367" y="357451"/>
-                  </a:lnTo>
-                  <a:lnTo>
-                    <a:pt x="2114367" y="502363"/>
-                  </a:lnTo>
-                  <a:lnTo>
-                    <a:pt x="2184846" y="502363"/>
-                  </a:lnTo>
-                  <a:lnTo>
-                    <a:pt x="2184846" y="560328"/>
-                  </a:lnTo>
-                  <a:lnTo>
-                    <a:pt x="2255325" y="560328"/>
-                  </a:lnTo>
-                  <a:lnTo>
-                    <a:pt x="2255325" y="589311"/>
-                  </a:lnTo>
-                  <a:lnTo>
-                    <a:pt x="2325804" y="589311"/>
-                  </a:lnTo>
-                  <a:lnTo>
-                    <a:pt x="2325804" y="676258"/>
-                  </a:lnTo>
-                  <a:lnTo>
-                    <a:pt x="2396283" y="676258"/>
-                  </a:lnTo>
-                  <a:lnTo>
-                    <a:pt x="2396283" y="734223"/>
-                  </a:lnTo>
-                  <a:lnTo>
-                    <a:pt x="2466761" y="734223"/>
-                  </a:lnTo>
-                  <a:lnTo>
-                    <a:pt x="2466761" y="811510"/>
-                  </a:lnTo>
-                  <a:lnTo>
-                    <a:pt x="2537240" y="811510"/>
-                  </a:lnTo>
-                  <a:lnTo>
-                    <a:pt x="2537240" y="850154"/>
-                  </a:lnTo>
-                  <a:lnTo>
-                    <a:pt x="2607719" y="850154"/>
-                  </a:lnTo>
-                  <a:lnTo>
-                    <a:pt x="2607719" y="908119"/>
-                  </a:lnTo>
-                  <a:lnTo>
-                    <a:pt x="2678198" y="908119"/>
-                  </a:lnTo>
-                  <a:lnTo>
-                    <a:pt x="2678198" y="937101"/>
-                  </a:lnTo>
-                  <a:lnTo>
-                    <a:pt x="2819156" y="937101"/>
-                  </a:lnTo>
-                  <a:lnTo>
-                    <a:pt x="2819156" y="966084"/>
-                  </a:lnTo>
-                  <a:lnTo>
-                    <a:pt x="2889635" y="966084"/>
-                  </a:lnTo>
-                  <a:lnTo>
-                    <a:pt x="2889635" y="985405"/>
-                  </a:lnTo>
-                  <a:lnTo>
-                    <a:pt x="2960114" y="985405"/>
-                  </a:lnTo>
-                  <a:lnTo>
-                    <a:pt x="2960114" y="995066"/>
-                  </a:lnTo>
-                  <a:lnTo>
-                    <a:pt x="3030593" y="995066"/>
-                  </a:lnTo>
-                  <a:lnTo>
-                    <a:pt x="3030593" y="1024049"/>
-                  </a:lnTo>
-                  <a:lnTo>
-                    <a:pt x="3382987" y="1024049"/>
-                  </a:lnTo>
-                  <a:lnTo>
-                    <a:pt x="3382987" y="1033709"/>
-                  </a:lnTo>
-                  <a:lnTo>
-                    <a:pt x="3453466" y="1033709"/>
-                  </a:lnTo>
-                  <a:lnTo>
-                    <a:pt x="3453466" y="1043370"/>
-                  </a:lnTo>
-                  <a:lnTo>
-                    <a:pt x="3805861" y="1043370"/>
-                  </a:lnTo>
-                  <a:lnTo>
-                    <a:pt x="3805861" y="1043370"/>
+                    <a:pt x="0" y="10126"/>
+                  </a:lnTo>
+                  <a:lnTo>
+                    <a:pt x="281915" y="10126"/>
+                  </a:lnTo>
+                  <a:lnTo>
+                    <a:pt x="281915" y="20253"/>
+                  </a:lnTo>
+                  <a:lnTo>
+                    <a:pt x="493352" y="20253"/>
+                  </a:lnTo>
+                  <a:lnTo>
+                    <a:pt x="493352" y="30380"/>
+                  </a:lnTo>
+                  <a:lnTo>
+                    <a:pt x="1339099" y="30380"/>
+                  </a:lnTo>
+                  <a:lnTo>
+                    <a:pt x="1339099" y="40506"/>
+                  </a:lnTo>
+                  <a:lnTo>
+                    <a:pt x="1409578" y="40506"/>
+                  </a:lnTo>
+                  <a:lnTo>
+                    <a:pt x="1409578" y="60760"/>
+                  </a:lnTo>
+                  <a:lnTo>
+                    <a:pt x="1480057" y="60760"/>
+                  </a:lnTo>
+                  <a:lnTo>
+                    <a:pt x="1480057" y="70886"/>
+                  </a:lnTo>
+                  <a:lnTo>
+                    <a:pt x="1550536" y="70886"/>
+                  </a:lnTo>
+                  <a:lnTo>
+                    <a:pt x="1550536" y="91140"/>
+                  </a:lnTo>
+                  <a:lnTo>
+                    <a:pt x="1691493" y="91140"/>
+                  </a:lnTo>
+                  <a:lnTo>
+                    <a:pt x="1691493" y="111393"/>
+                  </a:lnTo>
+                  <a:lnTo>
+                    <a:pt x="1761972" y="111393"/>
+                  </a:lnTo>
+                  <a:lnTo>
+                    <a:pt x="1761972" y="131646"/>
+                  </a:lnTo>
+                  <a:lnTo>
+                    <a:pt x="1832451" y="131646"/>
+                  </a:lnTo>
+                  <a:lnTo>
+                    <a:pt x="1832451" y="172153"/>
+                  </a:lnTo>
+                  <a:lnTo>
+                    <a:pt x="1902930" y="172153"/>
+                  </a:lnTo>
+                  <a:lnTo>
+                    <a:pt x="1902930" y="253166"/>
+                  </a:lnTo>
+                  <a:lnTo>
+                    <a:pt x="1973409" y="253166"/>
+                  </a:lnTo>
+                  <a:lnTo>
+                    <a:pt x="1973409" y="293673"/>
+                  </a:lnTo>
+                  <a:lnTo>
+                    <a:pt x="2043888" y="293673"/>
+                  </a:lnTo>
+                  <a:lnTo>
+                    <a:pt x="2043888" y="374686"/>
+                  </a:lnTo>
+                  <a:lnTo>
+                    <a:pt x="2114367" y="374686"/>
+                  </a:lnTo>
+                  <a:lnTo>
+                    <a:pt x="2114367" y="526586"/>
+                  </a:lnTo>
+                  <a:lnTo>
+                    <a:pt x="2184846" y="526586"/>
+                  </a:lnTo>
+                  <a:lnTo>
+                    <a:pt x="2184846" y="587346"/>
+                  </a:lnTo>
+                  <a:lnTo>
+                    <a:pt x="2255325" y="587346"/>
+                  </a:lnTo>
+                  <a:lnTo>
+                    <a:pt x="2255325" y="617726"/>
+                  </a:lnTo>
+                  <a:lnTo>
+                    <a:pt x="2325804" y="617726"/>
+                  </a:lnTo>
+                  <a:lnTo>
+                    <a:pt x="2325804" y="708866"/>
+                  </a:lnTo>
+                  <a:lnTo>
+                    <a:pt x="2396283" y="708866"/>
+                  </a:lnTo>
+                  <a:lnTo>
+                    <a:pt x="2396283" y="769626"/>
+                  </a:lnTo>
+                  <a:lnTo>
+                    <a:pt x="2466761" y="769626"/>
+                  </a:lnTo>
+                  <a:lnTo>
+                    <a:pt x="2466761" y="850640"/>
+                  </a:lnTo>
+                  <a:lnTo>
+                    <a:pt x="2537240" y="850640"/>
+                  </a:lnTo>
+                  <a:lnTo>
+                    <a:pt x="2537240" y="891146"/>
+                  </a:lnTo>
+                  <a:lnTo>
+                    <a:pt x="2607719" y="891146"/>
+                  </a:lnTo>
+                  <a:lnTo>
+                    <a:pt x="2607719" y="951906"/>
+                  </a:lnTo>
+                  <a:lnTo>
+                    <a:pt x="2678198" y="951906"/>
+                  </a:lnTo>
+                  <a:lnTo>
+                    <a:pt x="2678198" y="982286"/>
+                  </a:lnTo>
+                  <a:lnTo>
+                    <a:pt x="2819156" y="982286"/>
+                  </a:lnTo>
+                  <a:lnTo>
+                    <a:pt x="2819156" y="1012666"/>
+                  </a:lnTo>
+                  <a:lnTo>
+                    <a:pt x="2889635" y="1012666"/>
+                  </a:lnTo>
+                  <a:lnTo>
+                    <a:pt x="2889635" y="1032920"/>
+                  </a:lnTo>
+                  <a:lnTo>
+                    <a:pt x="2960114" y="1032920"/>
+                  </a:lnTo>
+                  <a:lnTo>
+                    <a:pt x="2960114" y="1043046"/>
+                  </a:lnTo>
+                  <a:lnTo>
+                    <a:pt x="3030593" y="1043046"/>
+                  </a:lnTo>
+                  <a:lnTo>
+                    <a:pt x="3030593" y="1073426"/>
+                  </a:lnTo>
+                  <a:lnTo>
+                    <a:pt x="3382987" y="1073426"/>
+                  </a:lnTo>
+                  <a:lnTo>
+                    <a:pt x="3382987" y="1083553"/>
+                  </a:lnTo>
+                  <a:lnTo>
+                    <a:pt x="3453466" y="1083553"/>
+                  </a:lnTo>
+                  <a:lnTo>
+                    <a:pt x="3453466" y="1093680"/>
+                  </a:lnTo>
+                  <a:lnTo>
+                    <a:pt x="3805861" y="1093680"/>
+                  </a:lnTo>
+                  <a:lnTo>
+                    <a:pt x="3805861" y="1093680"/>
                   </a:lnTo>
                 </a:path>
               </a:pathLst>
@@ -4772,19 +4551,19 @@
         </p:sp>
         <p:sp>
           <p:nvSpPr>
-            <p:cNvPr id="56" name="pl55"/>
-            <p:cNvSpPr/>
-            <p:nvPr/>
-          </p:nvSpPr>
-          <p:spPr>
-            <a:xfrm>
-              <a:off x="1686945" y="1128901"/>
-              <a:ext cx="3805861" cy="850154"/>
+            <p:cNvPr id="54" name="pl53"/>
+            <p:cNvSpPr/>
+            <p:nvPr/>
+          </p:nvSpPr>
+          <p:spPr>
+            <a:xfrm>
+              <a:off x="1686945" y="989153"/>
+              <a:ext cx="3805861" cy="891146"/>
             </a:xfrm>
             <a:custGeom>
               <a:avLst/>
               <a:pathLst>
-                <a:path w="3805861" h="850154">
+                <a:path w="3805861" h="891146">
                   <a:moveTo>
                     <a:pt x="0" y="0"/>
                   </a:moveTo>
@@ -4792,157 +4571,157 @@
                     <a:pt x="1409578" y="0"/>
                   </a:lnTo>
                   <a:lnTo>
-                    <a:pt x="1409578" y="9660"/>
-                  </a:lnTo>
-                  <a:lnTo>
-                    <a:pt x="1550536" y="9660"/>
-                  </a:lnTo>
-                  <a:lnTo>
-                    <a:pt x="1550536" y="19321"/>
-                  </a:lnTo>
-                  <a:lnTo>
-                    <a:pt x="1691493" y="19321"/>
-                  </a:lnTo>
-                  <a:lnTo>
-                    <a:pt x="1691493" y="28982"/>
-                  </a:lnTo>
-                  <a:lnTo>
-                    <a:pt x="1832451" y="28982"/>
-                  </a:lnTo>
-                  <a:lnTo>
-                    <a:pt x="1832451" y="48304"/>
-                  </a:lnTo>
-                  <a:lnTo>
-                    <a:pt x="1902930" y="48304"/>
-                  </a:lnTo>
-                  <a:lnTo>
-                    <a:pt x="1902930" y="77286"/>
-                  </a:lnTo>
-                  <a:lnTo>
-                    <a:pt x="1973409" y="77286"/>
-                  </a:lnTo>
-                  <a:lnTo>
-                    <a:pt x="1973409" y="106269"/>
-                  </a:lnTo>
-                  <a:lnTo>
-                    <a:pt x="2043888" y="106269"/>
-                  </a:lnTo>
-                  <a:lnTo>
-                    <a:pt x="2043888" y="125590"/>
-                  </a:lnTo>
-                  <a:lnTo>
-                    <a:pt x="2114367" y="125590"/>
-                  </a:lnTo>
-                  <a:lnTo>
-                    <a:pt x="2114367" y="173895"/>
-                  </a:lnTo>
-                  <a:lnTo>
-                    <a:pt x="2184846" y="173895"/>
-                  </a:lnTo>
-                  <a:lnTo>
-                    <a:pt x="2184846" y="241521"/>
-                  </a:lnTo>
-                  <a:lnTo>
-                    <a:pt x="2255325" y="241521"/>
-                  </a:lnTo>
-                  <a:lnTo>
-                    <a:pt x="2255325" y="260842"/>
-                  </a:lnTo>
-                  <a:lnTo>
-                    <a:pt x="2325804" y="260842"/>
-                  </a:lnTo>
-                  <a:lnTo>
-                    <a:pt x="2325804" y="367111"/>
-                  </a:lnTo>
-                  <a:lnTo>
-                    <a:pt x="2396283" y="367111"/>
-                  </a:lnTo>
-                  <a:lnTo>
-                    <a:pt x="2396283" y="444398"/>
-                  </a:lnTo>
-                  <a:lnTo>
-                    <a:pt x="2466761" y="444398"/>
-                  </a:lnTo>
-                  <a:lnTo>
-                    <a:pt x="2466761" y="541007"/>
-                  </a:lnTo>
-                  <a:lnTo>
-                    <a:pt x="2537240" y="541007"/>
-                  </a:lnTo>
-                  <a:lnTo>
-                    <a:pt x="2537240" y="598972"/>
-                  </a:lnTo>
-                  <a:lnTo>
-                    <a:pt x="2607719" y="598972"/>
-                  </a:lnTo>
-                  <a:lnTo>
-                    <a:pt x="2607719" y="656937"/>
-                  </a:lnTo>
-                  <a:lnTo>
-                    <a:pt x="2678198" y="656937"/>
-                  </a:lnTo>
-                  <a:lnTo>
-                    <a:pt x="2678198" y="695580"/>
-                  </a:lnTo>
-                  <a:lnTo>
-                    <a:pt x="2748677" y="695580"/>
-                  </a:lnTo>
-                  <a:lnTo>
-                    <a:pt x="2748677" y="724563"/>
-                  </a:lnTo>
-                  <a:lnTo>
-                    <a:pt x="2819156" y="724563"/>
-                  </a:lnTo>
-                  <a:lnTo>
-                    <a:pt x="2819156" y="734223"/>
-                  </a:lnTo>
-                  <a:lnTo>
-                    <a:pt x="2889635" y="734223"/>
-                  </a:lnTo>
-                  <a:lnTo>
-                    <a:pt x="2889635" y="763206"/>
-                  </a:lnTo>
-                  <a:lnTo>
-                    <a:pt x="3030593" y="763206"/>
-                  </a:lnTo>
-                  <a:lnTo>
-                    <a:pt x="3030593" y="772867"/>
-                  </a:lnTo>
-                  <a:lnTo>
-                    <a:pt x="3101072" y="772867"/>
-                  </a:lnTo>
-                  <a:lnTo>
-                    <a:pt x="3101072" y="782528"/>
-                  </a:lnTo>
-                  <a:lnTo>
-                    <a:pt x="3171551" y="782528"/>
-                  </a:lnTo>
-                  <a:lnTo>
-                    <a:pt x="3171551" y="811510"/>
-                  </a:lnTo>
-                  <a:lnTo>
-                    <a:pt x="3382987" y="811510"/>
-                  </a:lnTo>
-                  <a:lnTo>
-                    <a:pt x="3382987" y="821171"/>
-                  </a:lnTo>
-                  <a:lnTo>
-                    <a:pt x="3453466" y="821171"/>
-                  </a:lnTo>
-                  <a:lnTo>
-                    <a:pt x="3453466" y="840493"/>
-                  </a:lnTo>
-                  <a:lnTo>
-                    <a:pt x="3594424" y="840493"/>
-                  </a:lnTo>
-                  <a:lnTo>
-                    <a:pt x="3594424" y="850154"/>
-                  </a:lnTo>
-                  <a:lnTo>
-                    <a:pt x="3805861" y="850154"/>
-                  </a:lnTo>
-                  <a:lnTo>
-                    <a:pt x="3805861" y="850154"/>
+                    <a:pt x="1409578" y="10126"/>
+                  </a:lnTo>
+                  <a:lnTo>
+                    <a:pt x="1550536" y="10126"/>
+                  </a:lnTo>
+                  <a:lnTo>
+                    <a:pt x="1550536" y="20253"/>
+                  </a:lnTo>
+                  <a:lnTo>
+                    <a:pt x="1691493" y="20253"/>
+                  </a:lnTo>
+                  <a:lnTo>
+                    <a:pt x="1691493" y="30380"/>
+                  </a:lnTo>
+                  <a:lnTo>
+                    <a:pt x="1832451" y="30380"/>
+                  </a:lnTo>
+                  <a:lnTo>
+                    <a:pt x="1832451" y="50633"/>
+                  </a:lnTo>
+                  <a:lnTo>
+                    <a:pt x="1902930" y="50633"/>
+                  </a:lnTo>
+                  <a:lnTo>
+                    <a:pt x="1902930" y="81013"/>
+                  </a:lnTo>
+                  <a:lnTo>
+                    <a:pt x="1973409" y="81013"/>
+                  </a:lnTo>
+                  <a:lnTo>
+                    <a:pt x="1973409" y="111393"/>
+                  </a:lnTo>
+                  <a:lnTo>
+                    <a:pt x="2043888" y="111393"/>
+                  </a:lnTo>
+                  <a:lnTo>
+                    <a:pt x="2043888" y="131646"/>
+                  </a:lnTo>
+                  <a:lnTo>
+                    <a:pt x="2114367" y="131646"/>
+                  </a:lnTo>
+                  <a:lnTo>
+                    <a:pt x="2114367" y="182280"/>
+                  </a:lnTo>
+                  <a:lnTo>
+                    <a:pt x="2184846" y="182280"/>
+                  </a:lnTo>
+                  <a:lnTo>
+                    <a:pt x="2184846" y="253166"/>
+                  </a:lnTo>
+                  <a:lnTo>
+                    <a:pt x="2255325" y="253166"/>
+                  </a:lnTo>
+                  <a:lnTo>
+                    <a:pt x="2255325" y="273420"/>
+                  </a:lnTo>
+                  <a:lnTo>
+                    <a:pt x="2325804" y="273420"/>
+                  </a:lnTo>
+                  <a:lnTo>
+                    <a:pt x="2325804" y="384813"/>
+                  </a:lnTo>
+                  <a:lnTo>
+                    <a:pt x="2396283" y="384813"/>
+                  </a:lnTo>
+                  <a:lnTo>
+                    <a:pt x="2396283" y="465826"/>
+                  </a:lnTo>
+                  <a:lnTo>
+                    <a:pt x="2466761" y="465826"/>
+                  </a:lnTo>
+                  <a:lnTo>
+                    <a:pt x="2466761" y="567093"/>
+                  </a:lnTo>
+                  <a:lnTo>
+                    <a:pt x="2537240" y="567093"/>
+                  </a:lnTo>
+                  <a:lnTo>
+                    <a:pt x="2537240" y="627853"/>
+                  </a:lnTo>
+                  <a:lnTo>
+                    <a:pt x="2607719" y="627853"/>
+                  </a:lnTo>
+                  <a:lnTo>
+                    <a:pt x="2607719" y="688613"/>
+                  </a:lnTo>
+                  <a:lnTo>
+                    <a:pt x="2678198" y="688613"/>
+                  </a:lnTo>
+                  <a:lnTo>
+                    <a:pt x="2678198" y="729120"/>
+                  </a:lnTo>
+                  <a:lnTo>
+                    <a:pt x="2748677" y="729120"/>
+                  </a:lnTo>
+                  <a:lnTo>
+                    <a:pt x="2748677" y="759500"/>
+                  </a:lnTo>
+                  <a:lnTo>
+                    <a:pt x="2819156" y="759500"/>
+                  </a:lnTo>
+                  <a:lnTo>
+                    <a:pt x="2819156" y="769626"/>
+                  </a:lnTo>
+                  <a:lnTo>
+                    <a:pt x="2889635" y="769626"/>
+                  </a:lnTo>
+                  <a:lnTo>
+                    <a:pt x="2889635" y="800006"/>
+                  </a:lnTo>
+                  <a:lnTo>
+                    <a:pt x="3030593" y="800006"/>
+                  </a:lnTo>
+                  <a:lnTo>
+                    <a:pt x="3030593" y="810133"/>
+                  </a:lnTo>
+                  <a:lnTo>
+                    <a:pt x="3101072" y="810133"/>
+                  </a:lnTo>
+                  <a:lnTo>
+                    <a:pt x="3101072" y="820260"/>
+                  </a:lnTo>
+                  <a:lnTo>
+                    <a:pt x="3171551" y="820260"/>
+                  </a:lnTo>
+                  <a:lnTo>
+                    <a:pt x="3171551" y="850640"/>
+                  </a:lnTo>
+                  <a:lnTo>
+                    <a:pt x="3382987" y="850640"/>
+                  </a:lnTo>
+                  <a:lnTo>
+                    <a:pt x="3382987" y="860766"/>
+                  </a:lnTo>
+                  <a:lnTo>
+                    <a:pt x="3453466" y="860766"/>
+                  </a:lnTo>
+                  <a:lnTo>
+                    <a:pt x="3453466" y="881020"/>
+                  </a:lnTo>
+                  <a:lnTo>
+                    <a:pt x="3594424" y="881020"/>
+                  </a:lnTo>
+                  <a:lnTo>
+                    <a:pt x="3594424" y="891146"/>
+                  </a:lnTo>
+                  <a:lnTo>
+                    <a:pt x="3805861" y="891146"/>
+                  </a:lnTo>
+                  <a:lnTo>
+                    <a:pt x="3805861" y="891146"/>
                   </a:lnTo>
                 </a:path>
               </a:pathLst>
@@ -4965,19 +4744,19 @@
         </p:sp>
         <p:sp>
           <p:nvSpPr>
-            <p:cNvPr id="57" name="pl56"/>
-            <p:cNvSpPr/>
-            <p:nvPr/>
-          </p:nvSpPr>
-          <p:spPr>
-            <a:xfrm>
-              <a:off x="1686945" y="1128901"/>
-              <a:ext cx="3805861" cy="927440"/>
+            <p:cNvPr id="55" name="pl54"/>
+            <p:cNvSpPr/>
+            <p:nvPr/>
+          </p:nvSpPr>
+          <p:spPr>
+            <a:xfrm>
+              <a:off x="1686945" y="989153"/>
+              <a:ext cx="3805861" cy="972160"/>
             </a:xfrm>
             <a:custGeom>
               <a:avLst/>
               <a:pathLst>
-                <a:path w="3805861" h="927440">
+                <a:path w="3805861" h="972160">
                   <a:moveTo>
                     <a:pt x="0" y="0"/>
                   </a:moveTo>
@@ -4985,157 +4764,157 @@
                     <a:pt x="1339099" y="0"/>
                   </a:lnTo>
                   <a:lnTo>
-                    <a:pt x="1339099" y="9660"/>
-                  </a:lnTo>
-                  <a:lnTo>
-                    <a:pt x="1480057" y="9660"/>
-                  </a:lnTo>
-                  <a:lnTo>
-                    <a:pt x="1480057" y="19321"/>
-                  </a:lnTo>
-                  <a:lnTo>
-                    <a:pt x="1550536" y="19321"/>
-                  </a:lnTo>
-                  <a:lnTo>
-                    <a:pt x="1550536" y="28982"/>
-                  </a:lnTo>
-                  <a:lnTo>
-                    <a:pt x="1761972" y="28982"/>
-                  </a:lnTo>
-                  <a:lnTo>
-                    <a:pt x="1761972" y="38643"/>
-                  </a:lnTo>
-                  <a:lnTo>
-                    <a:pt x="1832451" y="38643"/>
-                  </a:lnTo>
-                  <a:lnTo>
-                    <a:pt x="1832451" y="57965"/>
-                  </a:lnTo>
-                  <a:lnTo>
-                    <a:pt x="1902930" y="57965"/>
-                  </a:lnTo>
-                  <a:lnTo>
-                    <a:pt x="1902930" y="77286"/>
-                  </a:lnTo>
-                  <a:lnTo>
-                    <a:pt x="1973409" y="77286"/>
-                  </a:lnTo>
-                  <a:lnTo>
-                    <a:pt x="1973409" y="86947"/>
-                  </a:lnTo>
-                  <a:lnTo>
-                    <a:pt x="2043888" y="86947"/>
-                  </a:lnTo>
-                  <a:lnTo>
-                    <a:pt x="2043888" y="154573"/>
-                  </a:lnTo>
-                  <a:lnTo>
-                    <a:pt x="2114367" y="154573"/>
-                  </a:lnTo>
-                  <a:lnTo>
-                    <a:pt x="2114367" y="222199"/>
-                  </a:lnTo>
-                  <a:lnTo>
-                    <a:pt x="2184846" y="222199"/>
-                  </a:lnTo>
-                  <a:lnTo>
-                    <a:pt x="2184846" y="318807"/>
-                  </a:lnTo>
-                  <a:lnTo>
-                    <a:pt x="2255325" y="318807"/>
-                  </a:lnTo>
-                  <a:lnTo>
-                    <a:pt x="2255325" y="357451"/>
-                  </a:lnTo>
-                  <a:lnTo>
-                    <a:pt x="2325804" y="357451"/>
-                  </a:lnTo>
-                  <a:lnTo>
-                    <a:pt x="2325804" y="386433"/>
-                  </a:lnTo>
-                  <a:lnTo>
-                    <a:pt x="2396283" y="386433"/>
-                  </a:lnTo>
-                  <a:lnTo>
-                    <a:pt x="2396283" y="454059"/>
-                  </a:lnTo>
-                  <a:lnTo>
-                    <a:pt x="2466761" y="454059"/>
-                  </a:lnTo>
-                  <a:lnTo>
-                    <a:pt x="2466761" y="579650"/>
-                  </a:lnTo>
-                  <a:lnTo>
-                    <a:pt x="2537240" y="579650"/>
-                  </a:lnTo>
-                  <a:lnTo>
-                    <a:pt x="2537240" y="656937"/>
-                  </a:lnTo>
-                  <a:lnTo>
-                    <a:pt x="2607719" y="656937"/>
-                  </a:lnTo>
-                  <a:lnTo>
-                    <a:pt x="2607719" y="695580"/>
-                  </a:lnTo>
-                  <a:lnTo>
-                    <a:pt x="2678198" y="695580"/>
-                  </a:lnTo>
-                  <a:lnTo>
-                    <a:pt x="2678198" y="763206"/>
-                  </a:lnTo>
-                  <a:lnTo>
-                    <a:pt x="2748677" y="763206"/>
-                  </a:lnTo>
-                  <a:lnTo>
-                    <a:pt x="2748677" y="811510"/>
-                  </a:lnTo>
-                  <a:lnTo>
-                    <a:pt x="2819156" y="811510"/>
-                  </a:lnTo>
-                  <a:lnTo>
-                    <a:pt x="2819156" y="830832"/>
-                  </a:lnTo>
-                  <a:lnTo>
-                    <a:pt x="2960114" y="830832"/>
-                  </a:lnTo>
-                  <a:lnTo>
-                    <a:pt x="2960114" y="840493"/>
-                  </a:lnTo>
-                  <a:lnTo>
-                    <a:pt x="3171551" y="840493"/>
-                  </a:lnTo>
-                  <a:lnTo>
-                    <a:pt x="3171551" y="859814"/>
-                  </a:lnTo>
-                  <a:lnTo>
-                    <a:pt x="3242029" y="859814"/>
-                  </a:lnTo>
-                  <a:lnTo>
-                    <a:pt x="3242029" y="869475"/>
-                  </a:lnTo>
-                  <a:lnTo>
-                    <a:pt x="3312508" y="869475"/>
-                  </a:lnTo>
-                  <a:lnTo>
-                    <a:pt x="3312508" y="888797"/>
-                  </a:lnTo>
-                  <a:lnTo>
-                    <a:pt x="3382987" y="888797"/>
-                  </a:lnTo>
-                  <a:lnTo>
-                    <a:pt x="3382987" y="908119"/>
-                  </a:lnTo>
-                  <a:lnTo>
-                    <a:pt x="3594424" y="908119"/>
-                  </a:lnTo>
-                  <a:lnTo>
-                    <a:pt x="3594424" y="917779"/>
-                  </a:lnTo>
-                  <a:lnTo>
-                    <a:pt x="3805861" y="917779"/>
-                  </a:lnTo>
-                  <a:lnTo>
-                    <a:pt x="3805861" y="927440"/>
+                    <a:pt x="1339099" y="10126"/>
+                  </a:lnTo>
+                  <a:lnTo>
+                    <a:pt x="1480057" y="10126"/>
+                  </a:lnTo>
+                  <a:lnTo>
+                    <a:pt x="1480057" y="20253"/>
+                  </a:lnTo>
+                  <a:lnTo>
+                    <a:pt x="1550536" y="20253"/>
+                  </a:lnTo>
+                  <a:lnTo>
+                    <a:pt x="1550536" y="30380"/>
+                  </a:lnTo>
+                  <a:lnTo>
+                    <a:pt x="1761972" y="30380"/>
+                  </a:lnTo>
+                  <a:lnTo>
+                    <a:pt x="1761972" y="40506"/>
+                  </a:lnTo>
+                  <a:lnTo>
+                    <a:pt x="1832451" y="40506"/>
+                  </a:lnTo>
+                  <a:lnTo>
+                    <a:pt x="1832451" y="60760"/>
+                  </a:lnTo>
+                  <a:lnTo>
+                    <a:pt x="1902930" y="60760"/>
+                  </a:lnTo>
+                  <a:lnTo>
+                    <a:pt x="1902930" y="81013"/>
+                  </a:lnTo>
+                  <a:lnTo>
+                    <a:pt x="1973409" y="81013"/>
+                  </a:lnTo>
+                  <a:lnTo>
+                    <a:pt x="1973409" y="91140"/>
+                  </a:lnTo>
+                  <a:lnTo>
+                    <a:pt x="2043888" y="91140"/>
+                  </a:lnTo>
+                  <a:lnTo>
+                    <a:pt x="2043888" y="162026"/>
+                  </a:lnTo>
+                  <a:lnTo>
+                    <a:pt x="2114367" y="162026"/>
+                  </a:lnTo>
+                  <a:lnTo>
+                    <a:pt x="2114367" y="232913"/>
+                  </a:lnTo>
+                  <a:lnTo>
+                    <a:pt x="2184846" y="232913"/>
+                  </a:lnTo>
+                  <a:lnTo>
+                    <a:pt x="2184846" y="334180"/>
+                  </a:lnTo>
+                  <a:lnTo>
+                    <a:pt x="2255325" y="334180"/>
+                  </a:lnTo>
+                  <a:lnTo>
+                    <a:pt x="2255325" y="374686"/>
+                  </a:lnTo>
+                  <a:lnTo>
+                    <a:pt x="2325804" y="374686"/>
+                  </a:lnTo>
+                  <a:lnTo>
+                    <a:pt x="2325804" y="405066"/>
+                  </a:lnTo>
+                  <a:lnTo>
+                    <a:pt x="2396283" y="405066"/>
+                  </a:lnTo>
+                  <a:lnTo>
+                    <a:pt x="2396283" y="475953"/>
+                  </a:lnTo>
+                  <a:lnTo>
+                    <a:pt x="2466761" y="475953"/>
+                  </a:lnTo>
+                  <a:lnTo>
+                    <a:pt x="2466761" y="607600"/>
+                  </a:lnTo>
+                  <a:lnTo>
+                    <a:pt x="2537240" y="607600"/>
+                  </a:lnTo>
+                  <a:lnTo>
+                    <a:pt x="2537240" y="688613"/>
+                  </a:lnTo>
+                  <a:lnTo>
+                    <a:pt x="2607719" y="688613"/>
+                  </a:lnTo>
+                  <a:lnTo>
+                    <a:pt x="2607719" y="729120"/>
+                  </a:lnTo>
+                  <a:lnTo>
+                    <a:pt x="2678198" y="729120"/>
+                  </a:lnTo>
+                  <a:lnTo>
+                    <a:pt x="2678198" y="800006"/>
+                  </a:lnTo>
+                  <a:lnTo>
+                    <a:pt x="2748677" y="800006"/>
+                  </a:lnTo>
+                  <a:lnTo>
+                    <a:pt x="2748677" y="850640"/>
+                  </a:lnTo>
+                  <a:lnTo>
+                    <a:pt x="2819156" y="850640"/>
+                  </a:lnTo>
+                  <a:lnTo>
+                    <a:pt x="2819156" y="870893"/>
+                  </a:lnTo>
+                  <a:lnTo>
+                    <a:pt x="2960114" y="870893"/>
+                  </a:lnTo>
+                  <a:lnTo>
+                    <a:pt x="2960114" y="881020"/>
+                  </a:lnTo>
+                  <a:lnTo>
+                    <a:pt x="3171551" y="881020"/>
+                  </a:lnTo>
+                  <a:lnTo>
+                    <a:pt x="3171551" y="901273"/>
+                  </a:lnTo>
+                  <a:lnTo>
+                    <a:pt x="3242029" y="901273"/>
+                  </a:lnTo>
+                  <a:lnTo>
+                    <a:pt x="3242029" y="911400"/>
+                  </a:lnTo>
+                  <a:lnTo>
+                    <a:pt x="3312508" y="911400"/>
+                  </a:lnTo>
+                  <a:lnTo>
+                    <a:pt x="3312508" y="931653"/>
+                  </a:lnTo>
+                  <a:lnTo>
+                    <a:pt x="3382987" y="931653"/>
+                  </a:lnTo>
+                  <a:lnTo>
+                    <a:pt x="3382987" y="951906"/>
+                  </a:lnTo>
+                  <a:lnTo>
+                    <a:pt x="3594424" y="951906"/>
+                  </a:lnTo>
+                  <a:lnTo>
+                    <a:pt x="3594424" y="962033"/>
+                  </a:lnTo>
+                  <a:lnTo>
+                    <a:pt x="3805861" y="962033"/>
+                  </a:lnTo>
+                  <a:lnTo>
+                    <a:pt x="3805861" y="972160"/>
                   </a:lnTo>
                 </a:path>
               </a:pathLst>
@@ -5158,13 +4937,13 @@
         </p:sp>
         <p:sp>
           <p:nvSpPr>
-            <p:cNvPr id="58" name="tx57"/>
-            <p:cNvSpPr/>
-            <p:nvPr/>
-          </p:nvSpPr>
-          <p:spPr>
-            <a:xfrm>
-              <a:off x="5441823" y="2141510"/>
+            <p:cNvPr id="56" name="tx55"/>
+            <p:cNvSpPr/>
+            <p:nvPr/>
+          </p:nvSpPr>
+          <p:spPr>
+            <a:xfrm>
+              <a:off x="5441823" y="2051605"/>
               <a:ext cx="101968" cy="82614"/>
             </a:xfrm>
             <a:prstGeom prst="rect">
@@ -5204,13 +4983,13 @@
         </p:sp>
         <p:sp>
           <p:nvSpPr>
-            <p:cNvPr id="59" name="tx58"/>
-            <p:cNvSpPr/>
-            <p:nvPr/>
-          </p:nvSpPr>
-          <p:spPr>
-            <a:xfrm>
-              <a:off x="5441823" y="2151171"/>
+            <p:cNvPr id="57" name="tx56"/>
+            <p:cNvSpPr/>
+            <p:nvPr/>
+          </p:nvSpPr>
+          <p:spPr>
+            <a:xfrm>
+              <a:off x="5441823" y="2061732"/>
               <a:ext cx="101968" cy="82614"/>
             </a:xfrm>
             <a:prstGeom prst="rect">
@@ -5250,13 +5029,13 @@
         </p:sp>
         <p:sp>
           <p:nvSpPr>
-            <p:cNvPr id="60" name="tx59"/>
-            <p:cNvSpPr/>
-            <p:nvPr/>
-          </p:nvSpPr>
-          <p:spPr>
-            <a:xfrm>
-              <a:off x="5441823" y="1957954"/>
+            <p:cNvPr id="58" name="tx57"/>
+            <p:cNvSpPr/>
+            <p:nvPr/>
+          </p:nvSpPr>
+          <p:spPr>
+            <a:xfrm>
+              <a:off x="5441823" y="1859199"/>
               <a:ext cx="101968" cy="82614"/>
             </a:xfrm>
             <a:prstGeom prst="rect">
@@ -5296,13 +5075,13 @@
         </p:sp>
         <p:sp>
           <p:nvSpPr>
-            <p:cNvPr id="61" name="tx60"/>
-            <p:cNvSpPr/>
-            <p:nvPr/>
-          </p:nvSpPr>
-          <p:spPr>
-            <a:xfrm>
-              <a:off x="5441823" y="2035241"/>
+            <p:cNvPr id="59" name="tx58"/>
+            <p:cNvSpPr/>
+            <p:nvPr/>
+          </p:nvSpPr>
+          <p:spPr>
+            <a:xfrm>
+              <a:off x="5441823" y="1940212"/>
               <a:ext cx="101968" cy="82614"/>
             </a:xfrm>
             <a:prstGeom prst="rect">
@@ -5342,7 +5121,7 @@
         </p:sp>
         <p:sp>
           <p:nvSpPr>
-            <p:cNvPr id="62" name="tx61"/>
+            <p:cNvPr id="60" name="tx59"/>
             <p:cNvSpPr/>
             <p:nvPr/>
           </p:nvSpPr>
@@ -5388,13 +5167,13 @@
         </p:sp>
         <p:sp>
           <p:nvSpPr>
-            <p:cNvPr id="63" name="tx62"/>
-            <p:cNvSpPr/>
-            <p:nvPr/>
-          </p:nvSpPr>
-          <p:spPr>
-            <a:xfrm>
-              <a:off x="1210339" y="3693017"/>
+            <p:cNvPr id="61" name="tx60"/>
+            <p:cNvSpPr/>
+            <p:nvPr/>
+          </p:nvSpPr>
+          <p:spPr>
+            <a:xfrm>
+              <a:off x="1210339" y="3679042"/>
               <a:ext cx="223683" cy="84311"/>
             </a:xfrm>
             <a:prstGeom prst="rect">
@@ -5434,13 +5213,13 @@
         </p:sp>
         <p:sp>
           <p:nvSpPr>
-            <p:cNvPr id="64" name="tx63"/>
-            <p:cNvSpPr/>
-            <p:nvPr/>
-          </p:nvSpPr>
-          <p:spPr>
-            <a:xfrm>
-              <a:off x="1210339" y="3403192"/>
+            <p:cNvPr id="62" name="tx61"/>
+            <p:cNvSpPr/>
+            <p:nvPr/>
+          </p:nvSpPr>
+          <p:spPr>
+            <a:xfrm>
+              <a:off x="1210339" y="3375242"/>
               <a:ext cx="223683" cy="84311"/>
             </a:xfrm>
             <a:prstGeom prst="rect">
@@ -5480,13 +5259,13 @@
         </p:sp>
         <p:sp>
           <p:nvSpPr>
-            <p:cNvPr id="65" name="tx64"/>
-            <p:cNvSpPr/>
-            <p:nvPr/>
-          </p:nvSpPr>
-          <p:spPr>
-            <a:xfrm>
-              <a:off x="1210339" y="3113367"/>
+            <p:cNvPr id="63" name="tx62"/>
+            <p:cNvSpPr/>
+            <p:nvPr/>
+          </p:nvSpPr>
+          <p:spPr>
+            <a:xfrm>
+              <a:off x="1210339" y="3071442"/>
               <a:ext cx="223683" cy="84311"/>
             </a:xfrm>
             <a:prstGeom prst="rect">
@@ -5526,13 +5305,13 @@
         </p:sp>
         <p:sp>
           <p:nvSpPr>
-            <p:cNvPr id="66" name="tx65"/>
-            <p:cNvSpPr/>
-            <p:nvPr/>
-          </p:nvSpPr>
-          <p:spPr>
-            <a:xfrm>
-              <a:off x="1210339" y="2823541"/>
+            <p:cNvPr id="64" name="tx63"/>
+            <p:cNvSpPr/>
+            <p:nvPr/>
+          </p:nvSpPr>
+          <p:spPr>
+            <a:xfrm>
+              <a:off x="1210339" y="2767642"/>
               <a:ext cx="223683" cy="84311"/>
             </a:xfrm>
             <a:prstGeom prst="rect">
@@ -5572,13 +5351,13 @@
         </p:sp>
         <p:sp>
           <p:nvSpPr>
-            <p:cNvPr id="67" name="tx66"/>
-            <p:cNvSpPr/>
-            <p:nvPr/>
-          </p:nvSpPr>
-          <p:spPr>
-            <a:xfrm>
-              <a:off x="1210339" y="2533716"/>
+            <p:cNvPr id="65" name="tx64"/>
+            <p:cNvSpPr/>
+            <p:nvPr/>
+          </p:nvSpPr>
+          <p:spPr>
+            <a:xfrm>
+              <a:off x="1210339" y="2463842"/>
               <a:ext cx="223683" cy="84311"/>
             </a:xfrm>
             <a:prstGeom prst="rect">
@@ -5618,13 +5397,13 @@
         </p:sp>
         <p:sp>
           <p:nvSpPr>
-            <p:cNvPr id="68" name="tx67"/>
-            <p:cNvSpPr/>
-            <p:nvPr/>
-          </p:nvSpPr>
-          <p:spPr>
-            <a:xfrm>
-              <a:off x="1210339" y="2243891"/>
+            <p:cNvPr id="66" name="tx65"/>
+            <p:cNvSpPr/>
+            <p:nvPr/>
+          </p:nvSpPr>
+          <p:spPr>
+            <a:xfrm>
+              <a:off x="1210339" y="2160042"/>
               <a:ext cx="223683" cy="84311"/>
             </a:xfrm>
             <a:prstGeom prst="rect">
@@ -5664,13 +5443,13 @@
         </p:sp>
         <p:sp>
           <p:nvSpPr>
-            <p:cNvPr id="69" name="tx68"/>
-            <p:cNvSpPr/>
-            <p:nvPr/>
-          </p:nvSpPr>
-          <p:spPr>
-            <a:xfrm>
-              <a:off x="1210339" y="1954066"/>
+            <p:cNvPr id="67" name="tx66"/>
+            <p:cNvSpPr/>
+            <p:nvPr/>
+          </p:nvSpPr>
+          <p:spPr>
+            <a:xfrm>
+              <a:off x="1210339" y="1856242"/>
               <a:ext cx="223683" cy="84311"/>
             </a:xfrm>
             <a:prstGeom prst="rect">
@@ -5710,13 +5489,13 @@
         </p:sp>
         <p:sp>
           <p:nvSpPr>
-            <p:cNvPr id="70" name="tx69"/>
-            <p:cNvSpPr/>
-            <p:nvPr/>
-          </p:nvSpPr>
-          <p:spPr>
-            <a:xfrm>
-              <a:off x="1210339" y="1664241"/>
+            <p:cNvPr id="68" name="tx67"/>
+            <p:cNvSpPr/>
+            <p:nvPr/>
+          </p:nvSpPr>
+          <p:spPr>
+            <a:xfrm>
+              <a:off x="1210339" y="1552442"/>
               <a:ext cx="223683" cy="84311"/>
             </a:xfrm>
             <a:prstGeom prst="rect">
@@ -5756,13 +5535,13 @@
         </p:sp>
         <p:sp>
           <p:nvSpPr>
-            <p:cNvPr id="71" name="tx70"/>
-            <p:cNvSpPr/>
-            <p:nvPr/>
-          </p:nvSpPr>
-          <p:spPr>
-            <a:xfrm>
-              <a:off x="1210339" y="1374415"/>
+            <p:cNvPr id="69" name="tx68"/>
+            <p:cNvSpPr/>
+            <p:nvPr/>
+          </p:nvSpPr>
+          <p:spPr>
+            <a:xfrm>
+              <a:off x="1210339" y="1248642"/>
               <a:ext cx="223683" cy="84311"/>
             </a:xfrm>
             <a:prstGeom prst="rect">
@@ -5802,13 +5581,13 @@
         </p:sp>
         <p:sp>
           <p:nvSpPr>
-            <p:cNvPr id="72" name="tx71"/>
-            <p:cNvSpPr/>
-            <p:nvPr/>
-          </p:nvSpPr>
-          <p:spPr>
-            <a:xfrm>
-              <a:off x="1148183" y="1084590"/>
+            <p:cNvPr id="70" name="tx69"/>
+            <p:cNvSpPr/>
+            <p:nvPr/>
+          </p:nvSpPr>
+          <p:spPr>
+            <a:xfrm>
+              <a:off x="1148183" y="944842"/>
               <a:ext cx="285839" cy="84311"/>
             </a:xfrm>
             <a:prstGeom prst="rect">
@@ -5848,7 +5627,7 @@
         </p:sp>
         <p:sp>
           <p:nvSpPr>
-            <p:cNvPr id="73" name="pl72"/>
+            <p:cNvPr id="71" name="pl70"/>
             <p:cNvSpPr/>
             <p:nvPr/>
           </p:nvSpPr>
@@ -5888,13 +5667,13 @@
         </p:sp>
         <p:sp>
           <p:nvSpPr>
-            <p:cNvPr id="74" name="pl73"/>
-            <p:cNvSpPr/>
-            <p:nvPr/>
-          </p:nvSpPr>
-          <p:spPr>
-            <a:xfrm>
-              <a:off x="1461858" y="3737328"/>
+            <p:cNvPr id="72" name="pl71"/>
+            <p:cNvSpPr/>
+            <p:nvPr/>
+          </p:nvSpPr>
+          <p:spPr>
+            <a:xfrm>
+              <a:off x="1461858" y="3723353"/>
               <a:ext cx="34794" cy="0"/>
             </a:xfrm>
             <a:custGeom>
@@ -5928,13 +5707,13 @@
         </p:sp>
         <p:sp>
           <p:nvSpPr>
-            <p:cNvPr id="75" name="pl74"/>
-            <p:cNvSpPr/>
-            <p:nvPr/>
-          </p:nvSpPr>
-          <p:spPr>
-            <a:xfrm>
-              <a:off x="1461858" y="3447503"/>
+            <p:cNvPr id="73" name="pl72"/>
+            <p:cNvSpPr/>
+            <p:nvPr/>
+          </p:nvSpPr>
+          <p:spPr>
+            <a:xfrm>
+              <a:off x="1461858" y="3419553"/>
               <a:ext cx="34794" cy="0"/>
             </a:xfrm>
             <a:custGeom>
@@ -5968,13 +5747,13 @@
         </p:sp>
         <p:sp>
           <p:nvSpPr>
-            <p:cNvPr id="76" name="pl75"/>
-            <p:cNvSpPr/>
-            <p:nvPr/>
-          </p:nvSpPr>
-          <p:spPr>
-            <a:xfrm>
-              <a:off x="1461858" y="3157678"/>
+            <p:cNvPr id="74" name="pl73"/>
+            <p:cNvSpPr/>
+            <p:nvPr/>
+          </p:nvSpPr>
+          <p:spPr>
+            <a:xfrm>
+              <a:off x="1461858" y="3115753"/>
               <a:ext cx="34794" cy="0"/>
             </a:xfrm>
             <a:custGeom>
@@ -6008,13 +5787,13 @@
         </p:sp>
         <p:sp>
           <p:nvSpPr>
-            <p:cNvPr id="77" name="pl76"/>
-            <p:cNvSpPr/>
-            <p:nvPr/>
-          </p:nvSpPr>
-          <p:spPr>
-            <a:xfrm>
-              <a:off x="1461858" y="2867853"/>
+            <p:cNvPr id="75" name="pl74"/>
+            <p:cNvSpPr/>
+            <p:nvPr/>
+          </p:nvSpPr>
+          <p:spPr>
+            <a:xfrm>
+              <a:off x="1461858" y="2811953"/>
               <a:ext cx="34794" cy="0"/>
             </a:xfrm>
             <a:custGeom>
@@ -6048,13 +5827,13 @@
         </p:sp>
         <p:sp>
           <p:nvSpPr>
-            <p:cNvPr id="78" name="pl77"/>
-            <p:cNvSpPr/>
-            <p:nvPr/>
-          </p:nvSpPr>
-          <p:spPr>
-            <a:xfrm>
-              <a:off x="1461858" y="2578027"/>
+            <p:cNvPr id="76" name="pl75"/>
+            <p:cNvSpPr/>
+            <p:nvPr/>
+          </p:nvSpPr>
+          <p:spPr>
+            <a:xfrm>
+              <a:off x="1461858" y="2508153"/>
               <a:ext cx="34794" cy="0"/>
             </a:xfrm>
             <a:custGeom>
@@ -6088,13 +5867,13 @@
         </p:sp>
         <p:sp>
           <p:nvSpPr>
-            <p:cNvPr id="79" name="pl78"/>
-            <p:cNvSpPr/>
-            <p:nvPr/>
-          </p:nvSpPr>
-          <p:spPr>
-            <a:xfrm>
-              <a:off x="1461858" y="2288202"/>
+            <p:cNvPr id="77" name="pl76"/>
+            <p:cNvSpPr/>
+            <p:nvPr/>
+          </p:nvSpPr>
+          <p:spPr>
+            <a:xfrm>
+              <a:off x="1461858" y="2204353"/>
               <a:ext cx="34794" cy="0"/>
             </a:xfrm>
             <a:custGeom>
@@ -6128,13 +5907,13 @@
         </p:sp>
         <p:sp>
           <p:nvSpPr>
-            <p:cNvPr id="80" name="pl79"/>
-            <p:cNvSpPr/>
-            <p:nvPr/>
-          </p:nvSpPr>
-          <p:spPr>
-            <a:xfrm>
-              <a:off x="1461858" y="1998377"/>
+            <p:cNvPr id="78" name="pl77"/>
+            <p:cNvSpPr/>
+            <p:nvPr/>
+          </p:nvSpPr>
+          <p:spPr>
+            <a:xfrm>
+              <a:off x="1461858" y="1900553"/>
               <a:ext cx="34794" cy="0"/>
             </a:xfrm>
             <a:custGeom>
@@ -6168,13 +5947,13 @@
         </p:sp>
         <p:sp>
           <p:nvSpPr>
-            <p:cNvPr id="81" name="pl80"/>
-            <p:cNvSpPr/>
-            <p:nvPr/>
-          </p:nvSpPr>
-          <p:spPr>
-            <a:xfrm>
-              <a:off x="1461858" y="1708552"/>
+            <p:cNvPr id="79" name="pl78"/>
+            <p:cNvSpPr/>
+            <p:nvPr/>
+          </p:nvSpPr>
+          <p:spPr>
+            <a:xfrm>
+              <a:off x="1461858" y="1596753"/>
               <a:ext cx="34794" cy="0"/>
             </a:xfrm>
             <a:custGeom>
@@ -6208,13 +5987,13 @@
         </p:sp>
         <p:sp>
           <p:nvSpPr>
-            <p:cNvPr id="82" name="pl81"/>
-            <p:cNvSpPr/>
-            <p:nvPr/>
-          </p:nvSpPr>
-          <p:spPr>
-            <a:xfrm>
-              <a:off x="1461858" y="1418726"/>
+            <p:cNvPr id="80" name="pl79"/>
+            <p:cNvSpPr/>
+            <p:nvPr/>
+          </p:nvSpPr>
+          <p:spPr>
+            <a:xfrm>
+              <a:off x="1461858" y="1292953"/>
               <a:ext cx="34794" cy="0"/>
             </a:xfrm>
             <a:custGeom>
@@ -6248,13 +6027,13 @@
         </p:sp>
         <p:sp>
           <p:nvSpPr>
-            <p:cNvPr id="83" name="pl82"/>
-            <p:cNvSpPr/>
-            <p:nvPr/>
-          </p:nvSpPr>
-          <p:spPr>
-            <a:xfrm>
-              <a:off x="1461858" y="1128901"/>
+            <p:cNvPr id="81" name="pl80"/>
+            <p:cNvSpPr/>
+            <p:nvPr/>
+          </p:nvSpPr>
+          <p:spPr>
+            <a:xfrm>
+              <a:off x="1461858" y="989153"/>
               <a:ext cx="34794" cy="0"/>
             </a:xfrm>
             <a:custGeom>
@@ -6288,7 +6067,7 @@
         </p:sp>
         <p:sp>
           <p:nvSpPr>
-            <p:cNvPr id="84" name="pl83"/>
+            <p:cNvPr id="82" name="pl81"/>
             <p:cNvSpPr/>
             <p:nvPr/>
           </p:nvSpPr>
@@ -6328,7 +6107,7 @@
         </p:sp>
         <p:sp>
           <p:nvSpPr>
-            <p:cNvPr id="85" name="pl84"/>
+            <p:cNvPr id="83" name="pl82"/>
             <p:cNvSpPr/>
             <p:nvPr/>
           </p:nvSpPr>
@@ -6368,7 +6147,7 @@
         </p:sp>
         <p:sp>
           <p:nvSpPr>
-            <p:cNvPr id="86" name="pl85"/>
+            <p:cNvPr id="84" name="pl83"/>
             <p:cNvSpPr/>
             <p:nvPr/>
           </p:nvSpPr>
@@ -6408,7 +6187,7 @@
         </p:sp>
         <p:sp>
           <p:nvSpPr>
-            <p:cNvPr id="87" name="pl86"/>
+            <p:cNvPr id="85" name="pl84"/>
             <p:cNvSpPr/>
             <p:nvPr/>
           </p:nvSpPr>
@@ -6448,7 +6227,7 @@
         </p:sp>
         <p:sp>
           <p:nvSpPr>
-            <p:cNvPr id="88" name="pl87"/>
+            <p:cNvPr id="86" name="pl85"/>
             <p:cNvSpPr/>
             <p:nvPr/>
           </p:nvSpPr>
@@ -6488,7 +6267,7 @@
         </p:sp>
         <p:sp>
           <p:nvSpPr>
-            <p:cNvPr id="89" name="pl88"/>
+            <p:cNvPr id="87" name="pl86"/>
             <p:cNvSpPr/>
             <p:nvPr/>
           </p:nvSpPr>
@@ -6528,7 +6307,7 @@
         </p:sp>
         <p:sp>
           <p:nvSpPr>
-            <p:cNvPr id="90" name="pl89"/>
+            <p:cNvPr id="88" name="pl87"/>
             <p:cNvSpPr/>
             <p:nvPr/>
           </p:nvSpPr>
@@ -6568,7 +6347,7 @@
         </p:sp>
         <p:sp>
           <p:nvSpPr>
-            <p:cNvPr id="91" name="pl90"/>
+            <p:cNvPr id="89" name="pl88"/>
             <p:cNvSpPr/>
             <p:nvPr/>
           </p:nvSpPr>
@@ -6608,7 +6387,7 @@
         </p:sp>
         <p:sp>
           <p:nvSpPr>
-            <p:cNvPr id="92" name="pl91"/>
+            <p:cNvPr id="90" name="pl89"/>
             <p:cNvSpPr/>
             <p:nvPr/>
           </p:nvSpPr>
@@ -6648,7 +6427,7 @@
         </p:sp>
         <p:sp>
           <p:nvSpPr>
-            <p:cNvPr id="93" name="pl92"/>
+            <p:cNvPr id="91" name="pl90"/>
             <p:cNvSpPr/>
             <p:nvPr/>
           </p:nvSpPr>
@@ -6688,7 +6467,7 @@
         </p:sp>
         <p:sp>
           <p:nvSpPr>
-            <p:cNvPr id="94" name="pl93"/>
+            <p:cNvPr id="92" name="pl91"/>
             <p:cNvSpPr/>
             <p:nvPr/>
           </p:nvSpPr>
@@ -6728,7 +6507,7 @@
         </p:sp>
         <p:sp>
           <p:nvSpPr>
-            <p:cNvPr id="95" name="pl94"/>
+            <p:cNvPr id="93" name="pl92"/>
             <p:cNvSpPr/>
             <p:nvPr/>
           </p:nvSpPr>
@@ -6768,7 +6547,7 @@
         </p:sp>
         <p:sp>
           <p:nvSpPr>
-            <p:cNvPr id="96" name="tx95"/>
+            <p:cNvPr id="94" name="tx93"/>
             <p:cNvSpPr/>
             <p:nvPr/>
           </p:nvSpPr>
@@ -6814,7 +6593,7 @@
         </p:sp>
         <p:sp>
           <p:nvSpPr>
-            <p:cNvPr id="97" name="tx96"/>
+            <p:cNvPr id="95" name="tx94"/>
             <p:cNvSpPr/>
             <p:nvPr/>
           </p:nvSpPr>
@@ -6860,7 +6639,7 @@
         </p:sp>
         <p:sp>
           <p:nvSpPr>
-            <p:cNvPr id="98" name="tx97"/>
+            <p:cNvPr id="96" name="tx95"/>
             <p:cNvSpPr/>
             <p:nvPr/>
           </p:nvSpPr>
@@ -6906,7 +6685,7 @@
         </p:sp>
         <p:sp>
           <p:nvSpPr>
-            <p:cNvPr id="99" name="tx98"/>
+            <p:cNvPr id="97" name="tx96"/>
             <p:cNvSpPr/>
             <p:nvPr/>
           </p:nvSpPr>
@@ -6952,7 +6731,7 @@
         </p:sp>
         <p:sp>
           <p:nvSpPr>
-            <p:cNvPr id="100" name="tx99"/>
+            <p:cNvPr id="98" name="tx97"/>
             <p:cNvSpPr/>
             <p:nvPr/>
           </p:nvSpPr>
@@ -6998,7 +6777,7 @@
         </p:sp>
         <p:sp>
           <p:nvSpPr>
-            <p:cNvPr id="101" name="tx100"/>
+            <p:cNvPr id="99" name="tx98"/>
             <p:cNvSpPr/>
             <p:nvPr/>
           </p:nvSpPr>
@@ -7044,7 +6823,7 @@
         </p:sp>
         <p:sp>
           <p:nvSpPr>
-            <p:cNvPr id="102" name="tx101"/>
+            <p:cNvPr id="100" name="tx99"/>
             <p:cNvSpPr/>
             <p:nvPr/>
           </p:nvSpPr>
@@ -7090,7 +6869,7 @@
         </p:sp>
         <p:sp>
           <p:nvSpPr>
-            <p:cNvPr id="103" name="tx102"/>
+            <p:cNvPr id="101" name="tx100"/>
             <p:cNvSpPr/>
             <p:nvPr/>
           </p:nvSpPr>
@@ -7136,7 +6915,7 @@
         </p:sp>
         <p:sp>
           <p:nvSpPr>
-            <p:cNvPr id="104" name="tx103"/>
+            <p:cNvPr id="102" name="tx101"/>
             <p:cNvSpPr/>
             <p:nvPr/>
           </p:nvSpPr>
@@ -7182,7 +6961,7 @@
         </p:sp>
         <p:sp>
           <p:nvSpPr>
-            <p:cNvPr id="105" name="tx104"/>
+            <p:cNvPr id="103" name="tx102"/>
             <p:cNvSpPr/>
             <p:nvPr/>
           </p:nvSpPr>
@@ -7228,7 +7007,7 @@
         </p:sp>
         <p:sp>
           <p:nvSpPr>
-            <p:cNvPr id="106" name="tx105"/>
+            <p:cNvPr id="104" name="tx103"/>
             <p:cNvSpPr/>
             <p:nvPr/>
           </p:nvSpPr>
@@ -7274,7 +7053,7 @@
         </p:sp>
         <p:sp>
           <p:nvSpPr>
-            <p:cNvPr id="107" name="tx106"/>
+            <p:cNvPr id="105" name="tx104"/>
             <p:cNvSpPr/>
             <p:nvPr/>
           </p:nvSpPr>
@@ -7320,7 +7099,7 @@
         </p:sp>
         <p:sp>
           <p:nvSpPr>
-            <p:cNvPr id="108" name="tx107"/>
+            <p:cNvPr id="106" name="tx105"/>
             <p:cNvSpPr/>
             <p:nvPr/>
           </p:nvSpPr>
@@ -7366,7 +7145,7 @@
         </p:sp>
         <p:sp>
           <p:nvSpPr>
-            <p:cNvPr id="109" name="tx108"/>
+            <p:cNvPr id="107" name="tx106"/>
             <p:cNvSpPr/>
             <p:nvPr/>
           </p:nvSpPr>
@@ -7412,7 +7191,7 @@
         </p:sp>
         <p:sp>
           <p:nvSpPr>
-            <p:cNvPr id="110" name="rc109"/>
+            <p:cNvPr id="108" name="rc107"/>
             <p:cNvSpPr/>
             <p:nvPr/>
           </p:nvSpPr>
@@ -7438,7 +7217,7 @@
         </p:sp>
         <p:sp>
           <p:nvSpPr>
-            <p:cNvPr id="111" name="tx110"/>
+            <p:cNvPr id="109" name="tx108"/>
             <p:cNvSpPr/>
             <p:nvPr/>
           </p:nvSpPr>
@@ -7484,7 +7263,7 @@
         </p:sp>
         <p:sp>
           <p:nvSpPr>
-            <p:cNvPr id="112" name="rc111"/>
+            <p:cNvPr id="110" name="rc109"/>
             <p:cNvSpPr/>
             <p:nvPr/>
           </p:nvSpPr>
@@ -7510,7 +7289,7 @@
         </p:sp>
         <p:sp>
           <p:nvSpPr>
-            <p:cNvPr id="113" name="pl112"/>
+            <p:cNvPr id="111" name="pl110"/>
             <p:cNvSpPr/>
             <p:nvPr/>
           </p:nvSpPr>
@@ -7550,7 +7329,7 @@
         </p:sp>
         <p:sp>
           <p:nvSpPr>
-            <p:cNvPr id="114" name="tx113"/>
+            <p:cNvPr id="112" name="tx111"/>
             <p:cNvSpPr/>
             <p:nvPr/>
           </p:nvSpPr>
@@ -7596,7 +7375,7 @@
         </p:sp>
         <p:sp>
           <p:nvSpPr>
-            <p:cNvPr id="115" name="rc114"/>
+            <p:cNvPr id="113" name="rc112"/>
             <p:cNvSpPr/>
             <p:nvPr/>
           </p:nvSpPr>
@@ -7622,7 +7401,7 @@
         </p:sp>
         <p:sp>
           <p:nvSpPr>
-            <p:cNvPr id="116" name="pl115"/>
+            <p:cNvPr id="114" name="pl113"/>
             <p:cNvSpPr/>
             <p:nvPr/>
           </p:nvSpPr>
@@ -7662,7 +7441,7 @@
         </p:sp>
         <p:sp>
           <p:nvSpPr>
-            <p:cNvPr id="117" name="tx116"/>
+            <p:cNvPr id="115" name="tx114"/>
             <p:cNvSpPr/>
             <p:nvPr/>
           </p:nvSpPr>
@@ -7708,7 +7487,7 @@
         </p:sp>
         <p:sp>
           <p:nvSpPr>
-            <p:cNvPr id="118" name="rc117"/>
+            <p:cNvPr id="116" name="rc115"/>
             <p:cNvSpPr/>
             <p:nvPr/>
           </p:nvSpPr>
@@ -7734,7 +7513,7 @@
         </p:sp>
         <p:sp>
           <p:nvSpPr>
-            <p:cNvPr id="119" name="pl118"/>
+            <p:cNvPr id="117" name="pl116"/>
             <p:cNvSpPr/>
             <p:nvPr/>
           </p:nvSpPr>
@@ -7774,7 +7553,7 @@
         </p:sp>
         <p:sp>
           <p:nvSpPr>
-            <p:cNvPr id="120" name="tx119"/>
+            <p:cNvPr id="118" name="tx117"/>
             <p:cNvSpPr/>
             <p:nvPr/>
           </p:nvSpPr>
@@ -7820,7 +7599,7 @@
         </p:sp>
         <p:sp>
           <p:nvSpPr>
-            <p:cNvPr id="121" name="rc120"/>
+            <p:cNvPr id="119" name="rc118"/>
             <p:cNvSpPr/>
             <p:nvPr/>
           </p:nvSpPr>
@@ -7846,7 +7625,7 @@
         </p:sp>
         <p:sp>
           <p:nvSpPr>
-            <p:cNvPr id="122" name="pl121"/>
+            <p:cNvPr id="120" name="pl119"/>
             <p:cNvSpPr/>
             <p:nvPr/>
           </p:nvSpPr>
@@ -7886,7 +7665,7 @@
         </p:sp>
         <p:sp>
           <p:nvSpPr>
-            <p:cNvPr id="123" name="tx122"/>
+            <p:cNvPr id="121" name="tx120"/>
             <p:cNvSpPr/>
             <p:nvPr/>
           </p:nvSpPr>
@@ -7932,7 +7711,7 @@
         </p:sp>
         <p:sp>
           <p:nvSpPr>
-            <p:cNvPr id="124" name="tx123"/>
+            <p:cNvPr id="122" name="tx121"/>
             <p:cNvSpPr/>
             <p:nvPr/>
           </p:nvSpPr>
@@ -7978,7 +7757,7 @@
         </p:sp>
         <p:sp>
           <p:nvSpPr>
-            <p:cNvPr id="125" name="tx124"/>
+            <p:cNvPr id="123" name="tx122"/>
             <p:cNvSpPr/>
             <p:nvPr/>
           </p:nvSpPr>
@@ -8024,7 +7803,7 @@
         </p:sp>
         <p:sp>
           <p:nvSpPr>
-            <p:cNvPr id="126" name="tx125"/>
+            <p:cNvPr id="124" name="tx123"/>
             <p:cNvSpPr/>
             <p:nvPr/>
           </p:nvSpPr>
@@ -8070,7 +7849,7 @@
         </p:sp>
         <p:sp>
           <p:nvSpPr>
-            <p:cNvPr id="127" name="tx126"/>
+            <p:cNvPr id="125" name="tx124"/>
             <p:cNvSpPr/>
             <p:nvPr/>
           </p:nvSpPr>

</xml_diff>